<commit_message>
Angepasste Titelfolie und Klassendiagramme enthalten
</commit_message>
<xml_diff>
--- a/PräsentationPython.pptx
+++ b/PräsentationPython.pptx
@@ -62,7 +62,7 @@
       </p:grpSpPr>
       <p:sp>
         <p:nvSpPr>
-          <p:cNvPr id="35" name="PlaceHolder 1"/>
+          <p:cNvPr id="32" name="PlaceHolder 1"/>
           <p:cNvSpPr>
             <a:spLocks noGrp="1"/>
           </p:cNvSpPr>
@@ -91,7 +91,7 @@
       </p:sp>
       <p:sp>
         <p:nvSpPr>
-          <p:cNvPr id="36" name="PlaceHolder 2"/>
+          <p:cNvPr id="33" name="PlaceHolder 2"/>
           <p:cNvSpPr>
             <a:spLocks noGrp="1"/>
           </p:cNvSpPr>
@@ -121,7 +121,7 @@
       </p:sp>
       <p:sp>
         <p:nvSpPr>
-          <p:cNvPr id="37" name="PlaceHolder 3"/>
+          <p:cNvPr id="34" name="PlaceHolder 3"/>
           <p:cNvSpPr>
             <a:spLocks noGrp="1"/>
           </p:cNvSpPr>
@@ -173,7 +173,7 @@
       </p:grpSpPr>
       <p:sp>
         <p:nvSpPr>
-          <p:cNvPr id="38" name="PlaceHolder 1"/>
+          <p:cNvPr id="35" name="PlaceHolder 1"/>
           <p:cNvSpPr>
             <a:spLocks noGrp="1"/>
           </p:cNvSpPr>
@@ -202,7 +202,7 @@
       </p:sp>
       <p:sp>
         <p:nvSpPr>
-          <p:cNvPr id="39" name="PlaceHolder 2"/>
+          <p:cNvPr id="36" name="PlaceHolder 2"/>
           <p:cNvSpPr>
             <a:spLocks noGrp="1"/>
           </p:cNvSpPr>
@@ -232,7 +232,7 @@
       </p:sp>
       <p:sp>
         <p:nvSpPr>
-          <p:cNvPr id="40" name="PlaceHolder 3"/>
+          <p:cNvPr id="37" name="PlaceHolder 3"/>
           <p:cNvSpPr>
             <a:spLocks noGrp="1"/>
           </p:cNvSpPr>
@@ -262,7 +262,7 @@
       </p:sp>
       <p:sp>
         <p:nvSpPr>
-          <p:cNvPr id="41" name="PlaceHolder 4"/>
+          <p:cNvPr id="38" name="PlaceHolder 4"/>
           <p:cNvSpPr>
             <a:spLocks noGrp="1"/>
           </p:cNvSpPr>
@@ -292,7 +292,7 @@
       </p:sp>
       <p:sp>
         <p:nvSpPr>
-          <p:cNvPr id="42" name="PlaceHolder 5"/>
+          <p:cNvPr id="39" name="PlaceHolder 5"/>
           <p:cNvSpPr>
             <a:spLocks noGrp="1"/>
           </p:cNvSpPr>
@@ -344,7 +344,7 @@
       </p:grpSpPr>
       <p:sp>
         <p:nvSpPr>
-          <p:cNvPr id="43" name="PlaceHolder 1"/>
+          <p:cNvPr id="40" name="PlaceHolder 1"/>
           <p:cNvSpPr>
             <a:spLocks noGrp="1"/>
           </p:cNvSpPr>
@@ -373,7 +373,7 @@
       </p:sp>
       <p:sp>
         <p:nvSpPr>
-          <p:cNvPr id="44" name="PlaceHolder 2"/>
+          <p:cNvPr id="41" name="PlaceHolder 2"/>
           <p:cNvSpPr>
             <a:spLocks noGrp="1"/>
           </p:cNvSpPr>
@@ -403,7 +403,7 @@
       </p:sp>
       <p:sp>
         <p:nvSpPr>
-          <p:cNvPr id="45" name="PlaceHolder 3"/>
+          <p:cNvPr id="42" name="PlaceHolder 3"/>
           <p:cNvSpPr>
             <a:spLocks noGrp="1"/>
           </p:cNvSpPr>
@@ -433,7 +433,7 @@
       </p:sp>
       <p:sp>
         <p:nvSpPr>
-          <p:cNvPr id="46" name="PlaceHolder 4"/>
+          <p:cNvPr id="43" name="PlaceHolder 4"/>
           <p:cNvSpPr>
             <a:spLocks noGrp="1"/>
           </p:cNvSpPr>
@@ -463,7 +463,7 @@
       </p:sp>
       <p:sp>
         <p:nvSpPr>
-          <p:cNvPr id="47" name="PlaceHolder 5"/>
+          <p:cNvPr id="44" name="PlaceHolder 5"/>
           <p:cNvSpPr>
             <a:spLocks noGrp="1"/>
           </p:cNvSpPr>
@@ -493,7 +493,7 @@
       </p:sp>
       <p:sp>
         <p:nvSpPr>
-          <p:cNvPr id="48" name="PlaceHolder 6"/>
+          <p:cNvPr id="45" name="PlaceHolder 6"/>
           <p:cNvSpPr>
             <a:spLocks noGrp="1"/>
           </p:cNvSpPr>
@@ -523,7 +523,7 @@
       </p:sp>
       <p:sp>
         <p:nvSpPr>
-          <p:cNvPr id="49" name="PlaceHolder 7"/>
+          <p:cNvPr id="46" name="PlaceHolder 7"/>
           <p:cNvSpPr>
             <a:spLocks noGrp="1"/>
           </p:cNvSpPr>
@@ -597,7 +597,7 @@
       </p:grpSpPr>
       <p:sp>
         <p:nvSpPr>
-          <p:cNvPr id="55" name="PlaceHolder 1"/>
+          <p:cNvPr id="52" name="PlaceHolder 1"/>
           <p:cNvSpPr>
             <a:spLocks noGrp="1"/>
           </p:cNvSpPr>
@@ -626,7 +626,7 @@
       </p:sp>
       <p:sp>
         <p:nvSpPr>
-          <p:cNvPr id="56" name="PlaceHolder 2"/>
+          <p:cNvPr id="53" name="PlaceHolder 2"/>
           <p:cNvSpPr>
             <a:spLocks noGrp="1"/>
           </p:cNvSpPr>
@@ -677,7 +677,7 @@
       </p:grpSpPr>
       <p:sp>
         <p:nvSpPr>
-          <p:cNvPr id="57" name="PlaceHolder 1"/>
+          <p:cNvPr id="54" name="PlaceHolder 1"/>
           <p:cNvSpPr>
             <a:spLocks noGrp="1"/>
           </p:cNvSpPr>
@@ -706,7 +706,7 @@
       </p:sp>
       <p:sp>
         <p:nvSpPr>
-          <p:cNvPr id="58" name="PlaceHolder 2"/>
+          <p:cNvPr id="55" name="PlaceHolder 2"/>
           <p:cNvSpPr>
             <a:spLocks noGrp="1"/>
           </p:cNvSpPr>
@@ -758,7 +758,7 @@
       </p:grpSpPr>
       <p:sp>
         <p:nvSpPr>
-          <p:cNvPr id="59" name="PlaceHolder 1"/>
+          <p:cNvPr id="56" name="PlaceHolder 1"/>
           <p:cNvSpPr>
             <a:spLocks noGrp="1"/>
           </p:cNvSpPr>
@@ -787,7 +787,7 @@
       </p:sp>
       <p:sp>
         <p:nvSpPr>
-          <p:cNvPr id="60" name="PlaceHolder 2"/>
+          <p:cNvPr id="57" name="PlaceHolder 2"/>
           <p:cNvSpPr>
             <a:spLocks noGrp="1"/>
           </p:cNvSpPr>
@@ -817,7 +817,7 @@
       </p:sp>
       <p:sp>
         <p:nvSpPr>
-          <p:cNvPr id="61" name="PlaceHolder 3"/>
+          <p:cNvPr id="58" name="PlaceHolder 3"/>
           <p:cNvSpPr>
             <a:spLocks noGrp="1"/>
           </p:cNvSpPr>
@@ -869,7 +869,7 @@
       </p:grpSpPr>
       <p:sp>
         <p:nvSpPr>
-          <p:cNvPr id="62" name="PlaceHolder 1"/>
+          <p:cNvPr id="59" name="PlaceHolder 1"/>
           <p:cNvSpPr>
             <a:spLocks noGrp="1"/>
           </p:cNvSpPr>
@@ -920,7 +920,7 @@
       </p:grpSpPr>
       <p:sp>
         <p:nvSpPr>
-          <p:cNvPr id="63" name="PlaceHolder 1"/>
+          <p:cNvPr id="60" name="PlaceHolder 1"/>
           <p:cNvSpPr>
             <a:spLocks noGrp="1"/>
           </p:cNvSpPr>
@@ -971,7 +971,7 @@
       </p:grpSpPr>
       <p:sp>
         <p:nvSpPr>
-          <p:cNvPr id="64" name="PlaceHolder 1"/>
+          <p:cNvPr id="61" name="PlaceHolder 1"/>
           <p:cNvSpPr>
             <a:spLocks noGrp="1"/>
           </p:cNvSpPr>
@@ -1000,7 +1000,7 @@
       </p:sp>
       <p:sp>
         <p:nvSpPr>
-          <p:cNvPr id="65" name="PlaceHolder 2"/>
+          <p:cNvPr id="62" name="PlaceHolder 2"/>
           <p:cNvSpPr>
             <a:spLocks noGrp="1"/>
           </p:cNvSpPr>
@@ -1030,7 +1030,7 @@
       </p:sp>
       <p:sp>
         <p:nvSpPr>
-          <p:cNvPr id="66" name="PlaceHolder 3"/>
+          <p:cNvPr id="63" name="PlaceHolder 3"/>
           <p:cNvSpPr>
             <a:spLocks noGrp="1"/>
           </p:cNvSpPr>
@@ -1060,7 +1060,7 @@
       </p:sp>
       <p:sp>
         <p:nvSpPr>
-          <p:cNvPr id="67" name="PlaceHolder 4"/>
+          <p:cNvPr id="64" name="PlaceHolder 4"/>
           <p:cNvSpPr>
             <a:spLocks noGrp="1"/>
           </p:cNvSpPr>
@@ -1112,7 +1112,7 @@
       </p:grpSpPr>
       <p:sp>
         <p:nvSpPr>
-          <p:cNvPr id="14" name="PlaceHolder 1"/>
+          <p:cNvPr id="11" name="PlaceHolder 1"/>
           <p:cNvSpPr>
             <a:spLocks noGrp="1"/>
           </p:cNvSpPr>
@@ -1141,7 +1141,7 @@
       </p:sp>
       <p:sp>
         <p:nvSpPr>
-          <p:cNvPr id="15" name="PlaceHolder 2"/>
+          <p:cNvPr id="12" name="PlaceHolder 2"/>
           <p:cNvSpPr>
             <a:spLocks noGrp="1"/>
           </p:cNvSpPr>
@@ -1192,7 +1192,7 @@
       </p:grpSpPr>
       <p:sp>
         <p:nvSpPr>
-          <p:cNvPr id="68" name="PlaceHolder 1"/>
+          <p:cNvPr id="65" name="PlaceHolder 1"/>
           <p:cNvSpPr>
             <a:spLocks noGrp="1"/>
           </p:cNvSpPr>
@@ -1221,7 +1221,7 @@
       </p:sp>
       <p:sp>
         <p:nvSpPr>
-          <p:cNvPr id="69" name="PlaceHolder 2"/>
+          <p:cNvPr id="66" name="PlaceHolder 2"/>
           <p:cNvSpPr>
             <a:spLocks noGrp="1"/>
           </p:cNvSpPr>
@@ -1251,7 +1251,7 @@
       </p:sp>
       <p:sp>
         <p:nvSpPr>
-          <p:cNvPr id="70" name="PlaceHolder 3"/>
+          <p:cNvPr id="67" name="PlaceHolder 3"/>
           <p:cNvSpPr>
             <a:spLocks noGrp="1"/>
           </p:cNvSpPr>
@@ -1281,7 +1281,7 @@
       </p:sp>
       <p:sp>
         <p:nvSpPr>
-          <p:cNvPr id="71" name="PlaceHolder 4"/>
+          <p:cNvPr id="68" name="PlaceHolder 4"/>
           <p:cNvSpPr>
             <a:spLocks noGrp="1"/>
           </p:cNvSpPr>
@@ -1333,7 +1333,7 @@
       </p:grpSpPr>
       <p:sp>
         <p:nvSpPr>
-          <p:cNvPr id="72" name="PlaceHolder 1"/>
+          <p:cNvPr id="69" name="PlaceHolder 1"/>
           <p:cNvSpPr>
             <a:spLocks noGrp="1"/>
           </p:cNvSpPr>
@@ -1362,7 +1362,7 @@
       </p:sp>
       <p:sp>
         <p:nvSpPr>
-          <p:cNvPr id="73" name="PlaceHolder 2"/>
+          <p:cNvPr id="70" name="PlaceHolder 2"/>
           <p:cNvSpPr>
             <a:spLocks noGrp="1"/>
           </p:cNvSpPr>
@@ -1392,7 +1392,7 @@
       </p:sp>
       <p:sp>
         <p:nvSpPr>
-          <p:cNvPr id="74" name="PlaceHolder 3"/>
+          <p:cNvPr id="71" name="PlaceHolder 3"/>
           <p:cNvSpPr>
             <a:spLocks noGrp="1"/>
           </p:cNvSpPr>
@@ -1422,7 +1422,7 @@
       </p:sp>
       <p:sp>
         <p:nvSpPr>
-          <p:cNvPr id="75" name="PlaceHolder 4"/>
+          <p:cNvPr id="72" name="PlaceHolder 4"/>
           <p:cNvSpPr>
             <a:spLocks noGrp="1"/>
           </p:cNvSpPr>
@@ -1474,7 +1474,7 @@
       </p:grpSpPr>
       <p:sp>
         <p:nvSpPr>
-          <p:cNvPr id="76" name="PlaceHolder 1"/>
+          <p:cNvPr id="73" name="PlaceHolder 1"/>
           <p:cNvSpPr>
             <a:spLocks noGrp="1"/>
           </p:cNvSpPr>
@@ -1503,7 +1503,7 @@
       </p:sp>
       <p:sp>
         <p:nvSpPr>
-          <p:cNvPr id="77" name="PlaceHolder 2"/>
+          <p:cNvPr id="74" name="PlaceHolder 2"/>
           <p:cNvSpPr>
             <a:spLocks noGrp="1"/>
           </p:cNvSpPr>
@@ -1533,7 +1533,7 @@
       </p:sp>
       <p:sp>
         <p:nvSpPr>
-          <p:cNvPr id="78" name="PlaceHolder 3"/>
+          <p:cNvPr id="75" name="PlaceHolder 3"/>
           <p:cNvSpPr>
             <a:spLocks noGrp="1"/>
           </p:cNvSpPr>
@@ -1585,7 +1585,7 @@
       </p:grpSpPr>
       <p:sp>
         <p:nvSpPr>
-          <p:cNvPr id="79" name="PlaceHolder 1"/>
+          <p:cNvPr id="76" name="PlaceHolder 1"/>
           <p:cNvSpPr>
             <a:spLocks noGrp="1"/>
           </p:cNvSpPr>
@@ -1614,7 +1614,7 @@
       </p:sp>
       <p:sp>
         <p:nvSpPr>
-          <p:cNvPr id="80" name="PlaceHolder 2"/>
+          <p:cNvPr id="77" name="PlaceHolder 2"/>
           <p:cNvSpPr>
             <a:spLocks noGrp="1"/>
           </p:cNvSpPr>
@@ -1644,7 +1644,7 @@
       </p:sp>
       <p:sp>
         <p:nvSpPr>
-          <p:cNvPr id="81" name="PlaceHolder 3"/>
+          <p:cNvPr id="78" name="PlaceHolder 3"/>
           <p:cNvSpPr>
             <a:spLocks noGrp="1"/>
           </p:cNvSpPr>
@@ -1674,7 +1674,7 @@
       </p:sp>
       <p:sp>
         <p:nvSpPr>
-          <p:cNvPr id="82" name="PlaceHolder 4"/>
+          <p:cNvPr id="79" name="PlaceHolder 4"/>
           <p:cNvSpPr>
             <a:spLocks noGrp="1"/>
           </p:cNvSpPr>
@@ -1704,7 +1704,7 @@
       </p:sp>
       <p:sp>
         <p:nvSpPr>
-          <p:cNvPr id="83" name="PlaceHolder 5"/>
+          <p:cNvPr id="80" name="PlaceHolder 5"/>
           <p:cNvSpPr>
             <a:spLocks noGrp="1"/>
           </p:cNvSpPr>
@@ -1756,7 +1756,7 @@
       </p:grpSpPr>
       <p:sp>
         <p:nvSpPr>
-          <p:cNvPr id="84" name="PlaceHolder 1"/>
+          <p:cNvPr id="81" name="PlaceHolder 1"/>
           <p:cNvSpPr>
             <a:spLocks noGrp="1"/>
           </p:cNvSpPr>
@@ -1785,7 +1785,7 @@
       </p:sp>
       <p:sp>
         <p:nvSpPr>
-          <p:cNvPr id="85" name="PlaceHolder 2"/>
+          <p:cNvPr id="82" name="PlaceHolder 2"/>
           <p:cNvSpPr>
             <a:spLocks noGrp="1"/>
           </p:cNvSpPr>
@@ -1815,7 +1815,7 @@
       </p:sp>
       <p:sp>
         <p:nvSpPr>
-          <p:cNvPr id="86" name="PlaceHolder 3"/>
+          <p:cNvPr id="83" name="PlaceHolder 3"/>
           <p:cNvSpPr>
             <a:spLocks noGrp="1"/>
           </p:cNvSpPr>
@@ -1845,7 +1845,7 @@
       </p:sp>
       <p:sp>
         <p:nvSpPr>
-          <p:cNvPr id="87" name="PlaceHolder 4"/>
+          <p:cNvPr id="84" name="PlaceHolder 4"/>
           <p:cNvSpPr>
             <a:spLocks noGrp="1"/>
           </p:cNvSpPr>
@@ -1875,7 +1875,7 @@
       </p:sp>
       <p:sp>
         <p:nvSpPr>
-          <p:cNvPr id="88" name="PlaceHolder 5"/>
+          <p:cNvPr id="85" name="PlaceHolder 5"/>
           <p:cNvSpPr>
             <a:spLocks noGrp="1"/>
           </p:cNvSpPr>
@@ -1905,7 +1905,7 @@
       </p:sp>
       <p:sp>
         <p:nvSpPr>
-          <p:cNvPr id="89" name="PlaceHolder 6"/>
+          <p:cNvPr id="86" name="PlaceHolder 6"/>
           <p:cNvSpPr>
             <a:spLocks noGrp="1"/>
           </p:cNvSpPr>
@@ -1935,7 +1935,7 @@
       </p:sp>
       <p:sp>
         <p:nvSpPr>
-          <p:cNvPr id="90" name="PlaceHolder 7"/>
+          <p:cNvPr id="87" name="PlaceHolder 7"/>
           <p:cNvSpPr>
             <a:spLocks noGrp="1"/>
           </p:cNvSpPr>
@@ -1987,7 +1987,7 @@
       </p:grpSpPr>
       <p:sp>
         <p:nvSpPr>
-          <p:cNvPr id="16" name="PlaceHolder 1"/>
+          <p:cNvPr id="13" name="PlaceHolder 1"/>
           <p:cNvSpPr>
             <a:spLocks noGrp="1"/>
           </p:cNvSpPr>
@@ -2016,7 +2016,7 @@
       </p:sp>
       <p:sp>
         <p:nvSpPr>
-          <p:cNvPr id="17" name="PlaceHolder 2"/>
+          <p:cNvPr id="14" name="PlaceHolder 2"/>
           <p:cNvSpPr>
             <a:spLocks noGrp="1"/>
           </p:cNvSpPr>
@@ -2068,7 +2068,7 @@
       </p:grpSpPr>
       <p:sp>
         <p:nvSpPr>
-          <p:cNvPr id="18" name="PlaceHolder 1"/>
+          <p:cNvPr id="15" name="PlaceHolder 1"/>
           <p:cNvSpPr>
             <a:spLocks noGrp="1"/>
           </p:cNvSpPr>
@@ -2097,7 +2097,7 @@
       </p:sp>
       <p:sp>
         <p:nvSpPr>
-          <p:cNvPr id="19" name="PlaceHolder 2"/>
+          <p:cNvPr id="16" name="PlaceHolder 2"/>
           <p:cNvSpPr>
             <a:spLocks noGrp="1"/>
           </p:cNvSpPr>
@@ -2127,7 +2127,7 @@
       </p:sp>
       <p:sp>
         <p:nvSpPr>
-          <p:cNvPr id="20" name="PlaceHolder 3"/>
+          <p:cNvPr id="17" name="PlaceHolder 3"/>
           <p:cNvSpPr>
             <a:spLocks noGrp="1"/>
           </p:cNvSpPr>
@@ -2179,7 +2179,7 @@
       </p:grpSpPr>
       <p:sp>
         <p:nvSpPr>
-          <p:cNvPr id="21" name="PlaceHolder 1"/>
+          <p:cNvPr id="18" name="PlaceHolder 1"/>
           <p:cNvSpPr>
             <a:spLocks noGrp="1"/>
           </p:cNvSpPr>
@@ -2230,7 +2230,7 @@
       </p:grpSpPr>
       <p:sp>
         <p:nvSpPr>
-          <p:cNvPr id="22" name="PlaceHolder 1"/>
+          <p:cNvPr id="19" name="PlaceHolder 1"/>
           <p:cNvSpPr>
             <a:spLocks noGrp="1"/>
           </p:cNvSpPr>
@@ -2281,7 +2281,7 @@
       </p:grpSpPr>
       <p:sp>
         <p:nvSpPr>
-          <p:cNvPr id="23" name="PlaceHolder 1"/>
+          <p:cNvPr id="20" name="PlaceHolder 1"/>
           <p:cNvSpPr>
             <a:spLocks noGrp="1"/>
           </p:cNvSpPr>
@@ -2310,7 +2310,7 @@
       </p:sp>
       <p:sp>
         <p:nvSpPr>
-          <p:cNvPr id="24" name="PlaceHolder 2"/>
+          <p:cNvPr id="21" name="PlaceHolder 2"/>
           <p:cNvSpPr>
             <a:spLocks noGrp="1"/>
           </p:cNvSpPr>
@@ -2340,7 +2340,7 @@
       </p:sp>
       <p:sp>
         <p:nvSpPr>
-          <p:cNvPr id="25" name="PlaceHolder 3"/>
+          <p:cNvPr id="22" name="PlaceHolder 3"/>
           <p:cNvSpPr>
             <a:spLocks noGrp="1"/>
           </p:cNvSpPr>
@@ -2370,7 +2370,7 @@
       </p:sp>
       <p:sp>
         <p:nvSpPr>
-          <p:cNvPr id="26" name="PlaceHolder 4"/>
+          <p:cNvPr id="23" name="PlaceHolder 4"/>
           <p:cNvSpPr>
             <a:spLocks noGrp="1"/>
           </p:cNvSpPr>
@@ -2422,7 +2422,7 @@
       </p:grpSpPr>
       <p:sp>
         <p:nvSpPr>
-          <p:cNvPr id="27" name="PlaceHolder 1"/>
+          <p:cNvPr id="24" name="PlaceHolder 1"/>
           <p:cNvSpPr>
             <a:spLocks noGrp="1"/>
           </p:cNvSpPr>
@@ -2451,7 +2451,7 @@
       </p:sp>
       <p:sp>
         <p:nvSpPr>
-          <p:cNvPr id="28" name="PlaceHolder 2"/>
+          <p:cNvPr id="25" name="PlaceHolder 2"/>
           <p:cNvSpPr>
             <a:spLocks noGrp="1"/>
           </p:cNvSpPr>
@@ -2481,7 +2481,7 @@
       </p:sp>
       <p:sp>
         <p:nvSpPr>
-          <p:cNvPr id="29" name="PlaceHolder 3"/>
+          <p:cNvPr id="26" name="PlaceHolder 3"/>
           <p:cNvSpPr>
             <a:spLocks noGrp="1"/>
           </p:cNvSpPr>
@@ -2511,7 +2511,7 @@
       </p:sp>
       <p:sp>
         <p:nvSpPr>
-          <p:cNvPr id="30" name="PlaceHolder 4"/>
+          <p:cNvPr id="27" name="PlaceHolder 4"/>
           <p:cNvSpPr>
             <a:spLocks noGrp="1"/>
           </p:cNvSpPr>
@@ -2563,7 +2563,7 @@
       </p:grpSpPr>
       <p:sp>
         <p:nvSpPr>
-          <p:cNvPr id="31" name="PlaceHolder 1"/>
+          <p:cNvPr id="28" name="PlaceHolder 1"/>
           <p:cNvSpPr>
             <a:spLocks noGrp="1"/>
           </p:cNvSpPr>
@@ -2592,7 +2592,7 @@
       </p:sp>
       <p:sp>
         <p:nvSpPr>
-          <p:cNvPr id="32" name="PlaceHolder 2"/>
+          <p:cNvPr id="29" name="PlaceHolder 2"/>
           <p:cNvSpPr>
             <a:spLocks noGrp="1"/>
           </p:cNvSpPr>
@@ -2622,7 +2622,7 @@
       </p:sp>
       <p:sp>
         <p:nvSpPr>
-          <p:cNvPr id="33" name="PlaceHolder 3"/>
+          <p:cNvPr id="30" name="PlaceHolder 3"/>
           <p:cNvSpPr>
             <a:spLocks noGrp="1"/>
           </p:cNvSpPr>
@@ -2652,7 +2652,7 @@
       </p:sp>
       <p:sp>
         <p:nvSpPr>
-          <p:cNvPr id="34" name="PlaceHolder 4"/>
+          <p:cNvPr id="31" name="PlaceHolder 4"/>
           <p:cNvSpPr>
             <a:spLocks noGrp="1"/>
           </p:cNvSpPr>
@@ -2722,7 +2722,7 @@
         <p:spPr>
           <a:xfrm>
             <a:off x="0" y="0"/>
-            <a:ext cx="9142920" cy="6856920"/>
+            <a:ext cx="9142560" cy="6856560"/>
           </a:xfrm>
           <a:prstGeom prst="rect">
             <a:avLst/>
@@ -2741,7 +2741,7 @@
         <p:spPr>
           <a:xfrm>
             <a:off x="250920" y="6445080"/>
-            <a:ext cx="647640" cy="367200"/>
+            <a:ext cx="647280" cy="366840"/>
           </a:xfrm>
           <a:prstGeom prst="rect">
             <a:avLst/>
@@ -2768,7 +2768,7 @@
                 <a:spcPts val="901"/>
               </a:spcBef>
             </a:pPr>
-            <a:fld id="{26DF09A6-2F79-4BE4-9401-BA5A3EF0112C}" type="slidenum">
+            <a:fld id="{C7F4961A-EDD7-4791-8E48-DB4C1C98F63F}" type="slidenum">
               <a:rPr b="1" lang="de-DE" sz="1800" spc="-1" strike="noStrike">
                 <a:solidFill>
                   <a:srgbClr val="000000"/>
@@ -2776,7 +2776,7 @@
                 <a:latin typeface="Arial"/>
                 <a:ea typeface="DejaVu Sans"/>
               </a:rPr>
-              <a:t>4</a:t>
+              <a:t>&lt;Foliennummer&gt;</a:t>
             </a:fld>
             <a:endParaRPr b="0" lang="de-DE" sz="1800" spc="-1" strike="noStrike">
               <a:latin typeface="Arial"/>
@@ -2797,7 +2797,7 @@
         <p:spPr>
           <a:xfrm>
             <a:off x="8061120" y="260640"/>
-            <a:ext cx="862920" cy="670680"/>
+            <a:ext cx="862560" cy="670320"/>
           </a:xfrm>
           <a:prstGeom prst="rect">
             <a:avLst/>
@@ -2820,7 +2820,7 @@
         <p:spPr>
           <a:xfrm>
             <a:off x="6948360" y="539640"/>
-            <a:ext cx="845640" cy="389880"/>
+            <a:ext cx="845280" cy="389520"/>
           </a:xfrm>
           <a:prstGeom prst="rect">
             <a:avLst/>
@@ -2830,112 +2830,9 @@
           </a:ln>
         </p:spPr>
       </p:pic>
-      <p:grpSp>
-        <p:nvGrpSpPr>
-          <p:cNvPr id="4" name="Group 2"/>
-          <p:cNvGrpSpPr/>
-          <p:nvPr/>
-        </p:nvGrpSpPr>
-        <p:grpSpPr>
-          <a:xfrm>
-            <a:off x="71280" y="2143080"/>
-            <a:ext cx="9357120" cy="4642200"/>
-            <a:chOff x="71280" y="2143080"/>
-            <a:chExt cx="9357120" cy="4642200"/>
-          </a:xfrm>
-        </p:grpSpPr>
-        <p:sp>
-          <p:nvSpPr>
-            <p:cNvPr id="5" name="CustomShape 3"/>
-            <p:cNvSpPr/>
-            <p:nvPr/>
-          </p:nvSpPr>
-          <p:spPr>
-            <a:xfrm>
-              <a:off x="71280" y="2143080"/>
-              <a:ext cx="9357120" cy="4642200"/>
-            </a:xfrm>
-            <a:prstGeom prst="rect">
-              <a:avLst/>
-            </a:prstGeom>
-            <a:solidFill>
-              <a:srgbClr val="92d050"/>
-            </a:solidFill>
-            <a:ln>
-              <a:solidFill>
-                <a:srgbClr val="ff99ff"/>
-              </a:solidFill>
-              <a:round/>
-            </a:ln>
-          </p:spPr>
-          <p:style>
-            <a:lnRef idx="2">
-              <a:schemeClr val="accent1">
-                <a:shade val="50000"/>
-              </a:schemeClr>
-            </a:lnRef>
-            <a:fillRef idx="1">
-              <a:schemeClr val="accent1"/>
-            </a:fillRef>
-            <a:effectRef idx="0">
-              <a:schemeClr val="accent1"/>
-            </a:effectRef>
-            <a:fontRef idx="minor"/>
-          </p:style>
-        </p:sp>
-        <p:sp>
-          <p:nvSpPr>
-            <p:cNvPr id="6" name="CustomShape 4"/>
-            <p:cNvSpPr/>
-            <p:nvPr/>
-          </p:nvSpPr>
-          <p:spPr>
-            <a:xfrm>
-              <a:off x="1500120" y="4282920"/>
-              <a:ext cx="6285600" cy="638280"/>
-            </a:xfrm>
-            <a:prstGeom prst="rect">
-              <a:avLst/>
-            </a:prstGeom>
-            <a:noFill/>
-            <a:ln>
-              <a:noFill/>
-            </a:ln>
-          </p:spPr>
-          <p:style>
-            <a:lnRef idx="0"/>
-            <a:fillRef idx="0"/>
-            <a:effectRef idx="0"/>
-            <a:fontRef idx="minor"/>
-          </p:style>
-          <p:txBody>
-            <a:bodyPr lIns="90000" rIns="90000" tIns="45000" bIns="45000"/>
-            <a:p>
-              <a:pPr>
-                <a:lnSpc>
-                  <a:spcPct val="100000"/>
-                </a:lnSpc>
-              </a:pPr>
-              <a:r>
-                <a:rPr b="0" lang="de-DE" sz="1800" spc="-1" strike="noStrike">
-                  <a:solidFill>
-                    <a:srgbClr val="000000"/>
-                  </a:solidFill>
-                  <a:latin typeface="Arial"/>
-                  <a:ea typeface="DejaVu Sans"/>
-                </a:rPr>
-                <a:t>Fügen Sie auf der Masterfolie ein frei wählbares Bild ein (z.B. passend zum Vortrag)</a:t>
-              </a:r>
-              <a:endParaRPr b="0" lang="de-DE" sz="1800" spc="-1" strike="noStrike">
-                <a:latin typeface="Arial"/>
-              </a:endParaRPr>
-            </a:p>
-          </p:txBody>
-        </p:sp>
-      </p:grpSp>
       <p:pic>
         <p:nvPicPr>
-          <p:cNvPr id="7" name="Picture 9" descr=""/>
+          <p:cNvPr id="4" name="Picture 9" descr=""/>
           <p:cNvPicPr/>
           <p:nvPr/>
         </p:nvPicPr>
@@ -2946,7 +2843,7 @@
         <p:spPr>
           <a:xfrm>
             <a:off x="0" y="-3240"/>
-            <a:ext cx="9142920" cy="6869520"/>
+            <a:ext cx="9142560" cy="6869160"/>
           </a:xfrm>
           <a:prstGeom prst="rect">
             <a:avLst/>
@@ -2958,14 +2855,14 @@
       </p:pic>
       <p:sp>
         <p:nvSpPr>
-          <p:cNvPr id="8" name="CustomShape 5"/>
+          <p:cNvPr id="5" name="CustomShape 2"/>
           <p:cNvSpPr/>
           <p:nvPr/>
         </p:nvSpPr>
         <p:spPr>
           <a:xfrm>
             <a:off x="385920" y="3290040"/>
-            <a:ext cx="8658720" cy="304920"/>
+            <a:ext cx="8658360" cy="304560"/>
           </a:xfrm>
           <a:prstGeom prst="rect">
             <a:avLst/>
@@ -3007,14 +2904,14 @@
       </p:sp>
       <p:sp>
         <p:nvSpPr>
-          <p:cNvPr id="9" name="CustomShape 6"/>
+          <p:cNvPr id="6" name="CustomShape 3"/>
           <p:cNvSpPr/>
           <p:nvPr/>
         </p:nvSpPr>
         <p:spPr>
           <a:xfrm>
             <a:off x="7318440" y="6497640"/>
-            <a:ext cx="1726200" cy="243000"/>
+            <a:ext cx="1725840" cy="242640"/>
           </a:xfrm>
           <a:prstGeom prst="rect">
             <a:avLst/>
@@ -3056,7 +2953,7 @@
       </p:sp>
       <p:pic>
         <p:nvPicPr>
-          <p:cNvPr id="10" name="Picture 11" descr=""/>
+          <p:cNvPr id="7" name="Picture 11" descr=""/>
           <p:cNvPicPr/>
           <p:nvPr/>
         </p:nvPicPr>
@@ -3067,7 +2964,7 @@
         <p:spPr>
           <a:xfrm>
             <a:off x="396720" y="404640"/>
-            <a:ext cx="1185840" cy="546840"/>
+            <a:ext cx="1185480" cy="546480"/>
           </a:xfrm>
           <a:prstGeom prst="rect">
             <a:avLst/>
@@ -3079,14 +2976,14 @@
       </p:pic>
       <p:sp>
         <p:nvSpPr>
-          <p:cNvPr id="11" name="CustomShape 7"/>
+          <p:cNvPr id="8" name="CustomShape 4"/>
           <p:cNvSpPr/>
           <p:nvPr/>
         </p:nvSpPr>
         <p:spPr>
           <a:xfrm>
             <a:off x="396720" y="6552360"/>
-            <a:ext cx="3669120" cy="121320"/>
+            <a:ext cx="3668760" cy="120960"/>
           </a:xfrm>
           <a:prstGeom prst="rect">
             <a:avLst/>
@@ -3128,7 +3025,7 @@
       </p:sp>
       <p:sp>
         <p:nvSpPr>
-          <p:cNvPr id="12" name="PlaceHolder 8"/>
+          <p:cNvPr id="9" name="PlaceHolder 5"/>
           <p:cNvSpPr>
             <a:spLocks noGrp="1"/>
           </p:cNvSpPr>
@@ -3139,7 +3036,7 @@
         <p:spPr>
           <a:xfrm>
             <a:off x="457200" y="273600"/>
-            <a:ext cx="8228880" cy="1144440"/>
+            <a:ext cx="8229240" cy="1144800"/>
           </a:xfrm>
           <a:prstGeom prst="rect">
             <a:avLst/>
@@ -3148,21 +3045,22 @@
         <p:txBody>
           <a:bodyPr lIns="0" rIns="0" tIns="0" bIns="0" anchor="ctr"/>
           <a:p>
-            <a:r>
-              <a:rPr b="0" lang="de-DE" sz="1800" spc="-1" strike="noStrike">
+            <a:pPr algn="ctr"/>
+            <a:r>
+              <a:rPr b="0" lang="de-DE" sz="4400" spc="-1" strike="noStrike">
                 <a:latin typeface="Arial"/>
               </a:rPr>
               <a:t>Format des Titeltextes durch Klicken bearbeiten</a:t>
             </a:r>
-            <a:endParaRPr b="0" lang="de-DE" sz="1800" spc="-1" strike="noStrike">
-              <a:latin typeface="Arial"/>
-            </a:endParaRPr>
-          </a:p>
-        </p:txBody>
-      </p:sp>
-      <p:sp>
-        <p:nvSpPr>
-          <p:cNvPr id="13" name="PlaceHolder 9"/>
+            <a:endParaRPr b="0" lang="de-DE" sz="4400" spc="-1" strike="noStrike">
+              <a:latin typeface="Arial"/>
+            </a:endParaRPr>
+          </a:p>
+        </p:txBody>
+      </p:sp>
+      <p:sp>
+        <p:nvSpPr>
+          <p:cNvPr id="10" name="PlaceHolder 6"/>
           <p:cNvSpPr>
             <a:spLocks noGrp="1"/>
           </p:cNvSpPr>
@@ -3173,7 +3071,7 @@
         <p:spPr>
           <a:xfrm>
             <a:off x="457200" y="1604520"/>
-            <a:ext cx="8228880" cy="3976920"/>
+            <a:ext cx="8229240" cy="3977280"/>
           </a:xfrm>
           <a:prstGeom prst="rect">
             <a:avLst/>
@@ -3196,12 +3094,12 @@
               <a:buChar char=""/>
             </a:pPr>
             <a:r>
-              <a:rPr b="0" lang="de-DE" sz="1800" spc="-1" strike="noStrike">
+              <a:rPr b="0" lang="de-DE" sz="3200" spc="-1" strike="noStrike">
                 <a:latin typeface="Arial"/>
               </a:rPr>
               <a:t>Format des Gliederungstextes durch Klicken bearbeiten</a:t>
             </a:r>
-            <a:endParaRPr b="0" lang="de-DE" sz="1800" spc="-1" strike="noStrike">
+            <a:endParaRPr b="0" lang="de-DE" sz="3200" spc="-1" strike="noStrike">
               <a:latin typeface="Arial"/>
             </a:endParaRPr>
           </a:p>
@@ -3218,12 +3116,12 @@
               <a:buChar char=""/>
             </a:pPr>
             <a:r>
-              <a:rPr b="0" lang="de-DE" sz="1800" spc="-1" strike="noStrike">
+              <a:rPr b="0" lang="de-DE" sz="2800" spc="-1" strike="noStrike">
                 <a:latin typeface="Arial"/>
               </a:rPr>
               <a:t>Zweite Gliederungsebene</a:t>
             </a:r>
-            <a:endParaRPr b="0" lang="de-DE" sz="1800" spc="-1" strike="noStrike">
+            <a:endParaRPr b="0" lang="de-DE" sz="2800" spc="-1" strike="noStrike">
               <a:latin typeface="Arial"/>
             </a:endParaRPr>
           </a:p>
@@ -3240,12 +3138,12 @@
               <a:buChar char=""/>
             </a:pPr>
             <a:r>
-              <a:rPr b="0" lang="de-DE" sz="1800" spc="-1" strike="noStrike">
+              <a:rPr b="0" lang="de-DE" sz="2400" spc="-1" strike="noStrike">
                 <a:latin typeface="Arial"/>
               </a:rPr>
               <a:t>Dritte Gliederungsebene</a:t>
             </a:r>
-            <a:endParaRPr b="0" lang="de-DE" sz="1800" spc="-1" strike="noStrike">
+            <a:endParaRPr b="0" lang="de-DE" sz="2400" spc="-1" strike="noStrike">
               <a:latin typeface="Arial"/>
             </a:endParaRPr>
           </a:p>
@@ -3262,12 +3160,12 @@
               <a:buChar char=""/>
             </a:pPr>
             <a:r>
-              <a:rPr b="0" lang="de-DE" sz="1800" spc="-1" strike="noStrike">
+              <a:rPr b="0" lang="de-DE" sz="2000" spc="-1" strike="noStrike">
                 <a:latin typeface="Arial"/>
               </a:rPr>
               <a:t>Vierte Gliederungsebene</a:t>
             </a:r>
-            <a:endParaRPr b="0" lang="de-DE" sz="1800" spc="-1" strike="noStrike">
+            <a:endParaRPr b="0" lang="de-DE" sz="2000" spc="-1" strike="noStrike">
               <a:latin typeface="Arial"/>
             </a:endParaRPr>
           </a:p>
@@ -3284,12 +3182,12 @@
               <a:buChar char=""/>
             </a:pPr>
             <a:r>
-              <a:rPr b="0" lang="de-DE" sz="1800" spc="-1" strike="noStrike">
+              <a:rPr b="0" lang="de-DE" sz="2000" spc="-1" strike="noStrike">
                 <a:latin typeface="Arial"/>
               </a:rPr>
               <a:t>Fünfte Gliederungsebene</a:t>
             </a:r>
-            <a:endParaRPr b="0" lang="de-DE" sz="1800" spc="-1" strike="noStrike">
+            <a:endParaRPr b="0" lang="de-DE" sz="2000" spc="-1" strike="noStrike">
               <a:latin typeface="Arial"/>
             </a:endParaRPr>
           </a:p>
@@ -3306,12 +3204,12 @@
               <a:buChar char=""/>
             </a:pPr>
             <a:r>
-              <a:rPr b="0" lang="de-DE" sz="1800" spc="-1" strike="noStrike">
+              <a:rPr b="0" lang="de-DE" sz="2000" spc="-1" strike="noStrike">
                 <a:latin typeface="Arial"/>
               </a:rPr>
               <a:t>Sechste Gliederungsebene</a:t>
             </a:r>
-            <a:endParaRPr b="0" lang="de-DE" sz="1800" spc="-1" strike="noStrike">
+            <a:endParaRPr b="0" lang="de-DE" sz="2000" spc="-1" strike="noStrike">
               <a:latin typeface="Arial"/>
             </a:endParaRPr>
           </a:p>
@@ -3328,12 +3226,12 @@
               <a:buChar char=""/>
             </a:pPr>
             <a:r>
-              <a:rPr b="0" lang="de-DE" sz="1800" spc="-1" strike="noStrike">
+              <a:rPr b="0" lang="de-DE" sz="2000" spc="-1" strike="noStrike">
                 <a:latin typeface="Arial"/>
               </a:rPr>
               <a:t>Siebte Gliederungsebene</a:t>
             </a:r>
-            <a:endParaRPr b="0" lang="de-DE" sz="1800" spc="-1" strike="noStrike">
+            <a:endParaRPr b="0" lang="de-DE" sz="2000" spc="-1" strike="noStrike">
               <a:latin typeface="Arial"/>
             </a:endParaRPr>
           </a:p>
@@ -3385,7 +3283,7 @@
       </p:grpSpPr>
       <p:pic>
         <p:nvPicPr>
-          <p:cNvPr id="50" name="Picture 9" descr=""/>
+          <p:cNvPr id="47" name="Picture 9" descr=""/>
           <p:cNvPicPr/>
           <p:nvPr/>
         </p:nvPicPr>
@@ -3396,7 +3294,7 @@
         <p:spPr>
           <a:xfrm>
             <a:off x="0" y="0"/>
-            <a:ext cx="9142920" cy="6856920"/>
+            <a:ext cx="9142560" cy="6856560"/>
           </a:xfrm>
           <a:prstGeom prst="rect">
             <a:avLst/>
@@ -3408,14 +3306,14 @@
       </p:pic>
       <p:sp>
         <p:nvSpPr>
-          <p:cNvPr id="51" name="CustomShape 1"/>
+          <p:cNvPr id="48" name="CustomShape 1"/>
           <p:cNvSpPr/>
           <p:nvPr/>
         </p:nvSpPr>
         <p:spPr>
           <a:xfrm>
             <a:off x="250920" y="6445080"/>
-            <a:ext cx="647640" cy="367200"/>
+            <a:ext cx="647280" cy="366840"/>
           </a:xfrm>
           <a:prstGeom prst="rect">
             <a:avLst/>
@@ -3442,7 +3340,7 @@
                 <a:spcPts val="901"/>
               </a:spcBef>
             </a:pPr>
-            <a:fld id="{AD68F5DE-193B-453D-9BCD-40CB2A47E483}" type="slidenum">
+            <a:fld id="{5B9C6220-AFDC-4B05-9E23-11B7B5B25A0E}" type="slidenum">
               <a:rPr b="1" lang="de-DE" sz="1800" spc="-1" strike="noStrike">
                 <a:solidFill>
                   <a:srgbClr val="000000"/>
@@ -3460,7 +3358,7 @@
       </p:sp>
       <p:pic>
         <p:nvPicPr>
-          <p:cNvPr id="52" name="Picture 13" descr=""/>
+          <p:cNvPr id="49" name="Picture 13" descr=""/>
           <p:cNvPicPr/>
           <p:nvPr/>
         </p:nvPicPr>
@@ -3471,7 +3369,7 @@
         <p:spPr>
           <a:xfrm>
             <a:off x="8028360" y="287640"/>
-            <a:ext cx="845640" cy="389880"/>
+            <a:ext cx="845280" cy="389520"/>
           </a:xfrm>
           <a:prstGeom prst="rect">
             <a:avLst/>
@@ -3483,7 +3381,7 @@
       </p:pic>
       <p:sp>
         <p:nvSpPr>
-          <p:cNvPr id="53" name="PlaceHolder 2"/>
+          <p:cNvPr id="50" name="PlaceHolder 2"/>
           <p:cNvSpPr>
             <a:spLocks noGrp="1"/>
           </p:cNvSpPr>
@@ -3508,79 +3406,49 @@
               <a:rPr b="0" lang="de-DE" sz="4400" spc="-1" strike="noStrike">
                 <a:latin typeface="Arial"/>
               </a:rPr>
-              <a:t>For</a:t>
+              <a:t>Format </a:t>
             </a:r>
             <a:r>
               <a:rPr b="0" lang="de-DE" sz="4400" spc="-1" strike="noStrike">
                 <a:latin typeface="Arial"/>
               </a:rPr>
-              <a:t>mat </a:t>
+              <a:t>des </a:t>
             </a:r>
             <a:r>
               <a:rPr b="0" lang="de-DE" sz="4400" spc="-1" strike="noStrike">
                 <a:latin typeface="Arial"/>
               </a:rPr>
-              <a:t>des </a:t>
+              <a:t>Titeltext</a:t>
             </a:r>
             <a:r>
               <a:rPr b="0" lang="de-DE" sz="4400" spc="-1" strike="noStrike">
                 <a:latin typeface="Arial"/>
               </a:rPr>
-              <a:t>Titel</a:t>
+              <a:t>es </a:t>
             </a:r>
             <a:r>
               <a:rPr b="0" lang="de-DE" sz="4400" spc="-1" strike="noStrike">
                 <a:latin typeface="Arial"/>
               </a:rPr>
-              <a:t>text</a:t>
+              <a:t>durch </a:t>
             </a:r>
             <a:r>
               <a:rPr b="0" lang="de-DE" sz="4400" spc="-1" strike="noStrike">
                 <a:latin typeface="Arial"/>
               </a:rPr>
-              <a:t>es </a:t>
+              <a:t>Klicken </a:t>
             </a:r>
             <a:r>
               <a:rPr b="0" lang="de-DE" sz="4400" spc="-1" strike="noStrike">
                 <a:latin typeface="Arial"/>
               </a:rPr>
-              <a:t>dur</a:t>
+              <a:t>bearbeit</a:t>
             </a:r>
             <a:r>
               <a:rPr b="0" lang="de-DE" sz="4400" spc="-1" strike="noStrike">
                 <a:latin typeface="Arial"/>
               </a:rPr>
-              <a:t>ch </a:t>
-            </a:r>
-            <a:r>
-              <a:rPr b="0" lang="de-DE" sz="4400" spc="-1" strike="noStrike">
-                <a:latin typeface="Arial"/>
-              </a:rPr>
-              <a:t>Klic</a:t>
-            </a:r>
-            <a:r>
-              <a:rPr b="0" lang="de-DE" sz="4400" spc="-1" strike="noStrike">
-                <a:latin typeface="Arial"/>
-              </a:rPr>
-              <a:t>ken </a:t>
-            </a:r>
-            <a:r>
-              <a:rPr b="0" lang="de-DE" sz="4400" spc="-1" strike="noStrike">
-                <a:latin typeface="Arial"/>
-              </a:rPr>
-              <a:t>bea</a:t>
-            </a:r>
-            <a:r>
-              <a:rPr b="0" lang="de-DE" sz="4400" spc="-1" strike="noStrike">
-                <a:latin typeface="Arial"/>
-              </a:rPr>
-              <a:t>rbei</a:t>
-            </a:r>
-            <a:r>
-              <a:rPr b="0" lang="de-DE" sz="4400" spc="-1" strike="noStrike">
-                <a:latin typeface="Arial"/>
-              </a:rPr>
-              <a:t>ten</a:t>
+              <a:t>en</a:t>
             </a:r>
             <a:endParaRPr b="0" lang="de-DE" sz="4400" spc="-1" strike="noStrike">
               <a:latin typeface="Arial"/>
@@ -3590,7 +3458,7 @@
       </p:sp>
       <p:sp>
         <p:nvSpPr>
-          <p:cNvPr id="54" name="PlaceHolder 3"/>
+          <p:cNvPr id="51" name="PlaceHolder 3"/>
           <p:cNvSpPr>
             <a:spLocks noGrp="1"/>
           </p:cNvSpPr>
@@ -3806,14 +3674,14 @@
       </p:grpSpPr>
       <p:sp>
         <p:nvSpPr>
-          <p:cNvPr id="91" name="CustomShape 1"/>
+          <p:cNvPr id="88" name="CustomShape 1"/>
           <p:cNvSpPr/>
           <p:nvPr/>
         </p:nvSpPr>
         <p:spPr>
           <a:xfrm>
             <a:off x="395280" y="1413000"/>
-            <a:ext cx="8388720" cy="719640"/>
+            <a:ext cx="8388360" cy="719280"/>
           </a:xfrm>
           <a:prstGeom prst="rect">
             <a:avLst/>
@@ -3855,14 +3723,14 @@
       </p:sp>
       <p:sp>
         <p:nvSpPr>
-          <p:cNvPr id="92" name="CustomShape 2"/>
+          <p:cNvPr id="89" name="CustomShape 2"/>
           <p:cNvSpPr/>
           <p:nvPr/>
         </p:nvSpPr>
         <p:spPr>
           <a:xfrm>
             <a:off x="396720" y="2349360"/>
-            <a:ext cx="8369640" cy="619560"/>
+            <a:ext cx="8369280" cy="619200"/>
           </a:xfrm>
           <a:prstGeom prst="rect">
             <a:avLst/>
@@ -3927,14 +3795,14 @@
       </p:sp>
       <p:sp>
         <p:nvSpPr>
-          <p:cNvPr id="93" name="CustomShape 3"/>
+          <p:cNvPr id="90" name="CustomShape 3"/>
           <p:cNvSpPr/>
           <p:nvPr/>
         </p:nvSpPr>
         <p:spPr>
           <a:xfrm>
             <a:off x="300960" y="3286800"/>
-            <a:ext cx="4773600" cy="316080"/>
+            <a:ext cx="4773240" cy="315720"/>
           </a:xfrm>
           <a:prstGeom prst="rect">
             <a:avLst/>
@@ -3974,6 +3842,53 @@
           </a:p>
         </p:txBody>
       </p:sp>
+      <p:pic>
+        <p:nvPicPr>
+          <p:cNvPr id="91" name="" descr=""/>
+          <p:cNvPicPr/>
+          <p:nvPr/>
+        </p:nvPicPr>
+        <p:blipFill>
+          <a:blip r:embed="rId1"/>
+          <a:stretch/>
+        </p:blipFill>
+        <p:spPr>
+          <a:xfrm>
+            <a:off x="6759720" y="504000"/>
+            <a:ext cx="1592280" cy="1592280"/>
+          </a:xfrm>
+          <a:prstGeom prst="rect">
+            <a:avLst/>
+          </a:prstGeom>
+          <a:ln>
+            <a:noFill/>
+          </a:ln>
+        </p:spPr>
+      </p:pic>
+      <p:pic>
+        <p:nvPicPr>
+          <p:cNvPr id="92" name="" descr=""/>
+          <p:cNvPicPr/>
+          <p:nvPr/>
+        </p:nvPicPr>
+        <p:blipFill>
+          <a:blip r:embed="rId2"/>
+          <a:srcRect l="20211" t="2618" r="17589" b="11986"/>
+          <a:stretch/>
+        </p:blipFill>
+        <p:spPr>
+          <a:xfrm>
+            <a:off x="2088000" y="3672000"/>
+            <a:ext cx="3402720" cy="2628000"/>
+          </a:xfrm>
+          <a:prstGeom prst="rect">
+            <a:avLst/>
+          </a:prstGeom>
+          <a:ln>
+            <a:noFill/>
+          </a:ln>
+        </p:spPr>
+      </p:pic>
     </p:spTree>
   </p:cSld>
   <p:timing>
@@ -4025,14 +3940,14 @@
       </p:grpSpPr>
       <p:sp>
         <p:nvSpPr>
-          <p:cNvPr id="94" name="CustomShape 1"/>
+          <p:cNvPr id="93" name="CustomShape 1"/>
           <p:cNvSpPr/>
           <p:nvPr/>
         </p:nvSpPr>
         <p:spPr>
           <a:xfrm>
             <a:off x="2411640" y="6445080"/>
-            <a:ext cx="6623640" cy="359280"/>
+            <a:ext cx="6623280" cy="358920"/>
           </a:xfrm>
           <a:prstGeom prst="rect">
             <a:avLst/>
@@ -4074,14 +3989,14 @@
       </p:sp>
       <p:sp>
         <p:nvSpPr>
-          <p:cNvPr id="95" name="CustomShape 2"/>
+          <p:cNvPr id="94" name="CustomShape 2"/>
           <p:cNvSpPr/>
           <p:nvPr/>
         </p:nvSpPr>
         <p:spPr>
           <a:xfrm>
             <a:off x="390600" y="418680"/>
-            <a:ext cx="6700680" cy="560880"/>
+            <a:ext cx="6700320" cy="560520"/>
           </a:xfrm>
           <a:prstGeom prst="rect">
             <a:avLst/>
@@ -4113,7 +4028,7 @@
                 <a:latin typeface="Arial"/>
                 <a:ea typeface="DejaVu Sans"/>
               </a:rPr>
-              <a:t>Gliederung</a:t>
+              <a:t>Gliederung Abschlussprojekt Mühle</a:t>
             </a:r>
             <a:endParaRPr b="0" lang="de-DE" sz="2400" spc="-1" strike="noStrike">
               <a:latin typeface="Arial"/>
@@ -4123,14 +4038,14 @@
       </p:sp>
       <p:sp>
         <p:nvSpPr>
-          <p:cNvPr id="96" name="CustomShape 3"/>
+          <p:cNvPr id="95" name="CustomShape 3"/>
           <p:cNvSpPr/>
           <p:nvPr/>
         </p:nvSpPr>
         <p:spPr>
           <a:xfrm>
             <a:off x="392040" y="1198440"/>
-            <a:ext cx="8355600" cy="4893120"/>
+            <a:ext cx="8355240" cy="4892760"/>
           </a:xfrm>
           <a:prstGeom prst="rect">
             <a:avLst/>
@@ -4149,7 +4064,7 @@
         <p:txBody>
           <a:bodyPr lIns="0" rIns="0" tIns="0" bIns="0"/>
           <a:p>
-            <a:pPr marL="216000" indent="-323280">
+            <a:pPr marL="216000" indent="-322920">
               <a:lnSpc>
                 <a:spcPct val="100000"/>
               </a:lnSpc>
@@ -4187,7 +4102,7 @@
             </a:endParaRPr>
           </a:p>
           <a:p>
-            <a:pPr marL="216000" indent="-323280">
+            <a:pPr marL="216000" indent="-322920">
               <a:lnSpc>
                 <a:spcPct val="100000"/>
               </a:lnSpc>
@@ -4225,7 +4140,7 @@
             </a:endParaRPr>
           </a:p>
           <a:p>
-            <a:pPr marL="216000" indent="-323280">
+            <a:pPr marL="216000" indent="-322920">
               <a:lnSpc>
                 <a:spcPct val="100000"/>
               </a:lnSpc>
@@ -4256,14 +4171,14 @@
                 <a:latin typeface="Arial"/>
                 <a:ea typeface="DejaVu Sans"/>
               </a:rPr>
-              <a:t>Softwarearchitektur</a:t>
+              <a:t>Softwarearchitektur: Klassen der Logik, Klassen der UI</a:t>
             </a:r>
             <a:endParaRPr b="0" lang="de-DE" sz="2000" spc="-1" strike="noStrike">
               <a:latin typeface="Arial"/>
             </a:endParaRPr>
           </a:p>
           <a:p>
-            <a:pPr marL="216000" indent="-323280">
+            <a:pPr marL="216000" indent="-322920">
               <a:lnSpc>
                 <a:spcPct val="100000"/>
               </a:lnSpc>
@@ -4304,14 +4219,14 @@
       </p:sp>
       <p:sp>
         <p:nvSpPr>
-          <p:cNvPr id="97" name="CustomShape 4"/>
+          <p:cNvPr id="96" name="CustomShape 4"/>
           <p:cNvSpPr/>
           <p:nvPr/>
         </p:nvSpPr>
         <p:spPr>
           <a:xfrm>
             <a:off x="1079640" y="6444000"/>
-            <a:ext cx="1258920" cy="358920"/>
+            <a:ext cx="1258560" cy="358560"/>
           </a:xfrm>
           <a:prstGeom prst="rect">
             <a:avLst/>
@@ -4402,14 +4317,14 @@
       </p:grpSpPr>
       <p:sp>
         <p:nvSpPr>
-          <p:cNvPr id="98" name="CustomShape 1"/>
+          <p:cNvPr id="97" name="CustomShape 1"/>
           <p:cNvSpPr/>
           <p:nvPr/>
         </p:nvSpPr>
         <p:spPr>
           <a:xfrm>
             <a:off x="2411640" y="6445080"/>
-            <a:ext cx="6623640" cy="359280"/>
+            <a:ext cx="6623280" cy="358920"/>
           </a:xfrm>
           <a:prstGeom prst="rect">
             <a:avLst/>
@@ -4451,14 +4366,14 @@
       </p:sp>
       <p:sp>
         <p:nvSpPr>
-          <p:cNvPr id="99" name="CustomShape 2"/>
+          <p:cNvPr id="98" name="CustomShape 2"/>
           <p:cNvSpPr/>
           <p:nvPr/>
         </p:nvSpPr>
         <p:spPr>
           <a:xfrm>
             <a:off x="390600" y="418680"/>
-            <a:ext cx="6700680" cy="560880"/>
+            <a:ext cx="6700320" cy="560520"/>
           </a:xfrm>
           <a:prstGeom prst="rect">
             <a:avLst/>
@@ -4500,14 +4415,14 @@
       </p:sp>
       <p:sp>
         <p:nvSpPr>
-          <p:cNvPr id="100" name="CustomShape 3"/>
+          <p:cNvPr id="99" name="CustomShape 3"/>
           <p:cNvSpPr/>
           <p:nvPr/>
         </p:nvSpPr>
         <p:spPr>
           <a:xfrm>
             <a:off x="392040" y="1198440"/>
-            <a:ext cx="8355600" cy="4893120"/>
+            <a:ext cx="8355240" cy="4892760"/>
           </a:xfrm>
           <a:prstGeom prst="rect">
             <a:avLst/>
@@ -4552,14 +4467,14 @@
       </p:sp>
       <p:sp>
         <p:nvSpPr>
-          <p:cNvPr id="101" name="CustomShape 4"/>
+          <p:cNvPr id="100" name="CustomShape 4"/>
           <p:cNvSpPr/>
           <p:nvPr/>
         </p:nvSpPr>
         <p:spPr>
           <a:xfrm>
             <a:off x="1079640" y="6444000"/>
-            <a:ext cx="1258920" cy="358920"/>
+            <a:ext cx="1258560" cy="358560"/>
           </a:xfrm>
           <a:prstGeom prst="rect">
             <a:avLst/>
@@ -4601,14 +4516,14 @@
       </p:sp>
       <p:sp>
         <p:nvSpPr>
-          <p:cNvPr id="102" name="CustomShape 5"/>
+          <p:cNvPr id="101" name="CustomShape 5"/>
           <p:cNvSpPr/>
           <p:nvPr/>
         </p:nvSpPr>
         <p:spPr>
           <a:xfrm>
             <a:off x="392040" y="1198440"/>
-            <a:ext cx="8355600" cy="4893120"/>
+            <a:ext cx="8355240" cy="4892760"/>
           </a:xfrm>
           <a:prstGeom prst="rect">
             <a:avLst/>
@@ -4627,7 +4542,7 @@
         <p:txBody>
           <a:bodyPr lIns="0" rIns="0" tIns="0" bIns="0"/>
           <a:p>
-            <a:pPr marL="216000" indent="-215280">
+            <a:pPr marL="216000" indent="-214920">
               <a:lnSpc>
                 <a:spcPct val="100000"/>
               </a:lnSpc>
@@ -4656,7 +4571,7 @@
             </a:endParaRPr>
           </a:p>
           <a:p>
-            <a:pPr marL="216000" indent="-215280">
+            <a:pPr marL="216000" indent="-214920">
               <a:lnSpc>
                 <a:spcPct val="100000"/>
               </a:lnSpc>
@@ -4685,7 +4600,7 @@
             </a:endParaRPr>
           </a:p>
           <a:p>
-            <a:pPr marL="216000" indent="-215280">
+            <a:pPr marL="216000" indent="-214920">
               <a:lnSpc>
                 <a:spcPct val="100000"/>
               </a:lnSpc>
@@ -4714,7 +4629,7 @@
             </a:endParaRPr>
           </a:p>
           <a:p>
-            <a:pPr marL="216000" indent="-215280">
+            <a:pPr marL="216000" indent="-214920">
               <a:lnSpc>
                 <a:spcPct val="100000"/>
               </a:lnSpc>
@@ -4743,7 +4658,7 @@
             </a:endParaRPr>
           </a:p>
           <a:p>
-            <a:pPr marL="216000" indent="-215280">
+            <a:pPr marL="216000" indent="-214920">
               <a:lnSpc>
                 <a:spcPct val="100000"/>
               </a:lnSpc>
@@ -4775,7 +4690,7 @@
       </p:sp>
       <p:pic>
         <p:nvPicPr>
-          <p:cNvPr id="103" name="" descr=""/>
+          <p:cNvPr id="102" name="" descr=""/>
           <p:cNvPicPr/>
           <p:nvPr/>
         </p:nvPicPr>
@@ -4786,7 +4701,7 @@
         <p:spPr>
           <a:xfrm>
             <a:off x="2696760" y="576000"/>
-            <a:ext cx="1551240" cy="1551240"/>
+            <a:ext cx="1550880" cy="1550880"/>
           </a:xfrm>
           <a:prstGeom prst="rect">
             <a:avLst/>
@@ -4798,14 +4713,14 @@
       </p:pic>
       <p:sp>
         <p:nvSpPr>
-          <p:cNvPr id="104" name="TextShape 6"/>
-          <p:cNvSpPr txBox="1"/>
+          <p:cNvPr id="103" name="CustomShape 6"/>
+          <p:cNvSpPr/>
           <p:nvPr/>
         </p:nvSpPr>
         <p:spPr>
           <a:xfrm>
             <a:off x="9504000" y="2647800"/>
-            <a:ext cx="6816240" cy="374040"/>
+            <a:ext cx="6815880" cy="373680"/>
           </a:xfrm>
           <a:prstGeom prst="rect">
             <a:avLst/>
@@ -4815,9 +4730,20 @@
             <a:noFill/>
           </a:ln>
         </p:spPr>
+        <p:style>
+          <a:lnRef idx="0"/>
+          <a:fillRef idx="0"/>
+          <a:effectRef idx="0"/>
+          <a:fontRef idx="minor"/>
+        </p:style>
         <p:txBody>
           <a:bodyPr lIns="90000" rIns="90000" tIns="45000" bIns="45000"/>
           <a:p>
+            <a:pPr>
+              <a:lnSpc>
+                <a:spcPct val="100000"/>
+              </a:lnSpc>
+            </a:pPr>
             <a:r>
               <a:rPr b="0" lang="de-DE" sz="1000" spc="-1" strike="noStrike">
                 <a:latin typeface="Arial"/>
@@ -4829,6 +4755,11 @@
             </a:endParaRPr>
           </a:p>
           <a:p>
+            <a:pPr>
+              <a:lnSpc>
+                <a:spcPct val="100000"/>
+              </a:lnSpc>
+            </a:pPr>
             <a:r>
               <a:rPr b="0" lang="de-DE" sz="1000" spc="-1" strike="noStrike">
                 <a:latin typeface="Arial"/>
@@ -4843,7 +4774,7 @@
       </p:sp>
       <p:pic>
         <p:nvPicPr>
-          <p:cNvPr id="105" name="" descr=""/>
+          <p:cNvPr id="104" name="" descr=""/>
           <p:cNvPicPr/>
           <p:nvPr/>
         </p:nvPicPr>
@@ -4854,7 +4785,7 @@
         <p:spPr>
           <a:xfrm>
             <a:off x="4680000" y="2232000"/>
-            <a:ext cx="1668960" cy="1224000"/>
+            <a:ext cx="1668600" cy="1223640"/>
           </a:xfrm>
           <a:prstGeom prst="rect">
             <a:avLst/>
@@ -4866,14 +4797,14 @@
       </p:pic>
       <p:sp>
         <p:nvSpPr>
-          <p:cNvPr id="106" name="TextShape 7"/>
-          <p:cNvSpPr txBox="1"/>
+          <p:cNvPr id="105" name="CustomShape 7"/>
+          <p:cNvSpPr/>
           <p:nvPr/>
         </p:nvSpPr>
         <p:spPr>
           <a:xfrm>
             <a:off x="9504000" y="3168000"/>
-            <a:ext cx="5941440" cy="218520"/>
+            <a:ext cx="5941080" cy="218160"/>
           </a:xfrm>
           <a:prstGeom prst="rect">
             <a:avLst/>
@@ -4883,9 +4814,20 @@
             <a:noFill/>
           </a:ln>
         </p:spPr>
+        <p:style>
+          <a:lnRef idx="0"/>
+          <a:fillRef idx="0"/>
+          <a:effectRef idx="0"/>
+          <a:fontRef idx="minor"/>
+        </p:style>
         <p:txBody>
           <a:bodyPr lIns="90000" rIns="90000" tIns="45000" bIns="45000"/>
           <a:p>
+            <a:pPr>
+              <a:lnSpc>
+                <a:spcPct val="100000"/>
+              </a:lnSpc>
+            </a:pPr>
             <a:r>
               <a:rPr b="0" lang="de-DE" sz="900" spc="-1" strike="noStrike">
                 <a:latin typeface="Arial"/>
@@ -4900,7 +4842,7 @@
       </p:sp>
       <p:pic>
         <p:nvPicPr>
-          <p:cNvPr id="107" name="" descr=""/>
+          <p:cNvPr id="106" name="" descr=""/>
           <p:cNvPicPr/>
           <p:nvPr/>
         </p:nvPicPr>
@@ -4911,7 +4853,7 @@
         <p:spPr>
           <a:xfrm>
             <a:off x="6955560" y="3787560"/>
-            <a:ext cx="1180440" cy="1180440"/>
+            <a:ext cx="1180080" cy="1180080"/>
           </a:xfrm>
           <a:prstGeom prst="rect">
             <a:avLst/>
@@ -4923,14 +4865,14 @@
       </p:pic>
       <p:sp>
         <p:nvSpPr>
-          <p:cNvPr id="108" name="TextShape 8"/>
-          <p:cNvSpPr txBox="1"/>
+          <p:cNvPr id="107" name="CustomShape 8"/>
+          <p:cNvSpPr/>
           <p:nvPr/>
         </p:nvSpPr>
         <p:spPr>
           <a:xfrm>
             <a:off x="9648000" y="3816000"/>
-            <a:ext cx="3125160" cy="218520"/>
+            <a:ext cx="3124800" cy="218160"/>
           </a:xfrm>
           <a:prstGeom prst="rect">
             <a:avLst/>
@@ -4940,9 +4882,20 @@
             <a:noFill/>
           </a:ln>
         </p:spPr>
+        <p:style>
+          <a:lnRef idx="0"/>
+          <a:fillRef idx="0"/>
+          <a:effectRef idx="0"/>
+          <a:fontRef idx="minor"/>
+        </p:style>
         <p:txBody>
           <a:bodyPr lIns="90000" rIns="90000" tIns="45000" bIns="45000"/>
           <a:p>
+            <a:pPr>
+              <a:lnSpc>
+                <a:spcPct val="100000"/>
+              </a:lnSpc>
+            </a:pPr>
             <a:r>
               <a:rPr b="0" lang="de-DE" sz="900" spc="-1" strike="noStrike">
                 <a:latin typeface="Arial"/>
@@ -4957,7 +4910,7 @@
       </p:sp>
       <p:pic>
         <p:nvPicPr>
-          <p:cNvPr id="109" name="" descr=""/>
+          <p:cNvPr id="108" name="" descr=""/>
           <p:cNvPicPr/>
           <p:nvPr/>
         </p:nvPicPr>
@@ -4968,7 +4921,7 @@
         <p:spPr>
           <a:xfrm>
             <a:off x="1440000" y="3312000"/>
-            <a:ext cx="1512000" cy="1512000"/>
+            <a:ext cx="1511640" cy="1511640"/>
           </a:xfrm>
           <a:prstGeom prst="rect">
             <a:avLst/>
@@ -4980,14 +4933,14 @@
       </p:pic>
       <p:sp>
         <p:nvSpPr>
-          <p:cNvPr id="110" name="TextShape 9"/>
-          <p:cNvSpPr txBox="1"/>
+          <p:cNvPr id="109" name="CustomShape 9"/>
+          <p:cNvSpPr/>
           <p:nvPr/>
         </p:nvSpPr>
         <p:spPr>
           <a:xfrm>
             <a:off x="9720000" y="4248000"/>
-            <a:ext cx="8567640" cy="602640"/>
+            <a:ext cx="8567280" cy="602280"/>
           </a:xfrm>
           <a:prstGeom prst="rect">
             <a:avLst/>
@@ -4997,56 +4950,25 @@
             <a:noFill/>
           </a:ln>
         </p:spPr>
+        <p:style>
+          <a:lnRef idx="0"/>
+          <a:fillRef idx="0"/>
+          <a:effectRef idx="0"/>
+          <a:fontRef idx="minor"/>
+        </p:style>
         <p:txBody>
           <a:bodyPr lIns="90000" rIns="90000" tIns="45000" bIns="45000"/>
           <a:p>
+            <a:pPr>
+              <a:lnSpc>
+                <a:spcPct val="100000"/>
+              </a:lnSpc>
+            </a:pPr>
             <a:r>
               <a:rPr b="0" lang="de-DE" sz="900" spc="-1" strike="noStrike">
                 <a:latin typeface="Arial"/>
               </a:rPr>
-              <a:t>Pcharm: </a:t>
-            </a:r>
-            <a:r>
-              <a:rPr b="0" lang="de-DE" sz="900" spc="-1" strike="noStrike">
-                <a:latin typeface="Arial"/>
-              </a:rPr>
-              <a:t>https://upload.wikim</a:t>
-            </a:r>
-            <a:r>
-              <a:rPr b="0" lang="de-DE" sz="900" spc="-1" strike="noStrike">
-                <a:latin typeface="Arial"/>
-              </a:rPr>
-              <a:t>edia.org/wikipedia/c</a:t>
-            </a:r>
-            <a:r>
-              <a:rPr b="0" lang="de-DE" sz="900" spc="-1" strike="noStrike">
-                <a:latin typeface="Arial"/>
-              </a:rPr>
-              <a:t>ommons/thumb/a/a</a:t>
-            </a:r>
-            <a:r>
-              <a:rPr b="0" lang="de-DE" sz="900" spc="-1" strike="noStrike">
-                <a:latin typeface="Arial"/>
-              </a:rPr>
-              <a:t>1/PyCharm_Logo.s</a:t>
-            </a:r>
-            <a:r>
-              <a:rPr b="0" lang="de-DE" sz="900" spc="-1" strike="noStrike">
-                <a:latin typeface="Arial"/>
-              </a:rPr>
-              <a:t>vg/128px-</a:t>
-            </a:r>
-            <a:r>
-              <a:rPr b="0" lang="de-DE" sz="900" spc="-1" strike="noStrike">
-                <a:latin typeface="Arial"/>
-              </a:rPr>
-              <a:t>PyCharm_Logo.svg</a:t>
-            </a:r>
-            <a:r>
-              <a:rPr b="0" lang="de-DE" sz="900" spc="-1" strike="noStrike">
-                <a:latin typeface="Arial"/>
-              </a:rPr>
-              <a:t>.png</a:t>
+              <a:t>Pcharm: https://upload.wikimedia.org/wikipedia/commons/thumb/a/a1/PyCharm_Logo.svg/128px-PyCharm_Logo.svg.png</a:t>
             </a:r>
             <a:endParaRPr b="0" lang="de-DE" sz="900" spc="-1" strike="noStrike">
               <a:latin typeface="Arial"/>
@@ -5056,7 +4978,7 @@
       </p:sp>
       <p:pic>
         <p:nvPicPr>
-          <p:cNvPr id="111" name="" descr=""/>
+          <p:cNvPr id="110" name="" descr=""/>
           <p:cNvPicPr/>
           <p:nvPr/>
         </p:nvPicPr>
@@ -5067,7 +4989,7 @@
         <p:spPr>
           <a:xfrm>
             <a:off x="3924720" y="4536000"/>
-            <a:ext cx="1475280" cy="1475280"/>
+            <a:ext cx="1474920" cy="1474920"/>
           </a:xfrm>
           <a:prstGeom prst="rect">
             <a:avLst/>
@@ -5079,14 +5001,14 @@
       </p:pic>
       <p:sp>
         <p:nvSpPr>
-          <p:cNvPr id="112" name="TextShape 10"/>
-          <p:cNvSpPr txBox="1"/>
+          <p:cNvPr id="111" name="CustomShape 10"/>
+          <p:cNvSpPr/>
           <p:nvPr/>
         </p:nvSpPr>
         <p:spPr>
           <a:xfrm>
             <a:off x="9720000" y="4752000"/>
-            <a:ext cx="8567640" cy="602640"/>
+            <a:ext cx="8567280" cy="602280"/>
           </a:xfrm>
           <a:prstGeom prst="rect">
             <a:avLst/>
@@ -5096,9 +5018,20 @@
             <a:noFill/>
           </a:ln>
         </p:spPr>
+        <p:style>
+          <a:lnRef idx="0"/>
+          <a:fillRef idx="0"/>
+          <a:effectRef idx="0"/>
+          <a:fontRef idx="minor"/>
+        </p:style>
         <p:txBody>
           <a:bodyPr lIns="90000" rIns="90000" tIns="45000" bIns="45000"/>
           <a:p>
+            <a:pPr>
+              <a:lnSpc>
+                <a:spcPct val="100000"/>
+              </a:lnSpc>
+            </a:pPr>
             <a:r>
               <a:rPr b="0" lang="de-DE" sz="900" spc="-1" strike="noStrike">
                 <a:latin typeface="Arial"/>
@@ -5162,14 +5095,14 @@
       </p:grpSpPr>
       <p:sp>
         <p:nvSpPr>
-          <p:cNvPr id="113" name="CustomShape 1"/>
+          <p:cNvPr id="112" name="CustomShape 1"/>
           <p:cNvSpPr/>
           <p:nvPr/>
         </p:nvSpPr>
         <p:spPr>
           <a:xfrm>
             <a:off x="2411640" y="6445080"/>
-            <a:ext cx="6623640" cy="359280"/>
+            <a:ext cx="6623280" cy="358920"/>
           </a:xfrm>
           <a:prstGeom prst="rect">
             <a:avLst/>
@@ -5211,14 +5144,14 @@
       </p:sp>
       <p:sp>
         <p:nvSpPr>
-          <p:cNvPr id="114" name="CustomShape 2"/>
+          <p:cNvPr id="113" name="CustomShape 2"/>
           <p:cNvSpPr/>
           <p:nvPr/>
         </p:nvSpPr>
         <p:spPr>
           <a:xfrm>
             <a:off x="390600" y="418680"/>
-            <a:ext cx="6700680" cy="560880"/>
+            <a:ext cx="6700320" cy="560520"/>
           </a:xfrm>
           <a:prstGeom prst="rect">
             <a:avLst/>
@@ -5260,14 +5193,14 @@
       </p:sp>
       <p:sp>
         <p:nvSpPr>
-          <p:cNvPr id="115" name="CustomShape 3"/>
+          <p:cNvPr id="114" name="CustomShape 3"/>
           <p:cNvSpPr/>
           <p:nvPr/>
         </p:nvSpPr>
         <p:spPr>
           <a:xfrm>
             <a:off x="392040" y="1198440"/>
-            <a:ext cx="8355600" cy="4893120"/>
+            <a:ext cx="8355240" cy="4892760"/>
           </a:xfrm>
           <a:prstGeom prst="rect">
             <a:avLst/>
@@ -5312,14 +5245,14 @@
       </p:sp>
       <p:sp>
         <p:nvSpPr>
-          <p:cNvPr id="116" name="CustomShape 4"/>
+          <p:cNvPr id="115" name="CustomShape 4"/>
           <p:cNvSpPr/>
           <p:nvPr/>
         </p:nvSpPr>
         <p:spPr>
           <a:xfrm>
             <a:off x="1079640" y="6444000"/>
-            <a:ext cx="1258920" cy="358920"/>
+            <a:ext cx="1258560" cy="358560"/>
           </a:xfrm>
           <a:prstGeom prst="rect">
             <a:avLst/>
@@ -5361,14 +5294,14 @@
       </p:sp>
       <p:sp>
         <p:nvSpPr>
-          <p:cNvPr id="117" name="CustomShape 5"/>
+          <p:cNvPr id="116" name="CustomShape 5"/>
           <p:cNvSpPr/>
           <p:nvPr/>
         </p:nvSpPr>
         <p:spPr>
           <a:xfrm>
             <a:off x="392040" y="1206360"/>
-            <a:ext cx="3279240" cy="4992840"/>
+            <a:ext cx="3278880" cy="4992480"/>
           </a:xfrm>
           <a:prstGeom prst="rect">
             <a:avLst/>
@@ -5401,7 +5334,7 @@
             </a:endParaRPr>
           </a:p>
           <a:p>
-            <a:pPr marL="216000" indent="-215280">
+            <a:pPr marL="216000" indent="-214920">
               <a:lnSpc>
                 <a:spcPct val="100000"/>
               </a:lnSpc>
@@ -5440,14 +5373,14 @@
       </p:sp>
       <p:sp>
         <p:nvSpPr>
-          <p:cNvPr id="118" name="CustomShape 6"/>
+          <p:cNvPr id="117" name="CustomShape 6"/>
           <p:cNvSpPr/>
           <p:nvPr/>
         </p:nvSpPr>
         <p:spPr>
           <a:xfrm>
             <a:off x="5544000" y="1198440"/>
-            <a:ext cx="3383280" cy="4992840"/>
+            <a:ext cx="3382920" cy="4992480"/>
           </a:xfrm>
           <a:prstGeom prst="rect">
             <a:avLst/>
@@ -5490,7 +5423,7 @@
             </a:endParaRPr>
           </a:p>
           <a:p>
-            <a:pPr marL="216000" indent="-215280">
+            <a:pPr marL="216000" indent="-214920">
               <a:lnSpc>
                 <a:spcPct val="100000"/>
               </a:lnSpc>
@@ -5516,7 +5449,7 @@
             </a:endParaRPr>
           </a:p>
           <a:p>
-            <a:pPr marL="216000" indent="-215280">
+            <a:pPr marL="216000" indent="-214920">
               <a:lnSpc>
                 <a:spcPct val="100000"/>
               </a:lnSpc>
@@ -5542,7 +5475,7 @@
             </a:endParaRPr>
           </a:p>
           <a:p>
-            <a:pPr marL="216000" indent="-215280">
+            <a:pPr marL="216000" indent="-214920">
               <a:lnSpc>
                 <a:spcPct val="100000"/>
               </a:lnSpc>
@@ -5568,7 +5501,7 @@
             </a:endParaRPr>
           </a:p>
           <a:p>
-            <a:pPr marL="216000" indent="-215280">
+            <a:pPr marL="216000" indent="-214920">
               <a:lnSpc>
                 <a:spcPct val="100000"/>
               </a:lnSpc>
@@ -5597,14 +5530,14 @@
       </p:sp>
       <p:sp>
         <p:nvSpPr>
-          <p:cNvPr id="119" name="CustomShape 7"/>
+          <p:cNvPr id="118" name="CustomShape 7"/>
           <p:cNvSpPr/>
           <p:nvPr/>
         </p:nvSpPr>
         <p:spPr>
           <a:xfrm>
             <a:off x="3744000" y="3096000"/>
-            <a:ext cx="1655280" cy="1223280"/>
+            <a:ext cx="1654920" cy="1222920"/>
           </a:xfrm>
           <a:custGeom>
             <a:avLst/>
@@ -5690,14 +5623,14 @@
       </p:sp>
       <p:sp>
         <p:nvSpPr>
-          <p:cNvPr id="120" name="CustomShape 8"/>
+          <p:cNvPr id="119" name="CustomShape 8"/>
           <p:cNvSpPr/>
           <p:nvPr/>
         </p:nvSpPr>
         <p:spPr>
           <a:xfrm>
-            <a:off x="864000" y="4536000"/>
-            <a:ext cx="2087280" cy="935280"/>
+            <a:off x="864000" y="4716000"/>
+            <a:ext cx="2086920" cy="934920"/>
           </a:xfrm>
           <a:prstGeom prst="rect">
             <a:avLst/>
@@ -5743,14 +5676,14 @@
       </p:sp>
       <p:sp>
         <p:nvSpPr>
-          <p:cNvPr id="121" name="CustomShape 9"/>
+          <p:cNvPr id="120" name="CustomShape 9"/>
           <p:cNvSpPr/>
           <p:nvPr/>
         </p:nvSpPr>
         <p:spPr>
           <a:xfrm>
-            <a:off x="3744000" y="4536000"/>
-            <a:ext cx="4679280" cy="935280"/>
+            <a:off x="3744000" y="4716000"/>
+            <a:ext cx="4678920" cy="934920"/>
           </a:xfrm>
           <a:prstGeom prst="rect">
             <a:avLst/>
@@ -5796,14 +5729,14 @@
       </p:sp>
       <p:sp>
         <p:nvSpPr>
-          <p:cNvPr id="122" name="TextShape 10"/>
-          <p:cNvSpPr txBox="1"/>
+          <p:cNvPr id="121" name="CustomShape 10"/>
+          <p:cNvSpPr/>
           <p:nvPr/>
         </p:nvSpPr>
         <p:spPr>
           <a:xfrm>
             <a:off x="432000" y="2592000"/>
-            <a:ext cx="3239280" cy="2182320"/>
+            <a:ext cx="3238920" cy="2181960"/>
           </a:xfrm>
           <a:prstGeom prst="rect">
             <a:avLst/>
@@ -5813,9 +5746,20 @@
             <a:noFill/>
           </a:ln>
         </p:spPr>
+        <p:style>
+          <a:lnRef idx="0"/>
+          <a:fillRef idx="0"/>
+          <a:effectRef idx="0"/>
+          <a:fontRef idx="minor"/>
+        </p:style>
         <p:txBody>
           <a:bodyPr lIns="90000" rIns="90000" tIns="45000" bIns="45000"/>
           <a:p>
+            <a:pPr>
+              <a:lnSpc>
+                <a:spcPct val="100000"/>
+              </a:lnSpc>
+            </a:pPr>
             <a:r>
               <a:rPr b="0" lang="de-DE" sz="1800" spc="-1" strike="noStrike">
                 <a:latin typeface="Arial"/>
@@ -5827,7 +5771,7 @@
             </a:endParaRPr>
           </a:p>
           <a:p>
-            <a:pPr marL="216000" indent="-216000">
+            <a:pPr marL="216000" indent="-215640">
               <a:lnSpc>
                 <a:spcPct val="100000"/>
               </a:lnSpc>
@@ -5853,7 +5797,7 @@
             </a:endParaRPr>
           </a:p>
           <a:p>
-            <a:pPr marL="216000" indent="-216000">
+            <a:pPr marL="216000" indent="-215640">
               <a:lnSpc>
                 <a:spcPct val="100000"/>
               </a:lnSpc>
@@ -5879,7 +5823,7 @@
             </a:endParaRPr>
           </a:p>
           <a:p>
-            <a:pPr marL="216000" indent="-216000">
+            <a:pPr marL="216000" indent="-215640">
               <a:lnSpc>
                 <a:spcPct val="100000"/>
               </a:lnSpc>
@@ -5905,7 +5849,7 @@
             </a:endParaRPr>
           </a:p>
           <a:p>
-            <a:pPr marL="216000" indent="-216000">
+            <a:pPr marL="216000" indent="-215640">
               <a:lnSpc>
                 <a:spcPct val="100000"/>
               </a:lnSpc>
@@ -5942,7 +5886,7 @@
             </a:endParaRPr>
           </a:p>
           <a:p>
-            <a:pPr marL="216000" indent="-216000">
+            <a:pPr marL="216000" indent="-215640">
               <a:lnSpc>
                 <a:spcPct val="100000"/>
               </a:lnSpc>
@@ -5968,7 +5912,10 @@
             </a:endParaRPr>
           </a:p>
           <a:p>
-            <a:pPr marL="216000" indent="-216000">
+            <a:pPr marL="216000" indent="-215640">
+              <a:lnSpc>
+                <a:spcPct val="100000"/>
+              </a:lnSpc>
               <a:buClr>
                 <a:srgbClr val="000000"/>
               </a:buClr>
@@ -5991,6 +5938,11 @@
             </a:endParaRPr>
           </a:p>
           <a:p>
+            <a:pPr>
+              <a:lnSpc>
+                <a:spcPct val="100000"/>
+              </a:lnSpc>
+            </a:pPr>
             <a:endParaRPr b="0" lang="de-DE" sz="1600" spc="-1" strike="noStrike">
               <a:latin typeface="Arial"/>
             </a:endParaRPr>
@@ -6048,14 +6000,14 @@
       </p:grpSpPr>
       <p:sp>
         <p:nvSpPr>
-          <p:cNvPr id="123" name="CustomShape 1"/>
+          <p:cNvPr id="122" name="CustomShape 1"/>
           <p:cNvSpPr/>
           <p:nvPr/>
         </p:nvSpPr>
         <p:spPr>
           <a:xfrm>
             <a:off x="2411640" y="6445080"/>
-            <a:ext cx="6623640" cy="359280"/>
+            <a:ext cx="6623280" cy="358920"/>
           </a:xfrm>
           <a:prstGeom prst="rect">
             <a:avLst/>
@@ -6097,14 +6049,14 @@
       </p:sp>
       <p:sp>
         <p:nvSpPr>
-          <p:cNvPr id="124" name="CustomShape 2"/>
+          <p:cNvPr id="123" name="CustomShape 2"/>
           <p:cNvSpPr/>
           <p:nvPr/>
         </p:nvSpPr>
         <p:spPr>
           <a:xfrm>
             <a:off x="390600" y="418680"/>
-            <a:ext cx="6700680" cy="560880"/>
+            <a:ext cx="6700320" cy="560520"/>
           </a:xfrm>
           <a:prstGeom prst="rect">
             <a:avLst/>
@@ -6146,14 +6098,14 @@
       </p:sp>
       <p:sp>
         <p:nvSpPr>
-          <p:cNvPr id="125" name="CustomShape 3"/>
+          <p:cNvPr id="124" name="CustomShape 3"/>
           <p:cNvSpPr/>
           <p:nvPr/>
         </p:nvSpPr>
         <p:spPr>
           <a:xfrm>
             <a:off x="392040" y="1198440"/>
-            <a:ext cx="8355600" cy="4893120"/>
+            <a:ext cx="8355240" cy="4892760"/>
           </a:xfrm>
           <a:prstGeom prst="rect">
             <a:avLst/>
@@ -6198,14 +6150,14 @@
       </p:sp>
       <p:sp>
         <p:nvSpPr>
-          <p:cNvPr id="126" name="CustomShape 4"/>
+          <p:cNvPr id="125" name="CustomShape 4"/>
           <p:cNvSpPr/>
           <p:nvPr/>
         </p:nvSpPr>
         <p:spPr>
           <a:xfrm>
             <a:off x="1079640" y="6444000"/>
-            <a:ext cx="1258920" cy="358920"/>
+            <a:ext cx="1258560" cy="358560"/>
           </a:xfrm>
           <a:prstGeom prst="rect">
             <a:avLst/>
@@ -6247,19 +6199,19 @@
       </p:sp>
       <p:pic>
         <p:nvPicPr>
-          <p:cNvPr id="127" name="" descr=""/>
+          <p:cNvPr id="126" name="" descr=""/>
           <p:cNvPicPr/>
           <p:nvPr/>
         </p:nvPicPr>
         <p:blipFill>
           <a:blip r:embed="rId1"/>
-          <a:srcRect l="20211" t="2614" r="17581" b="10590"/>
+          <a:srcRect l="20209" t="2614" r="17579" b="10590"/>
           <a:stretch/>
         </p:blipFill>
         <p:spPr>
           <a:xfrm>
             <a:off x="2952000" y="565200"/>
-            <a:ext cx="4968000" cy="3898800"/>
+            <a:ext cx="4967640" cy="3898440"/>
           </a:xfrm>
           <a:prstGeom prst="rect">
             <a:avLst/>
@@ -6271,14 +6223,14 @@
       </p:pic>
       <p:sp>
         <p:nvSpPr>
-          <p:cNvPr id="128" name="TextShape 5"/>
-          <p:cNvSpPr txBox="1"/>
+          <p:cNvPr id="127" name="CustomShape 5"/>
+          <p:cNvSpPr/>
           <p:nvPr/>
         </p:nvSpPr>
         <p:spPr>
           <a:xfrm>
             <a:off x="3708000" y="4500000"/>
-            <a:ext cx="3684240" cy="290160"/>
+            <a:ext cx="3683880" cy="289800"/>
           </a:xfrm>
           <a:prstGeom prst="rect">
             <a:avLst/>
@@ -6288,32 +6240,25 @@
             <a:noFill/>
           </a:ln>
         </p:spPr>
+        <p:style>
+          <a:lnRef idx="0"/>
+          <a:fillRef idx="0"/>
+          <a:effectRef idx="0"/>
+          <a:fontRef idx="minor"/>
+        </p:style>
         <p:txBody>
           <a:bodyPr lIns="90000" rIns="90000" tIns="45000" bIns="45000"/>
           <a:p>
+            <a:pPr>
+              <a:lnSpc>
+                <a:spcPct val="100000"/>
+              </a:lnSpc>
+            </a:pPr>
             <a:r>
               <a:rPr b="0" lang="de-DE" sz="1400" spc="-1" strike="noStrike">
                 <a:latin typeface="Arial"/>
               </a:rPr>
-              <a:t>Spieloberflä</a:t>
-            </a:r>
-            <a:r>
-              <a:rPr b="0" lang="de-DE" sz="1400" spc="-1" strike="noStrike">
-                <a:latin typeface="Arial"/>
-              </a:rPr>
-              <a:t>che erstellt </a:t>
-            </a:r>
-            <a:r>
-              <a:rPr b="0" lang="de-DE" sz="1400" spc="-1" strike="noStrike">
-                <a:latin typeface="Arial"/>
-              </a:rPr>
-              <a:t>mit dem Qt-</a:t>
-            </a:r>
-            <a:r>
-              <a:rPr b="0" lang="de-DE" sz="1400" spc="-1" strike="noStrike">
-                <a:latin typeface="Arial"/>
-              </a:rPr>
-              <a:t>Designer</a:t>
+              <a:t>Spieloberfläche erstellt mit dem Qt-Designer</a:t>
             </a:r>
             <a:endParaRPr b="0" lang="de-DE" sz="1400" spc="-1" strike="noStrike">
               <a:latin typeface="Arial"/>
@@ -6323,14 +6268,14 @@
       </p:sp>
       <p:sp>
         <p:nvSpPr>
-          <p:cNvPr id="129" name="TextShape 6"/>
-          <p:cNvSpPr txBox="1"/>
+          <p:cNvPr id="128" name="CustomShape 6"/>
+          <p:cNvSpPr/>
           <p:nvPr/>
         </p:nvSpPr>
         <p:spPr>
           <a:xfrm>
             <a:off x="216000" y="1574640"/>
-            <a:ext cx="2592000" cy="1305360"/>
+            <a:ext cx="2591640" cy="1305000"/>
           </a:xfrm>
           <a:prstGeom prst="rect">
             <a:avLst/>
@@ -6342,9 +6287,20 @@
             <a:noFill/>
           </a:ln>
         </p:spPr>
+        <p:style>
+          <a:lnRef idx="0"/>
+          <a:fillRef idx="0"/>
+          <a:effectRef idx="0"/>
+          <a:fontRef idx="minor"/>
+        </p:style>
         <p:txBody>
           <a:bodyPr lIns="90000" rIns="90000" tIns="45000" bIns="45000"/>
           <a:p>
+            <a:pPr>
+              <a:lnSpc>
+                <a:spcPct val="100000"/>
+              </a:lnSpc>
+            </a:pPr>
             <a:r>
               <a:rPr b="0" lang="de-DE" sz="2000" spc="-1" strike="noStrike">
                 <a:solidFill>
@@ -6360,6 +6316,11 @@
             </a:endParaRPr>
           </a:p>
           <a:p>
+            <a:pPr>
+              <a:lnSpc>
+                <a:spcPct val="100000"/>
+              </a:lnSpc>
+            </a:pPr>
             <a:r>
               <a:rPr b="0" lang="de-DE" sz="2000" spc="-1" strike="noStrike">
                 <a:solidFill>
@@ -6388,14 +6349,14 @@
       </p:sp>
       <p:sp>
         <p:nvSpPr>
-          <p:cNvPr id="130" name="TextShape 7"/>
-          <p:cNvSpPr txBox="1"/>
+          <p:cNvPr id="129" name="CustomShape 7"/>
+          <p:cNvSpPr/>
           <p:nvPr/>
         </p:nvSpPr>
         <p:spPr>
           <a:xfrm>
             <a:off x="357840" y="5175000"/>
-            <a:ext cx="8354160" cy="657000"/>
+            <a:ext cx="8353800" cy="656640"/>
           </a:xfrm>
           <a:prstGeom prst="rect">
             <a:avLst/>
@@ -6407,9 +6368,20 @@
             <a:noFill/>
           </a:ln>
         </p:spPr>
+        <p:style>
+          <a:lnRef idx="0"/>
+          <a:fillRef idx="0"/>
+          <a:effectRef idx="0"/>
+          <a:fontRef idx="minor"/>
+        </p:style>
         <p:txBody>
           <a:bodyPr lIns="90000" rIns="90000" tIns="45000" bIns="45000"/>
           <a:p>
+            <a:pPr>
+              <a:lnSpc>
+                <a:spcPct val="100000"/>
+              </a:lnSpc>
+            </a:pPr>
             <a:r>
               <a:rPr b="0" lang="de-DE" sz="2000" spc="-1" strike="noStrike">
                 <a:solidFill>
@@ -6477,14 +6449,14 @@
       </p:grpSpPr>
       <p:sp>
         <p:nvSpPr>
-          <p:cNvPr id="131" name="CustomShape 1"/>
+          <p:cNvPr id="130" name="CustomShape 1"/>
           <p:cNvSpPr/>
           <p:nvPr/>
         </p:nvSpPr>
         <p:spPr>
           <a:xfrm>
             <a:off x="2411640" y="6445080"/>
-            <a:ext cx="6623640" cy="359280"/>
+            <a:ext cx="6623280" cy="358920"/>
           </a:xfrm>
           <a:prstGeom prst="rect">
             <a:avLst/>
@@ -6526,14 +6498,14 @@
       </p:sp>
       <p:sp>
         <p:nvSpPr>
-          <p:cNvPr id="132" name="CustomShape 2"/>
+          <p:cNvPr id="131" name="CustomShape 2"/>
           <p:cNvSpPr/>
           <p:nvPr/>
         </p:nvSpPr>
         <p:spPr>
           <a:xfrm>
             <a:off x="390600" y="418680"/>
-            <a:ext cx="6700680" cy="560880"/>
+            <a:ext cx="6700320" cy="560520"/>
           </a:xfrm>
           <a:prstGeom prst="rect">
             <a:avLst/>
@@ -6585,14 +6557,14 @@
       </p:sp>
       <p:sp>
         <p:nvSpPr>
-          <p:cNvPr id="133" name="CustomShape 3"/>
+          <p:cNvPr id="132" name="CustomShape 3"/>
           <p:cNvSpPr/>
           <p:nvPr/>
         </p:nvSpPr>
         <p:spPr>
           <a:xfrm>
             <a:off x="392040" y="1198440"/>
-            <a:ext cx="8355600" cy="4893120"/>
+            <a:ext cx="8355240" cy="4892760"/>
           </a:xfrm>
           <a:prstGeom prst="rect">
             <a:avLst/>
@@ -6637,14 +6609,14 @@
       </p:sp>
       <p:sp>
         <p:nvSpPr>
-          <p:cNvPr id="134" name="CustomShape 4"/>
+          <p:cNvPr id="133" name="CustomShape 4"/>
           <p:cNvSpPr/>
           <p:nvPr/>
         </p:nvSpPr>
         <p:spPr>
           <a:xfrm>
             <a:off x="1079640" y="6444000"/>
-            <a:ext cx="1258920" cy="358920"/>
+            <a:ext cx="1258560" cy="358560"/>
           </a:xfrm>
           <a:prstGeom prst="rect">
             <a:avLst/>
@@ -6686,14 +6658,14 @@
       </p:sp>
       <p:sp>
         <p:nvSpPr>
-          <p:cNvPr id="135" name="CustomShape 5"/>
+          <p:cNvPr id="134" name="CustomShape 5"/>
           <p:cNvSpPr/>
           <p:nvPr/>
         </p:nvSpPr>
         <p:spPr>
           <a:xfrm>
             <a:off x="392040" y="1198440"/>
-            <a:ext cx="8355600" cy="4893120"/>
+            <a:ext cx="8355240" cy="4892760"/>
           </a:xfrm>
           <a:prstGeom prst="rect">
             <a:avLst/>
@@ -6780,14 +6752,14 @@
       </p:sp>
       <p:sp>
         <p:nvSpPr>
-          <p:cNvPr id="136" name="CustomShape 6"/>
+          <p:cNvPr id="135" name="CustomShape 6"/>
           <p:cNvSpPr/>
           <p:nvPr/>
         </p:nvSpPr>
         <p:spPr>
           <a:xfrm>
             <a:off x="3312000" y="1198440"/>
-            <a:ext cx="1224000" cy="576000"/>
+            <a:ext cx="1223640" cy="575640"/>
           </a:xfrm>
           <a:prstGeom prst="rect">
             <a:avLst/>
@@ -6810,10 +6782,18 @@
         <p:txBody>
           <a:bodyPr wrap="none" lIns="90000" rIns="90000" tIns="45000" bIns="45000" anchor="ctr"/>
           <a:p>
-            <a:pPr algn="ctr"/>
+            <a:pPr algn="ctr">
+              <a:lnSpc>
+                <a:spcPct val="100000"/>
+              </a:lnSpc>
+            </a:pPr>
             <a:r>
               <a:rPr b="0" lang="de-DE" sz="1400" spc="-1" strike="noStrike">
-                <a:latin typeface="Arial"/>
+                <a:solidFill>
+                  <a:srgbClr val="000000"/>
+                </a:solidFill>
+                <a:latin typeface="Arial"/>
+                <a:ea typeface="DejaVu Sans"/>
               </a:rPr>
               <a:t>Field</a:t>
             </a:r>
@@ -6825,14 +6805,14 @@
       </p:sp>
       <p:sp>
         <p:nvSpPr>
-          <p:cNvPr id="137" name="CustomShape 7"/>
+          <p:cNvPr id="136" name="CustomShape 7"/>
           <p:cNvSpPr/>
           <p:nvPr/>
         </p:nvSpPr>
         <p:spPr>
           <a:xfrm>
             <a:off x="5616000" y="1198440"/>
-            <a:ext cx="1224000" cy="576000"/>
+            <a:ext cx="1223640" cy="575640"/>
           </a:xfrm>
           <a:prstGeom prst="rect">
             <a:avLst/>
@@ -6855,10 +6835,18 @@
         <p:txBody>
           <a:bodyPr wrap="none" lIns="90000" rIns="90000" tIns="45000" bIns="45000" anchor="ctr"/>
           <a:p>
-            <a:pPr algn="ctr"/>
+            <a:pPr algn="ctr">
+              <a:lnSpc>
+                <a:spcPct val="100000"/>
+              </a:lnSpc>
+            </a:pPr>
             <a:r>
               <a:rPr b="0" lang="de-DE" sz="1400" spc="-1" strike="noStrike">
-                <a:latin typeface="Arial"/>
+                <a:solidFill>
+                  <a:srgbClr val="000000"/>
+                </a:solidFill>
+                <a:latin typeface="Arial"/>
+                <a:ea typeface="DejaVu Sans"/>
               </a:rPr>
               <a:t>Player</a:t>
             </a:r>
@@ -6870,14 +6858,14 @@
       </p:sp>
       <p:sp>
         <p:nvSpPr>
-          <p:cNvPr id="138" name="CustomShape 8"/>
+          <p:cNvPr id="137" name="CustomShape 8"/>
           <p:cNvSpPr/>
           <p:nvPr/>
         </p:nvSpPr>
         <p:spPr>
           <a:xfrm>
             <a:off x="1224000" y="4464000"/>
-            <a:ext cx="1368000" cy="576000"/>
+            <a:ext cx="1367640" cy="575640"/>
           </a:xfrm>
           <a:prstGeom prst="rect">
             <a:avLst/>
@@ -6900,6 +6888,11 @@
         <p:txBody>
           <a:bodyPr wrap="none" lIns="90000" rIns="90000" tIns="45000" bIns="45000" anchor="ctr"/>
           <a:p>
+            <a:pPr>
+              <a:lnSpc>
+                <a:spcPct val="100000"/>
+              </a:lnSpc>
+            </a:pPr>
             <a:r>
               <a:rPr b="0" lang="de-DE" sz="1400" spc="-1" strike="noStrike">
                 <a:solidFill>
@@ -6911,25 +6904,21 @@
               <a:t>PlayerException</a:t>
             </a:r>
             <a:endParaRPr b="0" lang="de-DE" sz="1400" spc="-1" strike="noStrike">
-              <a:solidFill>
-                <a:srgbClr val="000000"/>
-              </a:solidFill>
-              <a:latin typeface="Arial"/>
-              <a:ea typeface="DejaVu Sans Mono"/>
-            </a:endParaRPr>
-          </a:p>
-        </p:txBody>
-      </p:sp>
-      <p:sp>
-        <p:nvSpPr>
-          <p:cNvPr id="139" name="CustomShape 9"/>
+              <a:latin typeface="Arial"/>
+            </a:endParaRPr>
+          </a:p>
+        </p:txBody>
+      </p:sp>
+      <p:sp>
+        <p:nvSpPr>
+          <p:cNvPr id="138" name="CustomShape 9"/>
           <p:cNvSpPr/>
           <p:nvPr/>
         </p:nvSpPr>
         <p:spPr>
           <a:xfrm>
             <a:off x="7632000" y="1152000"/>
-            <a:ext cx="1224000" cy="576000"/>
+            <a:ext cx="1223640" cy="575640"/>
           </a:xfrm>
           <a:prstGeom prst="rect">
             <a:avLst/>
@@ -6952,6 +6941,11 @@
         <p:txBody>
           <a:bodyPr wrap="none" lIns="90000" rIns="90000" tIns="45000" bIns="45000" anchor="ctr"/>
           <a:p>
+            <a:pPr>
+              <a:lnSpc>
+                <a:spcPct val="100000"/>
+              </a:lnSpc>
+            </a:pPr>
             <a:r>
               <a:rPr b="0" lang="de-DE" sz="1400" spc="-1" strike="noStrike">
                 <a:solidFill>
@@ -6963,25 +6957,21 @@
               <a:t>History</a:t>
             </a:r>
             <a:endParaRPr b="0" lang="de-DE" sz="1400" spc="-1" strike="noStrike">
-              <a:solidFill>
-                <a:srgbClr val="000000"/>
-              </a:solidFill>
-              <a:latin typeface="Arial"/>
-              <a:ea typeface="DejaVu Sans Mono"/>
-            </a:endParaRPr>
-          </a:p>
-        </p:txBody>
-      </p:sp>
-      <p:sp>
-        <p:nvSpPr>
-          <p:cNvPr id="140" name="CustomShape 10"/>
+              <a:latin typeface="Arial"/>
+            </a:endParaRPr>
+          </a:p>
+        </p:txBody>
+      </p:sp>
+      <p:sp>
+        <p:nvSpPr>
+          <p:cNvPr id="139" name="CustomShape 10"/>
           <p:cNvSpPr/>
           <p:nvPr/>
         </p:nvSpPr>
         <p:spPr>
           <a:xfrm>
             <a:off x="1224000" y="1198440"/>
-            <a:ext cx="1224000" cy="576000"/>
+            <a:ext cx="1223640" cy="575640"/>
           </a:xfrm>
           <a:prstGeom prst="rect">
             <a:avLst/>
@@ -7004,7 +6994,11 @@
         <p:txBody>
           <a:bodyPr wrap="none" lIns="90000" rIns="90000" tIns="45000" bIns="45000" anchor="ctr"/>
           <a:p>
-            <a:pPr algn="ctr"/>
+            <a:pPr algn="ctr">
+              <a:lnSpc>
+                <a:spcPct val="100000"/>
+              </a:lnSpc>
+            </a:pPr>
             <a:r>
               <a:rPr b="0" lang="de-DE" sz="1400" spc="-1" strike="noStrike">
                 <a:solidFill>
@@ -7016,25 +7010,21 @@
               <a:t>Game</a:t>
             </a:r>
             <a:endParaRPr b="0" lang="de-DE" sz="1400" spc="-1" strike="noStrike">
-              <a:solidFill>
-                <a:srgbClr val="000000"/>
-              </a:solidFill>
-              <a:latin typeface="Arial"/>
-              <a:ea typeface="DejaVu Sans Mono"/>
-            </a:endParaRPr>
-          </a:p>
-        </p:txBody>
-      </p:sp>
-      <p:sp>
-        <p:nvSpPr>
-          <p:cNvPr id="141" name="CustomShape 11"/>
+              <a:latin typeface="Arial"/>
+            </a:endParaRPr>
+          </a:p>
+        </p:txBody>
+      </p:sp>
+      <p:sp>
+        <p:nvSpPr>
+          <p:cNvPr id="140" name="CustomShape 11"/>
           <p:cNvSpPr/>
           <p:nvPr/>
         </p:nvSpPr>
         <p:spPr>
           <a:xfrm>
             <a:off x="2736000" y="4464000"/>
-            <a:ext cx="1224000" cy="576000"/>
+            <a:ext cx="1223640" cy="575640"/>
           </a:xfrm>
           <a:prstGeom prst="rect">
             <a:avLst/>
@@ -7057,6 +7047,11 @@
         <p:txBody>
           <a:bodyPr wrap="none" lIns="90000" rIns="90000" tIns="45000" bIns="45000" anchor="ctr"/>
           <a:p>
+            <a:pPr>
+              <a:lnSpc>
+                <a:spcPct val="100000"/>
+              </a:lnSpc>
+            </a:pPr>
             <a:r>
               <a:rPr b="0" lang="de-DE" sz="1400" spc="-1" strike="noStrike">
                 <a:solidFill>
@@ -7068,25 +7063,21 @@
               <a:t>MoveException</a:t>
             </a:r>
             <a:endParaRPr b="0" lang="de-DE" sz="1400" spc="-1" strike="noStrike">
-              <a:solidFill>
-                <a:srgbClr val="000000"/>
-              </a:solidFill>
-              <a:latin typeface="Arial"/>
-              <a:ea typeface="DejaVu Sans Mono"/>
-            </a:endParaRPr>
-          </a:p>
-        </p:txBody>
-      </p:sp>
-      <p:sp>
-        <p:nvSpPr>
-          <p:cNvPr id="142" name="CustomShape 12"/>
+              <a:latin typeface="Arial"/>
+            </a:endParaRPr>
+          </a:p>
+        </p:txBody>
+      </p:sp>
+      <p:sp>
+        <p:nvSpPr>
+          <p:cNvPr id="141" name="CustomShape 12"/>
           <p:cNvSpPr/>
           <p:nvPr/>
         </p:nvSpPr>
         <p:spPr>
           <a:xfrm>
             <a:off x="4104000" y="4464000"/>
-            <a:ext cx="1224000" cy="576000"/>
+            <a:ext cx="1223640" cy="575640"/>
           </a:xfrm>
           <a:prstGeom prst="rect">
             <a:avLst/>
@@ -7109,6 +7100,11 @@
         <p:txBody>
           <a:bodyPr wrap="none" lIns="90000" rIns="90000" tIns="45000" bIns="45000" anchor="ctr"/>
           <a:p>
+            <a:pPr>
+              <a:lnSpc>
+                <a:spcPct val="100000"/>
+              </a:lnSpc>
+            </a:pPr>
             <a:r>
               <a:rPr b="0" lang="de-DE" sz="1400" spc="-1" strike="noStrike">
                 <a:solidFill>
@@ -7120,25 +7116,21 @@
               <a:t>MillException</a:t>
             </a:r>
             <a:endParaRPr b="0" lang="de-DE" sz="1400" spc="-1" strike="noStrike">
-              <a:solidFill>
-                <a:srgbClr val="000000"/>
-              </a:solidFill>
-              <a:latin typeface="Arial"/>
-              <a:ea typeface="DejaVu Sans Mono"/>
-            </a:endParaRPr>
-          </a:p>
-        </p:txBody>
-      </p:sp>
-      <p:sp>
-        <p:nvSpPr>
-          <p:cNvPr id="143" name="CustomShape 13"/>
+              <a:latin typeface="Arial"/>
+            </a:endParaRPr>
+          </a:p>
+        </p:txBody>
+      </p:sp>
+      <p:sp>
+        <p:nvSpPr>
+          <p:cNvPr id="142" name="CustomShape 13"/>
           <p:cNvSpPr/>
           <p:nvPr/>
         </p:nvSpPr>
         <p:spPr>
           <a:xfrm>
             <a:off x="5472000" y="4464000"/>
-            <a:ext cx="1224000" cy="576000"/>
+            <a:ext cx="1223640" cy="575640"/>
           </a:xfrm>
           <a:prstGeom prst="rect">
             <a:avLst/>
@@ -7161,6 +7153,11 @@
         <p:txBody>
           <a:bodyPr wrap="none" lIns="90000" rIns="90000" tIns="45000" bIns="45000" anchor="ctr"/>
           <a:p>
+            <a:pPr>
+              <a:lnSpc>
+                <a:spcPct val="100000"/>
+              </a:lnSpc>
+            </a:pPr>
             <a:r>
               <a:rPr b="0" lang="de-DE" sz="1400" spc="-1" strike="noStrike">
                 <a:solidFill>
@@ -7172,25 +7169,21 @@
               <a:t>WinException</a:t>
             </a:r>
             <a:endParaRPr b="0" lang="de-DE" sz="1400" spc="-1" strike="noStrike">
-              <a:solidFill>
-                <a:srgbClr val="000000"/>
-              </a:solidFill>
-              <a:latin typeface="Arial"/>
-              <a:ea typeface="DejaVu Sans Mono"/>
-            </a:endParaRPr>
-          </a:p>
-        </p:txBody>
-      </p:sp>
-      <p:sp>
-        <p:nvSpPr>
-          <p:cNvPr id="144" name="CustomShape 14"/>
+              <a:latin typeface="Arial"/>
+            </a:endParaRPr>
+          </a:p>
+        </p:txBody>
+      </p:sp>
+      <p:sp>
+        <p:nvSpPr>
+          <p:cNvPr id="143" name="CustomShape 14"/>
           <p:cNvSpPr/>
           <p:nvPr/>
         </p:nvSpPr>
         <p:spPr>
           <a:xfrm>
             <a:off x="6840000" y="4464000"/>
-            <a:ext cx="1368000" cy="576000"/>
+            <a:ext cx="1367640" cy="575640"/>
           </a:xfrm>
           <a:prstGeom prst="rect">
             <a:avLst/>
@@ -7213,6 +7206,11 @@
         <p:txBody>
           <a:bodyPr wrap="none" lIns="90000" rIns="90000" tIns="45000" bIns="45000" anchor="ctr"/>
           <a:p>
+            <a:pPr>
+              <a:lnSpc>
+                <a:spcPct val="100000"/>
+              </a:lnSpc>
+            </a:pPr>
             <a:r>
               <a:rPr b="0" lang="de-DE" sz="1400" spc="-1" strike="noStrike">
                 <a:solidFill>
@@ -7224,25 +7222,21 @@
               <a:t>RemisException</a:t>
             </a:r>
             <a:endParaRPr b="0" lang="de-DE" sz="1400" spc="-1" strike="noStrike">
-              <a:solidFill>
-                <a:srgbClr val="000000"/>
-              </a:solidFill>
-              <a:latin typeface="Arial"/>
-              <a:ea typeface="DejaVu Sans Mono"/>
-            </a:endParaRPr>
-          </a:p>
-        </p:txBody>
-      </p:sp>
-      <p:sp>
-        <p:nvSpPr>
-          <p:cNvPr id="145" name="TextShape 15"/>
-          <p:cNvSpPr txBox="1"/>
+              <a:latin typeface="Arial"/>
+            </a:endParaRPr>
+          </a:p>
+        </p:txBody>
+      </p:sp>
+      <p:sp>
+        <p:nvSpPr>
+          <p:cNvPr id="144" name="CustomShape 15"/>
+          <p:cNvSpPr/>
           <p:nvPr/>
         </p:nvSpPr>
         <p:spPr>
           <a:xfrm>
             <a:off x="720000" y="4032000"/>
-            <a:ext cx="4389840" cy="346320"/>
+            <a:ext cx="4389480" cy="345960"/>
           </a:xfrm>
           <a:prstGeom prst="rect">
             <a:avLst/>
@@ -7252,9 +7246,20 @@
             <a:noFill/>
           </a:ln>
         </p:spPr>
+        <p:style>
+          <a:lnRef idx="0"/>
+          <a:fillRef idx="0"/>
+          <a:effectRef idx="0"/>
+          <a:fontRef idx="minor"/>
+        </p:style>
         <p:txBody>
           <a:bodyPr lIns="90000" rIns="90000" tIns="45000" bIns="45000"/>
           <a:p>
+            <a:pPr>
+              <a:lnSpc>
+                <a:spcPct val="100000"/>
+              </a:lnSpc>
+            </a:pPr>
             <a:r>
               <a:rPr b="0" lang="de-DE" sz="1800" spc="-1" strike="noStrike">
                 <a:latin typeface="Arial"/>
@@ -7269,14 +7274,14 @@
       </p:sp>
       <p:sp>
         <p:nvSpPr>
-          <p:cNvPr id="146" name="TextShape 16"/>
-          <p:cNvSpPr txBox="1"/>
+          <p:cNvPr id="145" name="CustomShape 16"/>
+          <p:cNvSpPr/>
           <p:nvPr/>
         </p:nvSpPr>
         <p:spPr>
           <a:xfrm>
             <a:off x="3276000" y="1944000"/>
-            <a:ext cx="1656000" cy="1114200"/>
+            <a:ext cx="1655640" cy="1113840"/>
           </a:xfrm>
           <a:prstGeom prst="rect">
             <a:avLst/>
@@ -7286,9 +7291,20 @@
             <a:noFill/>
           </a:ln>
         </p:spPr>
+        <p:style>
+          <a:lnRef idx="0"/>
+          <a:fillRef idx="0"/>
+          <a:effectRef idx="0"/>
+          <a:fontRef idx="minor"/>
+        </p:style>
         <p:txBody>
           <a:bodyPr lIns="90000" rIns="90000" tIns="45000" bIns="45000"/>
           <a:p>
+            <a:pPr>
+              <a:lnSpc>
+                <a:spcPct val="100000"/>
+              </a:lnSpc>
+            </a:pPr>
             <a:r>
               <a:rPr b="0" lang="de-DE" sz="1800" spc="-1" strike="noStrike">
                 <a:latin typeface="Arial"/>
@@ -7303,14 +7319,14 @@
       </p:sp>
       <p:sp>
         <p:nvSpPr>
-          <p:cNvPr id="147" name="TextShape 17"/>
-          <p:cNvSpPr txBox="1"/>
+          <p:cNvPr id="146" name="CustomShape 17"/>
+          <p:cNvSpPr/>
           <p:nvPr/>
         </p:nvSpPr>
         <p:spPr>
           <a:xfrm>
             <a:off x="5508000" y="1944000"/>
-            <a:ext cx="1944000" cy="1882080"/>
+            <a:ext cx="1943640" cy="1881720"/>
           </a:xfrm>
           <a:prstGeom prst="rect">
             <a:avLst/>
@@ -7320,9 +7336,20 @@
             <a:noFill/>
           </a:ln>
         </p:spPr>
+        <p:style>
+          <a:lnRef idx="0"/>
+          <a:fillRef idx="0"/>
+          <a:effectRef idx="0"/>
+          <a:fontRef idx="minor"/>
+        </p:style>
         <p:txBody>
           <a:bodyPr lIns="90000" rIns="90000" tIns="45000" bIns="45000"/>
           <a:p>
+            <a:pPr>
+              <a:lnSpc>
+                <a:spcPct val="100000"/>
+              </a:lnSpc>
+            </a:pPr>
             <a:r>
               <a:rPr b="0" lang="de-DE" sz="1800" spc="-1" strike="noStrike">
                 <a:latin typeface="Arial"/>
@@ -7334,6 +7361,11 @@
             </a:endParaRPr>
           </a:p>
           <a:p>
+            <a:pPr>
+              <a:lnSpc>
+                <a:spcPct val="100000"/>
+              </a:lnSpc>
+            </a:pPr>
             <a:r>
               <a:rPr b="0" lang="de-DE" sz="1800" spc="-1" strike="noStrike">
                 <a:latin typeface="Arial"/>
@@ -7345,6 +7377,11 @@
             </a:endParaRPr>
           </a:p>
           <a:p>
+            <a:pPr>
+              <a:lnSpc>
+                <a:spcPct val="100000"/>
+              </a:lnSpc>
+            </a:pPr>
             <a:r>
               <a:rPr b="0" lang="de-DE" sz="1800" spc="-1" strike="noStrike">
                 <a:latin typeface="Arial"/>
@@ -7359,14 +7396,14 @@
       </p:sp>
       <p:sp>
         <p:nvSpPr>
-          <p:cNvPr id="148" name="TextShape 18"/>
-          <p:cNvSpPr txBox="1"/>
+          <p:cNvPr id="147" name="CustomShape 18"/>
+          <p:cNvSpPr/>
           <p:nvPr/>
         </p:nvSpPr>
         <p:spPr>
           <a:xfrm>
             <a:off x="7632000" y="2016000"/>
-            <a:ext cx="1626840" cy="1114200"/>
+            <a:ext cx="1626480" cy="1113840"/>
           </a:xfrm>
           <a:prstGeom prst="rect">
             <a:avLst/>
@@ -7376,9 +7413,20 @@
             <a:noFill/>
           </a:ln>
         </p:spPr>
+        <p:style>
+          <a:lnRef idx="0"/>
+          <a:fillRef idx="0"/>
+          <a:effectRef idx="0"/>
+          <a:fontRef idx="minor"/>
+        </p:style>
         <p:txBody>
           <a:bodyPr lIns="90000" rIns="90000" tIns="45000" bIns="45000"/>
           <a:p>
+            <a:pPr>
+              <a:lnSpc>
+                <a:spcPct val="100000"/>
+              </a:lnSpc>
+            </a:pPr>
             <a:r>
               <a:rPr b="0" lang="de-DE" sz="1800" spc="-1" strike="noStrike">
                 <a:latin typeface="Arial"/>
@@ -7390,6 +7438,11 @@
             </a:endParaRPr>
           </a:p>
           <a:p>
+            <a:pPr>
+              <a:lnSpc>
+                <a:spcPct val="100000"/>
+              </a:lnSpc>
+            </a:pPr>
             <a:r>
               <a:rPr b="0" lang="de-DE" sz="1800" spc="-1" strike="noStrike">
                 <a:latin typeface="Arial"/>
@@ -7401,6 +7454,11 @@
             </a:endParaRPr>
           </a:p>
           <a:p>
+            <a:pPr>
+              <a:lnSpc>
+                <a:spcPct val="100000"/>
+              </a:lnSpc>
+            </a:pPr>
             <a:r>
               <a:rPr b="0" lang="de-DE" sz="1800" spc="-1" strike="noStrike">
                 <a:latin typeface="Arial"/>
@@ -7412,6 +7470,11 @@
             </a:endParaRPr>
           </a:p>
           <a:p>
+            <a:pPr>
+              <a:lnSpc>
+                <a:spcPct val="100000"/>
+              </a:lnSpc>
+            </a:pPr>
             <a:r>
               <a:rPr b="0" lang="de-DE" sz="1800" spc="-1" strike="noStrike">
                 <a:latin typeface="Arial"/>
@@ -7426,14 +7489,14 @@
       </p:sp>
       <p:sp>
         <p:nvSpPr>
-          <p:cNvPr id="149" name="TextShape 19"/>
-          <p:cNvSpPr txBox="1"/>
+          <p:cNvPr id="148" name="CustomShape 19"/>
+          <p:cNvSpPr/>
           <p:nvPr/>
         </p:nvSpPr>
         <p:spPr>
           <a:xfrm>
             <a:off x="286200" y="1944000"/>
-            <a:ext cx="2521800" cy="1370160"/>
+            <a:ext cx="2521440" cy="1369800"/>
           </a:xfrm>
           <a:prstGeom prst="rect">
             <a:avLst/>
@@ -7443,9 +7506,20 @@
             <a:noFill/>
           </a:ln>
         </p:spPr>
+        <p:style>
+          <a:lnRef idx="0"/>
+          <a:fillRef idx="0"/>
+          <a:effectRef idx="0"/>
+          <a:fontRef idx="minor"/>
+        </p:style>
         <p:txBody>
           <a:bodyPr lIns="90000" rIns="90000" tIns="45000" bIns="45000"/>
           <a:p>
+            <a:pPr>
+              <a:lnSpc>
+                <a:spcPct val="100000"/>
+              </a:lnSpc>
+            </a:pPr>
             <a:r>
               <a:rPr b="0" lang="de-DE" sz="1800" spc="-1" strike="noStrike">
                 <a:latin typeface="Arial"/>
@@ -7457,6 +7531,11 @@
             </a:endParaRPr>
           </a:p>
           <a:p>
+            <a:pPr>
+              <a:lnSpc>
+                <a:spcPct val="100000"/>
+              </a:lnSpc>
+            </a:pPr>
             <a:r>
               <a:rPr b="0" lang="de-DE" sz="1800" spc="-1" strike="noStrike">
                 <a:latin typeface="Arial"/>
@@ -7468,6 +7547,11 @@
             </a:endParaRPr>
           </a:p>
           <a:p>
+            <a:pPr>
+              <a:lnSpc>
+                <a:spcPct val="100000"/>
+              </a:lnSpc>
+            </a:pPr>
             <a:r>
               <a:rPr b="0" lang="de-DE" sz="1800" spc="-1" strike="noStrike">
                 <a:latin typeface="Arial"/>
@@ -7479,6 +7563,11 @@
             </a:endParaRPr>
           </a:p>
           <a:p>
+            <a:pPr>
+              <a:lnSpc>
+                <a:spcPct val="100000"/>
+              </a:lnSpc>
+            </a:pPr>
             <a:r>
               <a:rPr b="0" lang="de-DE" sz="1800" spc="-1" strike="noStrike">
                 <a:latin typeface="Arial"/>
@@ -7490,6 +7579,11 @@
             </a:endParaRPr>
           </a:p>
           <a:p>
+            <a:pPr>
+              <a:lnSpc>
+                <a:spcPct val="100000"/>
+              </a:lnSpc>
+            </a:pPr>
             <a:r>
               <a:rPr b="0" lang="de-DE" sz="1800" spc="-1" strike="noStrike">
                 <a:latin typeface="Arial"/>
@@ -7553,14 +7647,14 @@
       </p:grpSpPr>
       <p:sp>
         <p:nvSpPr>
-          <p:cNvPr id="150" name="CustomShape 1"/>
+          <p:cNvPr id="149" name="CustomShape 1"/>
           <p:cNvSpPr/>
           <p:nvPr/>
         </p:nvSpPr>
         <p:spPr>
           <a:xfrm>
             <a:off x="2411640" y="6445080"/>
-            <a:ext cx="6623640" cy="359280"/>
+            <a:ext cx="6623280" cy="358920"/>
           </a:xfrm>
           <a:prstGeom prst="rect">
             <a:avLst/>
@@ -7602,14 +7696,14 @@
       </p:sp>
       <p:sp>
         <p:nvSpPr>
-          <p:cNvPr id="151" name="CustomShape 2"/>
+          <p:cNvPr id="150" name="CustomShape 2"/>
           <p:cNvSpPr/>
           <p:nvPr/>
         </p:nvSpPr>
         <p:spPr>
           <a:xfrm>
             <a:off x="390600" y="418680"/>
-            <a:ext cx="6700680" cy="560880"/>
+            <a:ext cx="6700320" cy="560520"/>
           </a:xfrm>
           <a:prstGeom prst="rect">
             <a:avLst/>
@@ -7661,14 +7755,14 @@
       </p:sp>
       <p:sp>
         <p:nvSpPr>
-          <p:cNvPr id="152" name="CustomShape 3"/>
+          <p:cNvPr id="151" name="CustomShape 3"/>
           <p:cNvSpPr/>
           <p:nvPr/>
         </p:nvSpPr>
         <p:spPr>
           <a:xfrm>
             <a:off x="392040" y="1198440"/>
-            <a:ext cx="8355600" cy="4893120"/>
+            <a:ext cx="8355240" cy="4892760"/>
           </a:xfrm>
           <a:prstGeom prst="rect">
             <a:avLst/>
@@ -7713,14 +7807,14 @@
       </p:sp>
       <p:sp>
         <p:nvSpPr>
-          <p:cNvPr id="153" name="CustomShape 4"/>
+          <p:cNvPr id="152" name="CustomShape 4"/>
           <p:cNvSpPr/>
           <p:nvPr/>
         </p:nvSpPr>
         <p:spPr>
           <a:xfrm>
             <a:off x="1079640" y="6444000"/>
-            <a:ext cx="1258920" cy="358920"/>
+            <a:ext cx="1258560" cy="358560"/>
           </a:xfrm>
           <a:prstGeom prst="rect">
             <a:avLst/>
@@ -7762,14 +7856,14 @@
       </p:sp>
       <p:sp>
         <p:nvSpPr>
-          <p:cNvPr id="154" name="CustomShape 5"/>
+          <p:cNvPr id="153" name="CustomShape 5"/>
           <p:cNvSpPr/>
           <p:nvPr/>
         </p:nvSpPr>
         <p:spPr>
           <a:xfrm>
             <a:off x="392040" y="1198440"/>
-            <a:ext cx="8355600" cy="4893120"/>
+            <a:ext cx="8355240" cy="4892760"/>
           </a:xfrm>
           <a:prstGeom prst="rect">
             <a:avLst/>
@@ -7856,14 +7950,14 @@
       </p:sp>
       <p:sp>
         <p:nvSpPr>
-          <p:cNvPr id="155" name="CustomShape 6"/>
+          <p:cNvPr id="154" name="CustomShape 6"/>
           <p:cNvSpPr/>
           <p:nvPr/>
         </p:nvSpPr>
         <p:spPr>
           <a:xfrm>
             <a:off x="4680000" y="3168000"/>
-            <a:ext cx="1224000" cy="576000"/>
+            <a:ext cx="1223640" cy="575640"/>
           </a:xfrm>
           <a:prstGeom prst="rect">
             <a:avLst/>
@@ -7886,10 +7980,18 @@
         <p:txBody>
           <a:bodyPr wrap="none" lIns="90000" rIns="90000" tIns="45000" bIns="45000" anchor="ctr"/>
           <a:p>
-            <a:pPr algn="ctr"/>
+            <a:pPr algn="ctr">
+              <a:lnSpc>
+                <a:spcPct val="100000"/>
+              </a:lnSpc>
+            </a:pPr>
             <a:r>
               <a:rPr b="0" lang="de-DE" sz="1400" spc="-1" strike="noStrike">
-                <a:latin typeface="Arial"/>
+                <a:solidFill>
+                  <a:srgbClr val="000000"/>
+                </a:solidFill>
+                <a:latin typeface="Arial"/>
+                <a:ea typeface="DejaVu Sans"/>
               </a:rPr>
               <a:t>MyDialog</a:t>
             </a:r>
@@ -7901,14 +8003,14 @@
       </p:sp>
       <p:sp>
         <p:nvSpPr>
-          <p:cNvPr id="156" name="CustomShape 7"/>
+          <p:cNvPr id="155" name="CustomShape 7"/>
           <p:cNvSpPr/>
           <p:nvPr/>
         </p:nvSpPr>
         <p:spPr>
           <a:xfrm>
             <a:off x="720000" y="4536000"/>
-            <a:ext cx="1224000" cy="576000"/>
+            <a:ext cx="1223640" cy="575640"/>
           </a:xfrm>
           <a:prstGeom prst="rect">
             <a:avLst/>
@@ -7931,6 +8033,11 @@
         <p:txBody>
           <a:bodyPr wrap="none" lIns="90000" rIns="90000" tIns="45000" bIns="45000" anchor="ctr"/>
           <a:p>
+            <a:pPr>
+              <a:lnSpc>
+                <a:spcPct val="100000"/>
+              </a:lnSpc>
+            </a:pPr>
             <a:r>
               <a:rPr b="0" lang="de-DE" sz="1400" spc="-1" strike="noStrike">
                 <a:solidFill>
@@ -7942,25 +8049,21 @@
               <a:t>token_label</a:t>
             </a:r>
             <a:endParaRPr b="0" lang="de-DE" sz="1400" spc="-1" strike="noStrike">
-              <a:solidFill>
-                <a:srgbClr val="000000"/>
-              </a:solidFill>
-              <a:latin typeface="Arial"/>
-              <a:ea typeface="DejaVu Sans Mono"/>
-            </a:endParaRPr>
-          </a:p>
-        </p:txBody>
-      </p:sp>
-      <p:sp>
-        <p:nvSpPr>
-          <p:cNvPr id="157" name="CustomShape 8"/>
+              <a:latin typeface="Arial"/>
+            </a:endParaRPr>
+          </a:p>
+        </p:txBody>
+      </p:sp>
+      <p:sp>
+        <p:nvSpPr>
+          <p:cNvPr id="156" name="CustomShape 8"/>
           <p:cNvSpPr/>
           <p:nvPr/>
         </p:nvSpPr>
         <p:spPr>
           <a:xfrm>
             <a:off x="2520000" y="4536000"/>
-            <a:ext cx="1512000" cy="576000"/>
+            <a:ext cx="1584000" cy="575640"/>
           </a:xfrm>
           <a:prstGeom prst="rect">
             <a:avLst/>
@@ -7983,6 +8086,11 @@
         <p:txBody>
           <a:bodyPr wrap="none" lIns="90000" rIns="90000" tIns="45000" bIns="45000" anchor="ctr"/>
           <a:p>
+            <a:pPr>
+              <a:lnSpc>
+                <a:spcPct val="100000"/>
+              </a:lnSpc>
+            </a:pPr>
             <a:r>
               <a:rPr b="0" lang="de-DE" sz="1400" spc="-1" strike="noStrike">
                 <a:solidFill>
@@ -7994,25 +8102,21 @@
               <a:t>playing_field_label</a:t>
             </a:r>
             <a:endParaRPr b="0" lang="de-DE" sz="1400" spc="-1" strike="noStrike">
-              <a:solidFill>
-                <a:srgbClr val="000000"/>
-              </a:solidFill>
-              <a:latin typeface="Arial"/>
-              <a:ea typeface="DejaVu Sans Mono"/>
-            </a:endParaRPr>
-          </a:p>
-        </p:txBody>
-      </p:sp>
-      <p:sp>
-        <p:nvSpPr>
-          <p:cNvPr id="158" name="CustomShape 9"/>
+              <a:latin typeface="Arial"/>
+            </a:endParaRPr>
+          </a:p>
+        </p:txBody>
+      </p:sp>
+      <p:sp>
+        <p:nvSpPr>
+          <p:cNvPr id="157" name="CustomShape 9"/>
           <p:cNvSpPr/>
           <p:nvPr/>
         </p:nvSpPr>
         <p:spPr>
           <a:xfrm>
             <a:off x="7128000" y="4579560"/>
-            <a:ext cx="1224000" cy="576000"/>
+            <a:ext cx="1223640" cy="575640"/>
           </a:xfrm>
           <a:prstGeom prst="rect">
             <a:avLst/>
@@ -8035,10 +8139,18 @@
         <p:txBody>
           <a:bodyPr wrap="none" lIns="90000" rIns="90000" tIns="45000" bIns="45000" anchor="ctr"/>
           <a:p>
-            <a:pPr algn="ctr"/>
+            <a:pPr algn="ctr">
+              <a:lnSpc>
+                <a:spcPct val="100000"/>
+              </a:lnSpc>
+            </a:pPr>
             <a:r>
               <a:rPr b="0" lang="de-DE" sz="1400" spc="-1" strike="noStrike">
-                <a:latin typeface="Arial"/>
+                <a:solidFill>
+                  <a:srgbClr val="000000"/>
+                </a:solidFill>
+                <a:latin typeface="Arial"/>
+                <a:ea typeface="DejaVu Sans"/>
               </a:rPr>
               <a:t>Window</a:t>
             </a:r>
@@ -8050,14 +8162,14 @@
       </p:sp>
       <p:sp>
         <p:nvSpPr>
-          <p:cNvPr id="159" name="CustomShape 10"/>
+          <p:cNvPr id="158" name="CustomShape 10"/>
           <p:cNvSpPr/>
           <p:nvPr/>
         </p:nvSpPr>
         <p:spPr>
           <a:xfrm>
             <a:off x="7128000" y="3204000"/>
-            <a:ext cx="1224000" cy="576000"/>
+            <a:ext cx="1223640" cy="575640"/>
           </a:xfrm>
           <a:prstGeom prst="rect">
             <a:avLst/>
@@ -8080,10 +8192,18 @@
         <p:txBody>
           <a:bodyPr wrap="none" lIns="90000" rIns="90000" tIns="45000" bIns="45000" anchor="ctr"/>
           <a:p>
-            <a:pPr algn="ctr"/>
+            <a:pPr algn="ctr">
+              <a:lnSpc>
+                <a:spcPct val="100000"/>
+              </a:lnSpc>
+            </a:pPr>
             <a:r>
               <a:rPr b="0" lang="de-DE" sz="1400" spc="-1" strike="noStrike">
-                <a:latin typeface="Arial"/>
+                <a:solidFill>
+                  <a:srgbClr val="000000"/>
+                </a:solidFill>
+                <a:latin typeface="Arial"/>
+                <a:ea typeface="DejaVu Sans"/>
               </a:rPr>
               <a:t>QWidget</a:t>
             </a:r>
@@ -8095,14 +8215,14 @@
       </p:sp>
       <p:sp>
         <p:nvSpPr>
-          <p:cNvPr id="160" name="CustomShape 11"/>
+          <p:cNvPr id="159" name="CustomShape 11"/>
           <p:cNvSpPr/>
           <p:nvPr/>
         </p:nvSpPr>
         <p:spPr>
           <a:xfrm>
             <a:off x="1620000" y="3168000"/>
-            <a:ext cx="1224000" cy="576000"/>
+            <a:ext cx="1223640" cy="575640"/>
           </a:xfrm>
           <a:prstGeom prst="rect">
             <a:avLst/>
@@ -8125,10 +8245,18 @@
         <p:txBody>
           <a:bodyPr wrap="none" lIns="90000" rIns="90000" tIns="45000" bIns="45000" anchor="ctr"/>
           <a:p>
-            <a:pPr algn="ctr"/>
+            <a:pPr algn="ctr">
+              <a:lnSpc>
+                <a:spcPct val="100000"/>
+              </a:lnSpc>
+            </a:pPr>
             <a:r>
               <a:rPr b="0" lang="de-DE" sz="1400" spc="-1" strike="noStrike">
-                <a:latin typeface="Arial"/>
+                <a:solidFill>
+                  <a:srgbClr val="000000"/>
+                </a:solidFill>
+                <a:latin typeface="Arial"/>
+                <a:ea typeface="DejaVu Sans"/>
               </a:rPr>
               <a:t>QLabel</a:t>
             </a:r>
@@ -8140,14 +8268,14 @@
       </p:sp>
       <p:sp>
         <p:nvSpPr>
-          <p:cNvPr id="161" name="CustomShape 12"/>
+          <p:cNvPr id="160" name="CustomShape 12"/>
           <p:cNvSpPr/>
           <p:nvPr/>
         </p:nvSpPr>
         <p:spPr>
           <a:xfrm>
             <a:off x="4680000" y="1800000"/>
-            <a:ext cx="1224000" cy="576000"/>
+            <a:ext cx="1223640" cy="575640"/>
           </a:xfrm>
           <a:prstGeom prst="rect">
             <a:avLst/>
@@ -8170,7 +8298,11 @@
         <p:txBody>
           <a:bodyPr wrap="none" lIns="90000" rIns="90000" tIns="45000" bIns="45000" anchor="ctr"/>
           <a:p>
-            <a:pPr algn="ctr"/>
+            <a:pPr algn="ctr">
+              <a:lnSpc>
+                <a:spcPct val="100000"/>
+              </a:lnSpc>
+            </a:pPr>
             <a:r>
               <a:rPr b="0" lang="de-DE" sz="900" spc="-1" strike="noStrike">
                 <a:solidFill>
@@ -8186,7 +8318,11 @@
             </a:endParaRPr>
           </a:p>
           <a:p>
-            <a:pPr algn="ctr"/>
+            <a:pPr algn="ctr">
+              <a:lnSpc>
+                <a:spcPct val="100000"/>
+              </a:lnSpc>
+            </a:pPr>
             <a:r>
               <a:rPr b="0" lang="de-DE" sz="900" spc="-1" strike="noStrike">
                 <a:solidFill>
@@ -8205,14 +8341,14 @@
       </p:sp>
       <p:sp>
         <p:nvSpPr>
-          <p:cNvPr id="162" name="Line 13"/>
+          <p:cNvPr id="161" name="Line 13"/>
           <p:cNvSpPr/>
           <p:nvPr/>
         </p:nvSpPr>
         <p:spPr>
           <a:xfrm flipV="1">
             <a:off x="5220000" y="2376000"/>
-            <a:ext cx="0" cy="792000"/>
+            <a:ext cx="360" cy="792000"/>
           </a:xfrm>
           <a:prstGeom prst="line">
             <a:avLst/>
@@ -8233,14 +8369,14 @@
       </p:sp>
       <p:sp>
         <p:nvSpPr>
-          <p:cNvPr id="163" name="Line 14"/>
+          <p:cNvPr id="162" name="Line 14"/>
           <p:cNvSpPr/>
           <p:nvPr/>
         </p:nvSpPr>
         <p:spPr>
           <a:xfrm flipV="1">
             <a:off x="7704000" y="3787560"/>
-            <a:ext cx="0" cy="792000"/>
+            <a:ext cx="360" cy="792000"/>
           </a:xfrm>
           <a:prstGeom prst="line">
             <a:avLst/>
@@ -8261,14 +8397,14 @@
       </p:sp>
       <p:sp>
         <p:nvSpPr>
-          <p:cNvPr id="164" name="CustomShape 15"/>
+          <p:cNvPr id="163" name="CustomShape 15"/>
           <p:cNvSpPr/>
           <p:nvPr/>
         </p:nvSpPr>
         <p:spPr>
           <a:xfrm>
             <a:off x="504000" y="2448000"/>
-            <a:ext cx="3744000" cy="3672000"/>
+            <a:ext cx="3743640" cy="3671640"/>
           </a:xfrm>
           <a:prstGeom prst="rect">
             <a:avLst/>
@@ -8289,14 +8425,14 @@
       </p:sp>
       <p:sp>
         <p:nvSpPr>
-          <p:cNvPr id="165" name="TextShape 16"/>
-          <p:cNvSpPr txBox="1"/>
+          <p:cNvPr id="164" name="CustomShape 16"/>
+          <p:cNvSpPr/>
           <p:nvPr/>
         </p:nvSpPr>
         <p:spPr>
           <a:xfrm>
             <a:off x="720000" y="2664000"/>
-            <a:ext cx="3211920" cy="346320"/>
+            <a:ext cx="3211560" cy="345960"/>
           </a:xfrm>
           <a:prstGeom prst="rect">
             <a:avLst/>
@@ -8306,9 +8442,20 @@
             <a:noFill/>
           </a:ln>
         </p:spPr>
+        <p:style>
+          <a:lnRef idx="0"/>
+          <a:fillRef idx="0"/>
+          <a:effectRef idx="0"/>
+          <a:fontRef idx="minor"/>
+        </p:style>
         <p:txBody>
           <a:bodyPr lIns="90000" rIns="90000" tIns="45000" bIns="45000"/>
           <a:p>
+            <a:pPr>
+              <a:lnSpc>
+                <a:spcPct val="100000"/>
+              </a:lnSpc>
+            </a:pPr>
             <a:r>
               <a:rPr b="0" lang="de-DE" sz="1800" spc="-1" strike="noStrike">
                 <a:latin typeface="Arial"/>
@@ -8323,14 +8470,14 @@
       </p:sp>
       <p:sp>
         <p:nvSpPr>
-          <p:cNvPr id="166" name="CustomShape 17"/>
+          <p:cNvPr id="165" name="CustomShape 17"/>
           <p:cNvSpPr/>
           <p:nvPr/>
         </p:nvSpPr>
         <p:spPr>
           <a:xfrm>
             <a:off x="720000" y="5256000"/>
-            <a:ext cx="3312000" cy="835560"/>
+            <a:ext cx="3311640" cy="835200"/>
           </a:xfrm>
           <a:prstGeom prst="rect">
             <a:avLst/>
@@ -8353,10 +8500,18 @@
         <p:txBody>
           <a:bodyPr wrap="none" lIns="90000" rIns="90000" tIns="45000" bIns="45000" anchor="ctr"/>
           <a:p>
-            <a:pPr algn="ctr"/>
+            <a:pPr algn="ctr">
+              <a:lnSpc>
+                <a:spcPct val="100000"/>
+              </a:lnSpc>
+            </a:pPr>
             <a:r>
               <a:rPr b="0" lang="de-DE" sz="1600" spc="-1" strike="noStrike">
-                <a:latin typeface="Arial"/>
+                <a:solidFill>
+                  <a:srgbClr val="000000"/>
+                </a:solidFill>
+                <a:latin typeface="Arial"/>
+                <a:ea typeface="DejaVu Sans"/>
               </a:rPr>
               <a:t>Drag and Drop Funktionalität</a:t>
             </a:r>
@@ -8368,14 +8523,14 @@
       </p:sp>
       <p:sp>
         <p:nvSpPr>
-          <p:cNvPr id="167" name="Line 18"/>
+          <p:cNvPr id="166" name="Line 18"/>
           <p:cNvSpPr/>
           <p:nvPr/>
         </p:nvSpPr>
         <p:spPr>
           <a:xfrm flipV="1">
             <a:off x="2736000" y="3744000"/>
-            <a:ext cx="0" cy="792000"/>
+            <a:ext cx="360" cy="792000"/>
           </a:xfrm>
           <a:prstGeom prst="line">
             <a:avLst/>
@@ -8396,14 +8551,14 @@
       </p:sp>
       <p:sp>
         <p:nvSpPr>
-          <p:cNvPr id="168" name="Line 19"/>
+          <p:cNvPr id="167" name="Line 19"/>
           <p:cNvSpPr/>
           <p:nvPr/>
         </p:nvSpPr>
         <p:spPr>
           <a:xfrm flipV="1">
             <a:off x="1800000" y="3744000"/>
-            <a:ext cx="0" cy="792000"/>
+            <a:ext cx="360" cy="792000"/>
           </a:xfrm>
           <a:prstGeom prst="line">
             <a:avLst/>
@@ -8424,14 +8579,14 @@
       </p:sp>
       <p:sp>
         <p:nvSpPr>
-          <p:cNvPr id="169" name="CustomShape 20"/>
+          <p:cNvPr id="168" name="CustomShape 20"/>
           <p:cNvSpPr/>
           <p:nvPr/>
         </p:nvSpPr>
         <p:spPr>
           <a:xfrm>
             <a:off x="6408000" y="2412000"/>
-            <a:ext cx="2520000" cy="3744000"/>
+            <a:ext cx="2519640" cy="3743640"/>
           </a:xfrm>
           <a:prstGeom prst="rect">
             <a:avLst/>
@@ -8452,14 +8607,14 @@
       </p:sp>
       <p:sp>
         <p:nvSpPr>
-          <p:cNvPr id="170" name="CustomShape 21"/>
+          <p:cNvPr id="169" name="CustomShape 21"/>
           <p:cNvSpPr/>
           <p:nvPr/>
         </p:nvSpPr>
         <p:spPr>
           <a:xfrm>
             <a:off x="6552000" y="5256000"/>
-            <a:ext cx="2304000" cy="864000"/>
+            <a:ext cx="2303640" cy="863640"/>
           </a:xfrm>
           <a:prstGeom prst="rect">
             <a:avLst/>
@@ -8482,10 +8637,18 @@
         <p:txBody>
           <a:bodyPr wrap="none" lIns="90000" rIns="90000" tIns="45000" bIns="45000" anchor="ctr"/>
           <a:p>
-            <a:pPr algn="ctr"/>
+            <a:pPr algn="ctr">
+              <a:lnSpc>
+                <a:spcPct val="100000"/>
+              </a:lnSpc>
+            </a:pPr>
             <a:r>
               <a:rPr b="0" lang="de-DE" sz="1600" spc="-1" strike="noStrike">
-                <a:latin typeface="Arial"/>
+                <a:solidFill>
+                  <a:srgbClr val="000000"/>
+                </a:solidFill>
+                <a:latin typeface="Arial"/>
+                <a:ea typeface="DejaVu Sans"/>
               </a:rPr>
               <a:t>Öffnen eines </a:t>
             </a:r>
@@ -8494,10 +8657,18 @@
             </a:endParaRPr>
           </a:p>
           <a:p>
-            <a:pPr algn="ctr"/>
+            <a:pPr algn="ctr">
+              <a:lnSpc>
+                <a:spcPct val="100000"/>
+              </a:lnSpc>
+            </a:pPr>
             <a:r>
               <a:rPr b="0" lang="de-DE" sz="1600" spc="-1" strike="noStrike">
-                <a:latin typeface="Arial"/>
+                <a:solidFill>
+                  <a:srgbClr val="000000"/>
+                </a:solidFill>
+                <a:latin typeface="Arial"/>
+                <a:ea typeface="DejaVu Sans"/>
               </a:rPr>
               <a:t>Popup-Fensters</a:t>
             </a:r>
@@ -8509,14 +8680,14 @@
       </p:sp>
       <p:sp>
         <p:nvSpPr>
-          <p:cNvPr id="171" name="CustomShape 22"/>
+          <p:cNvPr id="170" name="CustomShape 22"/>
           <p:cNvSpPr/>
           <p:nvPr/>
         </p:nvSpPr>
         <p:spPr>
           <a:xfrm>
             <a:off x="392040" y="1198440"/>
-            <a:ext cx="8607960" cy="5065560"/>
+            <a:ext cx="8607600" cy="5065200"/>
           </a:xfrm>
           <a:prstGeom prst="rect">
             <a:avLst/>
@@ -8538,14 +8709,14 @@
       </p:sp>
       <p:sp>
         <p:nvSpPr>
-          <p:cNvPr id="172" name="CustomShape 23"/>
+          <p:cNvPr id="171" name="CustomShape 23"/>
           <p:cNvSpPr/>
           <p:nvPr/>
         </p:nvSpPr>
         <p:spPr>
           <a:xfrm>
             <a:off x="4608000" y="3888000"/>
-            <a:ext cx="1440000" cy="1944000"/>
+            <a:ext cx="1439640" cy="1943640"/>
           </a:xfrm>
           <a:prstGeom prst="rect">
             <a:avLst/>
@@ -8568,10 +8739,18 @@
         <p:txBody>
           <a:bodyPr wrap="none" lIns="90000" rIns="90000" tIns="45000" bIns="45000" anchor="ctr"/>
           <a:p>
-            <a:pPr algn="ctr"/>
+            <a:pPr algn="ctr">
+              <a:lnSpc>
+                <a:spcPct val="100000"/>
+              </a:lnSpc>
+            </a:pPr>
             <a:r>
               <a:rPr b="0" lang="de-DE" sz="1600" spc="-1" strike="noStrike">
-                <a:latin typeface="Arial"/>
+                <a:solidFill>
+                  <a:srgbClr val="000000"/>
+                </a:solidFill>
+                <a:latin typeface="Arial"/>
+                <a:ea typeface="DejaVu Sans"/>
               </a:rPr>
               <a:t>Öffnen der </a:t>
             </a:r>
@@ -8580,10 +8759,18 @@
             </a:endParaRPr>
           </a:p>
           <a:p>
-            <a:pPr algn="ctr"/>
+            <a:pPr algn="ctr">
+              <a:lnSpc>
+                <a:spcPct val="100000"/>
+              </a:lnSpc>
+            </a:pPr>
             <a:r>
               <a:rPr b="0" lang="de-DE" sz="1600" spc="-1" strike="noStrike">
-                <a:latin typeface="Arial"/>
+                <a:solidFill>
+                  <a:srgbClr val="000000"/>
+                </a:solidFill>
+                <a:latin typeface="Arial"/>
+                <a:ea typeface="DejaVu Sans"/>
               </a:rPr>
               <a:t>graphischen </a:t>
             </a:r>
@@ -8592,10 +8779,18 @@
             </a:endParaRPr>
           </a:p>
           <a:p>
-            <a:pPr algn="ctr"/>
+            <a:pPr algn="ctr">
+              <a:lnSpc>
+                <a:spcPct val="100000"/>
+              </a:lnSpc>
+            </a:pPr>
             <a:r>
               <a:rPr b="0" lang="de-DE" sz="1600" spc="-1" strike="noStrike">
-                <a:latin typeface="Arial"/>
+                <a:solidFill>
+                  <a:srgbClr val="000000"/>
+                </a:solidFill>
+                <a:latin typeface="Arial"/>
+                <a:ea typeface="DejaVu Sans"/>
               </a:rPr>
               <a:t>Oberfläche </a:t>
             </a:r>
@@ -8604,10 +8799,18 @@
             </a:endParaRPr>
           </a:p>
           <a:p>
-            <a:pPr algn="ctr"/>
+            <a:pPr algn="ctr">
+              <a:lnSpc>
+                <a:spcPct val="100000"/>
+              </a:lnSpc>
+            </a:pPr>
             <a:r>
               <a:rPr b="0" lang="de-DE" sz="1600" spc="-1" strike="noStrike">
-                <a:latin typeface="Arial"/>
+                <a:solidFill>
+                  <a:srgbClr val="000000"/>
+                </a:solidFill>
+                <a:latin typeface="Arial"/>
+                <a:ea typeface="DejaVu Sans"/>
               </a:rPr>
               <a:t>mit initUI</a:t>
             </a:r>
@@ -8619,14 +8822,14 @@
       </p:sp>
       <p:sp>
         <p:nvSpPr>
-          <p:cNvPr id="173" name="CustomShape 24"/>
+          <p:cNvPr id="172" name="CustomShape 24"/>
           <p:cNvSpPr/>
           <p:nvPr/>
         </p:nvSpPr>
         <p:spPr>
           <a:xfrm>
             <a:off x="4248000" y="1198440"/>
-            <a:ext cx="2160000" cy="529560"/>
+            <a:ext cx="2159640" cy="529200"/>
           </a:xfrm>
           <a:prstGeom prst="rect">
             <a:avLst/>
@@ -8649,10 +8852,18 @@
         <p:txBody>
           <a:bodyPr wrap="none" lIns="90000" rIns="90000" tIns="45000" bIns="45000" anchor="ctr"/>
           <a:p>
-            <a:pPr algn="ctr"/>
+            <a:pPr algn="ctr">
+              <a:lnSpc>
+                <a:spcPct val="100000"/>
+              </a:lnSpc>
+            </a:pPr>
             <a:r>
               <a:rPr b="0" lang="de-DE" sz="1600" spc="-1" strike="noStrike">
-                <a:latin typeface="Arial"/>
+                <a:solidFill>
+                  <a:srgbClr val="000000"/>
+                </a:solidFill>
+                <a:latin typeface="Arial"/>
+                <a:ea typeface="DejaVu Sans"/>
               </a:rPr>
               <a:t>Einlesen der UI-Datei </a:t>
             </a:r>
@@ -8661,10 +8872,18 @@
             </a:endParaRPr>
           </a:p>
           <a:p>
-            <a:pPr algn="ctr"/>
+            <a:pPr algn="ctr">
+              <a:lnSpc>
+                <a:spcPct val="100000"/>
+              </a:lnSpc>
+            </a:pPr>
             <a:r>
               <a:rPr b="0" lang="de-DE" sz="1600" spc="-1" strike="noStrike">
-                <a:latin typeface="Arial"/>
+                <a:solidFill>
+                  <a:srgbClr val="000000"/>
+                </a:solidFill>
+                <a:latin typeface="Arial"/>
+                <a:ea typeface="DejaVu Sans"/>
               </a:rPr>
               <a:t>des Qt-Designers</a:t>
             </a:r>
@@ -8725,14 +8944,14 @@
       </p:grpSpPr>
       <p:sp>
         <p:nvSpPr>
-          <p:cNvPr id="174" name="CustomShape 1"/>
+          <p:cNvPr id="173" name="CustomShape 1"/>
           <p:cNvSpPr/>
           <p:nvPr/>
         </p:nvSpPr>
         <p:spPr>
           <a:xfrm>
             <a:off x="2411640" y="6445080"/>
-            <a:ext cx="6623640" cy="359280"/>
+            <a:ext cx="6623280" cy="358920"/>
           </a:xfrm>
           <a:prstGeom prst="rect">
             <a:avLst/>
@@ -8774,14 +8993,14 @@
       </p:sp>
       <p:sp>
         <p:nvSpPr>
-          <p:cNvPr id="175" name="CustomShape 2"/>
+          <p:cNvPr id="174" name="CustomShape 2"/>
           <p:cNvSpPr/>
           <p:nvPr/>
         </p:nvSpPr>
         <p:spPr>
           <a:xfrm>
             <a:off x="390600" y="418680"/>
-            <a:ext cx="6700680" cy="560880"/>
+            <a:ext cx="6700320" cy="560520"/>
           </a:xfrm>
           <a:prstGeom prst="rect">
             <a:avLst/>
@@ -8813,46 +9032,16 @@
                 <a:latin typeface="Arial"/>
                 <a:ea typeface="DejaVu Sans"/>
               </a:rPr>
-              <a:t>3) </a:t>
-            </a:r>
-            <a:r>
-              <a:rPr b="0" lang="de-DE" sz="2400" spc="-1" strike="noStrike">
+              <a:t>3) Softwarearchitektur: </a:t>
+            </a:r>
+            <a:r>
+              <a:rPr b="0" lang="de-DE" sz="2000" spc="-1" strike="noStrike">
                 <a:solidFill>
                   <a:srgbClr val="000000"/>
                 </a:solidFill>
                 <a:latin typeface="Arial"/>
                 <a:ea typeface="DejaVu Sans"/>
               </a:rPr>
-              <a:t>Softwar</a:t>
-            </a:r>
-            <a:r>
-              <a:rPr b="0" lang="de-DE" sz="2400" spc="-1" strike="noStrike">
-                <a:solidFill>
-                  <a:srgbClr val="000000"/>
-                </a:solidFill>
-                <a:latin typeface="Arial"/>
-                <a:ea typeface="DejaVu Sans"/>
-              </a:rPr>
-              <a:t>earchit</a:t>
-            </a:r>
-            <a:r>
-              <a:rPr b="0" lang="de-DE" sz="2400" spc="-1" strike="noStrike">
-                <a:solidFill>
-                  <a:srgbClr val="000000"/>
-                </a:solidFill>
-                <a:latin typeface="Arial"/>
-                <a:ea typeface="DejaVu Sans"/>
-              </a:rPr>
-              <a:t>ektur: </a:t>
-            </a:r>
-            <a:r>
-              <a:rPr b="0" lang="de-DE" sz="2000" spc="-1" strike="noStrike">
-                <a:solidFill>
-                  <a:srgbClr val="000000"/>
-                </a:solidFill>
-                <a:latin typeface="Arial"/>
-                <a:ea typeface="DejaVu Sans"/>
-              </a:rPr>
               <a:t>Klassen</a:t>
             </a:r>
             <a:endParaRPr b="0" lang="de-DE" sz="2000" spc="-1" strike="noStrike">
@@ -8863,14 +9052,14 @@
       </p:sp>
       <p:sp>
         <p:nvSpPr>
-          <p:cNvPr id="176" name="CustomShape 3"/>
+          <p:cNvPr id="175" name="CustomShape 3"/>
           <p:cNvSpPr/>
           <p:nvPr/>
         </p:nvSpPr>
         <p:spPr>
           <a:xfrm>
             <a:off x="392040" y="1198440"/>
-            <a:ext cx="8355600" cy="4893120"/>
+            <a:ext cx="8355240" cy="4892760"/>
           </a:xfrm>
           <a:prstGeom prst="rect">
             <a:avLst/>
@@ -8915,14 +9104,14 @@
       </p:sp>
       <p:sp>
         <p:nvSpPr>
-          <p:cNvPr id="177" name="CustomShape 4"/>
+          <p:cNvPr id="176" name="CustomShape 4"/>
           <p:cNvSpPr/>
           <p:nvPr/>
         </p:nvSpPr>
         <p:spPr>
           <a:xfrm>
             <a:off x="1079640" y="6444000"/>
-            <a:ext cx="1258920" cy="358920"/>
+            <a:ext cx="1258560" cy="358560"/>
           </a:xfrm>
           <a:prstGeom prst="rect">
             <a:avLst/>
@@ -8964,14 +9153,14 @@
       </p:sp>
       <p:sp>
         <p:nvSpPr>
-          <p:cNvPr id="178" name="CustomShape 5"/>
+          <p:cNvPr id="177" name="CustomShape 5"/>
           <p:cNvSpPr/>
           <p:nvPr/>
         </p:nvSpPr>
         <p:spPr>
           <a:xfrm>
             <a:off x="392040" y="1198440"/>
-            <a:ext cx="8355600" cy="4893120"/>
+            <a:ext cx="8355240" cy="4892760"/>
           </a:xfrm>
           <a:prstGeom prst="rect">
             <a:avLst/>
@@ -9058,14 +9247,14 @@
       </p:sp>
       <p:sp>
         <p:nvSpPr>
-          <p:cNvPr id="179" name="CustomShape 6"/>
+          <p:cNvPr id="178" name="CustomShape 6"/>
           <p:cNvSpPr/>
           <p:nvPr/>
         </p:nvSpPr>
         <p:spPr>
           <a:xfrm>
             <a:off x="720000" y="4140000"/>
-            <a:ext cx="4896000" cy="576000"/>
+            <a:ext cx="4895640" cy="575640"/>
           </a:xfrm>
           <a:prstGeom prst="rect">
             <a:avLst/>
@@ -9088,6 +9277,11 @@
         <p:txBody>
           <a:bodyPr wrap="none" lIns="90000" rIns="90000" tIns="45000" bIns="45000" anchor="ctr"/>
           <a:p>
+            <a:pPr>
+              <a:lnSpc>
+                <a:spcPct val="100000"/>
+              </a:lnSpc>
+            </a:pPr>
             <a:r>
               <a:rPr b="0" lang="de-DE" sz="1400" spc="-1" strike="noStrike">
                 <a:solidFill>
@@ -9099,25 +9293,21 @@
               <a:t>Neue Game Instanz durch self.game = Game() erzeugt</a:t>
             </a:r>
             <a:endParaRPr b="0" lang="de-DE" sz="1400" spc="-1" strike="noStrike">
-              <a:solidFill>
-                <a:srgbClr val="000000"/>
-              </a:solidFill>
-              <a:latin typeface="Arial"/>
-              <a:ea typeface="DejaVu Sans Mono"/>
-            </a:endParaRPr>
-          </a:p>
-        </p:txBody>
-      </p:sp>
-      <p:sp>
-        <p:nvSpPr>
-          <p:cNvPr id="180" name="CustomShape 7"/>
+              <a:latin typeface="Arial"/>
+            </a:endParaRPr>
+          </a:p>
+        </p:txBody>
+      </p:sp>
+      <p:sp>
+        <p:nvSpPr>
+          <p:cNvPr id="179" name="CustomShape 7"/>
           <p:cNvSpPr/>
           <p:nvPr/>
         </p:nvSpPr>
         <p:spPr>
           <a:xfrm>
             <a:off x="720000" y="1296000"/>
-            <a:ext cx="4896000" cy="2448000"/>
+            <a:ext cx="4895640" cy="2447640"/>
           </a:xfrm>
           <a:prstGeom prst="rect">
             <a:avLst/>
@@ -9140,9 +9330,18 @@
         <p:txBody>
           <a:bodyPr wrap="none" lIns="90000" rIns="90000" tIns="45000" bIns="45000" anchor="ctr"/>
           <a:p>
+            <a:pPr>
+              <a:lnSpc>
+                <a:spcPct val="100000"/>
+              </a:lnSpc>
+            </a:pPr>
             <a:r>
               <a:rPr b="0" lang="de-DE" sz="1400" spc="-1" strike="noStrike">
-                <a:latin typeface="Arial"/>
+                <a:solidFill>
+                  <a:srgbClr val="000000"/>
+                </a:solidFill>
+                <a:latin typeface="Arial"/>
+                <a:ea typeface="DejaVu Sans"/>
               </a:rPr>
               <a:t>class MyDialog(</a:t>
             </a:r>
@@ -9264,7 +9463,6 @@
             </a:r>
             <a:endParaRPr b="0" lang="de-DE" sz="900" spc="-1" strike="noStrike">
               <a:latin typeface="Arial"/>
-              <a:ea typeface="Noto Sans CJK SC Regular"/>
             </a:endParaRPr>
           </a:p>
           <a:p>
@@ -9331,7 +9529,6 @@
             </a:r>
             <a:endParaRPr b="0" lang="de-DE" sz="900" spc="-1" strike="noStrike">
               <a:latin typeface="Arial"/>
-              <a:ea typeface="Noto Sans CJK SC Regular"/>
             </a:endParaRPr>
           </a:p>
           <a:p>
@@ -9398,7 +9595,6 @@
             </a:r>
             <a:endParaRPr b="0" lang="de-DE" sz="900" spc="-1" strike="noStrike">
               <a:latin typeface="Arial"/>
-              <a:ea typeface="Noto Sans CJK SC Regular"/>
             </a:endParaRPr>
           </a:p>
           <a:p>
@@ -9465,7 +9661,6 @@
             </a:r>
             <a:endParaRPr b="0" lang="de-DE" sz="900" spc="-1" strike="noStrike">
               <a:latin typeface="Arial"/>
-              <a:ea typeface="Noto Sans CJK SC Regular"/>
             </a:endParaRPr>
           </a:p>
           <a:p>
@@ -9552,7 +9747,6 @@
             </a:r>
             <a:endParaRPr b="0" lang="de-DE" sz="900" spc="-1" strike="noStrike">
               <a:latin typeface="Arial"/>
-              <a:ea typeface="Noto Sans CJK SC Regular"/>
             </a:endParaRPr>
           </a:p>
           <a:p>
@@ -9599,7 +9793,6 @@
             </a:r>
             <a:endParaRPr b="0" lang="de-DE" sz="900" spc="-1" strike="noStrike">
               <a:latin typeface="Arial"/>
-              <a:ea typeface="Noto Sans CJK SC Regular"/>
             </a:endParaRPr>
           </a:p>
           <a:p>
@@ -9666,10 +9859,14 @@
             </a:r>
             <a:endParaRPr b="0" lang="de-DE" sz="900" spc="-1" strike="noStrike">
               <a:latin typeface="Arial"/>
-              <a:ea typeface="Noto Sans CJK SC Regular"/>
-            </a:endParaRPr>
-          </a:p>
-          <a:p>
+            </a:endParaRPr>
+          </a:p>
+          <a:p>
+            <a:pPr>
+              <a:lnSpc>
+                <a:spcPct val="100000"/>
+              </a:lnSpc>
+            </a:pPr>
             <a:r>
               <a:rPr b="1" lang="de-DE" sz="900" spc="-1" strike="noStrike">
                 <a:solidFill>
@@ -9728,14 +9925,14 @@
       </p:sp>
       <p:sp>
         <p:nvSpPr>
-          <p:cNvPr id="181" name="CustomShape 8"/>
+          <p:cNvPr id="180" name="CustomShape 8"/>
           <p:cNvSpPr/>
           <p:nvPr/>
         </p:nvSpPr>
         <p:spPr>
           <a:xfrm>
             <a:off x="720000" y="4896000"/>
-            <a:ext cx="4896000" cy="576000"/>
+            <a:ext cx="4895640" cy="575640"/>
           </a:xfrm>
           <a:prstGeom prst="rect">
             <a:avLst/>
@@ -9758,6 +9955,11 @@
         <p:txBody>
           <a:bodyPr wrap="none" lIns="90000" rIns="90000" tIns="45000" bIns="45000" anchor="ctr"/>
           <a:p>
+            <a:pPr>
+              <a:lnSpc>
+                <a:spcPct val="100000"/>
+              </a:lnSpc>
+            </a:pPr>
             <a:r>
               <a:rPr b="0" lang="de-DE" sz="1400" spc="-1" strike="noStrike">
                 <a:solidFill>
@@ -9769,11 +9971,7 @@
               <a:t>Zugriff auf alle Funktionen der Spiellogik</a:t>
             </a:r>
             <a:endParaRPr b="0" lang="de-DE" sz="1400" spc="-1" strike="noStrike">
-              <a:solidFill>
-                <a:srgbClr val="000000"/>
-              </a:solidFill>
-              <a:latin typeface="Arial"/>
-              <a:ea typeface="DejaVu Sans Mono"/>
+              <a:latin typeface="Arial"/>
             </a:endParaRPr>
           </a:p>
         </p:txBody>
@@ -9829,14 +10027,14 @@
       </p:grpSpPr>
       <p:sp>
         <p:nvSpPr>
-          <p:cNvPr id="182" name="CustomShape 1"/>
+          <p:cNvPr id="181" name="CustomShape 1"/>
           <p:cNvSpPr/>
           <p:nvPr/>
         </p:nvSpPr>
         <p:spPr>
           <a:xfrm>
-            <a:off x="5400000" y="720000"/>
-            <a:ext cx="6623640" cy="359280"/>
+            <a:off x="2412000" y="6445080"/>
+            <a:ext cx="6623280" cy="358920"/>
           </a:xfrm>
           <a:prstGeom prst="rect">
             <a:avLst/>
@@ -9878,14 +10076,14 @@
       </p:sp>
       <p:sp>
         <p:nvSpPr>
-          <p:cNvPr id="183" name="CustomShape 2"/>
+          <p:cNvPr id="182" name="CustomShape 2"/>
           <p:cNvSpPr/>
           <p:nvPr/>
         </p:nvSpPr>
         <p:spPr>
           <a:xfrm>
             <a:off x="390600" y="418680"/>
-            <a:ext cx="6700680" cy="560880"/>
+            <a:ext cx="6700320" cy="560520"/>
           </a:xfrm>
           <a:prstGeom prst="rect">
             <a:avLst/>
@@ -9927,14 +10125,14 @@
       </p:sp>
       <p:sp>
         <p:nvSpPr>
-          <p:cNvPr id="184" name="CustomShape 3"/>
+          <p:cNvPr id="183" name="CustomShape 3"/>
           <p:cNvSpPr/>
           <p:nvPr/>
         </p:nvSpPr>
         <p:spPr>
           <a:xfrm>
             <a:off x="392040" y="1198440"/>
-            <a:ext cx="8355600" cy="4893120"/>
+            <a:ext cx="8355240" cy="4892760"/>
           </a:xfrm>
           <a:prstGeom prst="rect">
             <a:avLst/>
@@ -9979,14 +10177,14 @@
       </p:sp>
       <p:sp>
         <p:nvSpPr>
-          <p:cNvPr id="185" name="CustomShape 4"/>
+          <p:cNvPr id="184" name="CustomShape 4"/>
           <p:cNvSpPr/>
           <p:nvPr/>
         </p:nvSpPr>
         <p:spPr>
           <a:xfrm>
             <a:off x="1079640" y="6444000"/>
-            <a:ext cx="1258920" cy="358920"/>
+            <a:ext cx="1258560" cy="358560"/>
           </a:xfrm>
           <a:prstGeom prst="rect">
             <a:avLst/>
@@ -10028,14 +10226,14 @@
       </p:sp>
       <p:sp>
         <p:nvSpPr>
-          <p:cNvPr id="186" name="CustomShape 5"/>
+          <p:cNvPr id="185" name="CustomShape 5"/>
           <p:cNvSpPr/>
           <p:nvPr/>
         </p:nvSpPr>
         <p:spPr>
           <a:xfrm>
             <a:off x="392040" y="1198440"/>
-            <a:ext cx="8355600" cy="4893120"/>
+            <a:ext cx="8355240" cy="4892760"/>
           </a:xfrm>
           <a:prstGeom prst="rect">
             <a:avLst/>
@@ -10174,13 +10372,13 @@
       </p:sp>
       <p:graphicFrame>
         <p:nvGraphicFramePr>
-          <p:cNvPr id="187" name="Table 6"/>
+          <p:cNvPr id="186" name="Table 6"/>
           <p:cNvGraphicFramePr/>
           <p:nvPr/>
         </p:nvGraphicFramePr>
         <p:xfrm>
           <a:off x="396000" y="1343160"/>
-          <a:ext cx="8531640" cy="5072400"/>
+          <a:ext cx="8531640" cy="3129840"/>
         </p:xfrm>
         <a:graphic>
           <a:graphicData uri="http://schemas.openxmlformats.org/drawingml/2006/table">

</xml_diff>

<commit_message>
formatting playing field, playing field in presentation
</commit_message>
<xml_diff>
--- a/PräsentationPython.pptx
+++ b/PräsentationPython.pptx
@@ -2722,7 +2722,7 @@
         <p:spPr>
           <a:xfrm>
             <a:off x="0" y="0"/>
-            <a:ext cx="9142560" cy="6856560"/>
+            <a:ext cx="9142200" cy="6856200"/>
           </a:xfrm>
           <a:prstGeom prst="rect">
             <a:avLst/>
@@ -2741,7 +2741,7 @@
         <p:spPr>
           <a:xfrm>
             <a:off x="250920" y="6445080"/>
-            <a:ext cx="647280" cy="366840"/>
+            <a:ext cx="646920" cy="366480"/>
           </a:xfrm>
           <a:prstGeom prst="rect">
             <a:avLst/>
@@ -2768,7 +2768,7 @@
                 <a:spcPts val="901"/>
               </a:spcBef>
             </a:pPr>
-            <a:fld id="{C7F4961A-EDD7-4791-8E48-DB4C1C98F63F}" type="slidenum">
+            <a:fld id="{8FC7BB05-4528-45B9-8AC7-A71D84EE0CFD}" type="slidenum">
               <a:rPr b="1" lang="de-DE" sz="1800" spc="-1" strike="noStrike">
                 <a:solidFill>
                   <a:srgbClr val="000000"/>
@@ -2797,7 +2797,7 @@
         <p:spPr>
           <a:xfrm>
             <a:off x="8061120" y="260640"/>
-            <a:ext cx="862560" cy="670320"/>
+            <a:ext cx="862200" cy="669960"/>
           </a:xfrm>
           <a:prstGeom prst="rect">
             <a:avLst/>
@@ -2820,7 +2820,7 @@
         <p:spPr>
           <a:xfrm>
             <a:off x="6948360" y="539640"/>
-            <a:ext cx="845280" cy="389520"/>
+            <a:ext cx="844920" cy="389160"/>
           </a:xfrm>
           <a:prstGeom prst="rect">
             <a:avLst/>
@@ -2843,7 +2843,7 @@
         <p:spPr>
           <a:xfrm>
             <a:off x="0" y="-3240"/>
-            <a:ext cx="9142560" cy="6869160"/>
+            <a:ext cx="9142200" cy="6868800"/>
           </a:xfrm>
           <a:prstGeom prst="rect">
             <a:avLst/>
@@ -2862,7 +2862,7 @@
         <p:spPr>
           <a:xfrm>
             <a:off x="385920" y="3290040"/>
-            <a:ext cx="8658360" cy="304560"/>
+            <a:ext cx="8658000" cy="304200"/>
           </a:xfrm>
           <a:prstGeom prst="rect">
             <a:avLst/>
@@ -2911,7 +2911,7 @@
         <p:spPr>
           <a:xfrm>
             <a:off x="7318440" y="6497640"/>
-            <a:ext cx="1725840" cy="242640"/>
+            <a:ext cx="1725480" cy="242280"/>
           </a:xfrm>
           <a:prstGeom prst="rect">
             <a:avLst/>
@@ -2964,7 +2964,7 @@
         <p:spPr>
           <a:xfrm>
             <a:off x="396720" y="404640"/>
-            <a:ext cx="1185480" cy="546480"/>
+            <a:ext cx="1185120" cy="546120"/>
           </a:xfrm>
           <a:prstGeom prst="rect">
             <a:avLst/>
@@ -2983,7 +2983,7 @@
         <p:spPr>
           <a:xfrm>
             <a:off x="396720" y="6552360"/>
-            <a:ext cx="3668760" cy="120960"/>
+            <a:ext cx="3668400" cy="120600"/>
           </a:xfrm>
           <a:prstGeom prst="rect">
             <a:avLst/>
@@ -3050,7 +3050,79 @@
               <a:rPr b="0" lang="de-DE" sz="4400" spc="-1" strike="noStrike">
                 <a:latin typeface="Arial"/>
               </a:rPr>
-              <a:t>Format des Titeltextes durch Klicken bearbeiten</a:t>
+              <a:t>For</a:t>
+            </a:r>
+            <a:r>
+              <a:rPr b="0" lang="de-DE" sz="4400" spc="-1" strike="noStrike">
+                <a:latin typeface="Arial"/>
+              </a:rPr>
+              <a:t>mat </a:t>
+            </a:r>
+            <a:r>
+              <a:rPr b="0" lang="de-DE" sz="4400" spc="-1" strike="noStrike">
+                <a:latin typeface="Arial"/>
+              </a:rPr>
+              <a:t>des </a:t>
+            </a:r>
+            <a:r>
+              <a:rPr b="0" lang="de-DE" sz="4400" spc="-1" strike="noStrike">
+                <a:latin typeface="Arial"/>
+              </a:rPr>
+              <a:t>Titel</a:t>
+            </a:r>
+            <a:r>
+              <a:rPr b="0" lang="de-DE" sz="4400" spc="-1" strike="noStrike">
+                <a:latin typeface="Arial"/>
+              </a:rPr>
+              <a:t>text</a:t>
+            </a:r>
+            <a:r>
+              <a:rPr b="0" lang="de-DE" sz="4400" spc="-1" strike="noStrike">
+                <a:latin typeface="Arial"/>
+              </a:rPr>
+              <a:t>es </a:t>
+            </a:r>
+            <a:r>
+              <a:rPr b="0" lang="de-DE" sz="4400" spc="-1" strike="noStrike">
+                <a:latin typeface="Arial"/>
+              </a:rPr>
+              <a:t>dur</a:t>
+            </a:r>
+            <a:r>
+              <a:rPr b="0" lang="de-DE" sz="4400" spc="-1" strike="noStrike">
+                <a:latin typeface="Arial"/>
+              </a:rPr>
+              <a:t>ch </a:t>
+            </a:r>
+            <a:r>
+              <a:rPr b="0" lang="de-DE" sz="4400" spc="-1" strike="noStrike">
+                <a:latin typeface="Arial"/>
+              </a:rPr>
+              <a:t>Klic</a:t>
+            </a:r>
+            <a:r>
+              <a:rPr b="0" lang="de-DE" sz="4400" spc="-1" strike="noStrike">
+                <a:latin typeface="Arial"/>
+              </a:rPr>
+              <a:t>ken </a:t>
+            </a:r>
+            <a:r>
+              <a:rPr b="0" lang="de-DE" sz="4400" spc="-1" strike="noStrike">
+                <a:latin typeface="Arial"/>
+              </a:rPr>
+              <a:t>bea</a:t>
+            </a:r>
+            <a:r>
+              <a:rPr b="0" lang="de-DE" sz="4400" spc="-1" strike="noStrike">
+                <a:latin typeface="Arial"/>
+              </a:rPr>
+              <a:t>rbei</a:t>
+            </a:r>
+            <a:r>
+              <a:rPr b="0" lang="de-DE" sz="4400" spc="-1" strike="noStrike">
+                <a:latin typeface="Arial"/>
+              </a:rPr>
+              <a:t>ten</a:t>
             </a:r>
             <a:endParaRPr b="0" lang="de-DE" sz="4400" spc="-1" strike="noStrike">
               <a:latin typeface="Arial"/>
@@ -3294,7 +3366,7 @@
         <p:spPr>
           <a:xfrm>
             <a:off x="0" y="0"/>
-            <a:ext cx="9142560" cy="6856560"/>
+            <a:ext cx="9142200" cy="6856200"/>
           </a:xfrm>
           <a:prstGeom prst="rect">
             <a:avLst/>
@@ -3313,7 +3385,7 @@
         <p:spPr>
           <a:xfrm>
             <a:off x="250920" y="6445080"/>
-            <a:ext cx="647280" cy="366840"/>
+            <a:ext cx="646920" cy="366480"/>
           </a:xfrm>
           <a:prstGeom prst="rect">
             <a:avLst/>
@@ -3340,7 +3412,7 @@
                 <a:spcPts val="901"/>
               </a:spcBef>
             </a:pPr>
-            <a:fld id="{5B9C6220-AFDC-4B05-9E23-11B7B5B25A0E}" type="slidenum">
+            <a:fld id="{BE8C6B27-6C44-460A-855E-F13331292654}" type="slidenum">
               <a:rPr b="1" lang="de-DE" sz="1800" spc="-1" strike="noStrike">
                 <a:solidFill>
                   <a:srgbClr val="000000"/>
@@ -3369,7 +3441,7 @@
         <p:spPr>
           <a:xfrm>
             <a:off x="8028360" y="287640"/>
-            <a:ext cx="845280" cy="389520"/>
+            <a:ext cx="844920" cy="389160"/>
           </a:xfrm>
           <a:prstGeom prst="rect">
             <a:avLst/>
@@ -3406,49 +3478,7 @@
               <a:rPr b="0" lang="de-DE" sz="4400" spc="-1" strike="noStrike">
                 <a:latin typeface="Arial"/>
               </a:rPr>
-              <a:t>Format </a:t>
-            </a:r>
-            <a:r>
-              <a:rPr b="0" lang="de-DE" sz="4400" spc="-1" strike="noStrike">
-                <a:latin typeface="Arial"/>
-              </a:rPr>
-              <a:t>des </a:t>
-            </a:r>
-            <a:r>
-              <a:rPr b="0" lang="de-DE" sz="4400" spc="-1" strike="noStrike">
-                <a:latin typeface="Arial"/>
-              </a:rPr>
-              <a:t>Titeltext</a:t>
-            </a:r>
-            <a:r>
-              <a:rPr b="0" lang="de-DE" sz="4400" spc="-1" strike="noStrike">
-                <a:latin typeface="Arial"/>
-              </a:rPr>
-              <a:t>es </a:t>
-            </a:r>
-            <a:r>
-              <a:rPr b="0" lang="de-DE" sz="4400" spc="-1" strike="noStrike">
-                <a:latin typeface="Arial"/>
-              </a:rPr>
-              <a:t>durch </a:t>
-            </a:r>
-            <a:r>
-              <a:rPr b="0" lang="de-DE" sz="4400" spc="-1" strike="noStrike">
-                <a:latin typeface="Arial"/>
-              </a:rPr>
-              <a:t>Klicken </a:t>
-            </a:r>
-            <a:r>
-              <a:rPr b="0" lang="de-DE" sz="4400" spc="-1" strike="noStrike">
-                <a:latin typeface="Arial"/>
-              </a:rPr>
-              <a:t>bearbeit</a:t>
-            </a:r>
-            <a:r>
-              <a:rPr b="0" lang="de-DE" sz="4400" spc="-1" strike="noStrike">
-                <a:latin typeface="Arial"/>
-              </a:rPr>
-              <a:t>en</a:t>
+              <a:t>Format des Titeltextes durch Klicken bearbeiten</a:t>
             </a:r>
             <a:endParaRPr b="0" lang="de-DE" sz="4400" spc="-1" strike="noStrike">
               <a:latin typeface="Arial"/>
@@ -3681,7 +3711,7 @@
         <p:spPr>
           <a:xfrm>
             <a:off x="395280" y="1413000"/>
-            <a:ext cx="8388360" cy="719280"/>
+            <a:ext cx="8388000" cy="718920"/>
           </a:xfrm>
           <a:prstGeom prst="rect">
             <a:avLst/>
@@ -3730,7 +3760,7 @@
         <p:spPr>
           <a:xfrm>
             <a:off x="396720" y="2349360"/>
-            <a:ext cx="8369280" cy="619200"/>
+            <a:ext cx="8368920" cy="618840"/>
           </a:xfrm>
           <a:prstGeom prst="rect">
             <a:avLst/>
@@ -3802,7 +3832,7 @@
         <p:spPr>
           <a:xfrm>
             <a:off x="300960" y="3286800"/>
-            <a:ext cx="4773240" cy="315720"/>
+            <a:ext cx="4772880" cy="315360"/>
           </a:xfrm>
           <a:prstGeom prst="rect">
             <a:avLst/>
@@ -3855,7 +3885,7 @@
         <p:spPr>
           <a:xfrm>
             <a:off x="6759720" y="504000"/>
-            <a:ext cx="1592280" cy="1592280"/>
+            <a:ext cx="1591920" cy="1591920"/>
           </a:xfrm>
           <a:prstGeom prst="rect">
             <a:avLst/>
@@ -3873,13 +3903,13 @@
         </p:nvPicPr>
         <p:blipFill>
           <a:blip r:embed="rId2"/>
-          <a:srcRect l="20211" t="2618" r="17589" b="11986"/>
+          <a:srcRect l="20211" t="6355" r="17581" b="11986"/>
           <a:stretch/>
         </p:blipFill>
         <p:spPr>
           <a:xfrm>
-            <a:off x="2088000" y="3672000"/>
-            <a:ext cx="3402720" cy="2628000"/>
+            <a:off x="2147400" y="3744000"/>
+            <a:ext cx="3413160" cy="2520000"/>
           </a:xfrm>
           <a:prstGeom prst="rect">
             <a:avLst/>
@@ -3947,7 +3977,7 @@
         <p:spPr>
           <a:xfrm>
             <a:off x="2411640" y="6445080"/>
-            <a:ext cx="6623280" cy="358920"/>
+            <a:ext cx="6622920" cy="358560"/>
           </a:xfrm>
           <a:prstGeom prst="rect">
             <a:avLst/>
@@ -3996,7 +4026,7 @@
         <p:spPr>
           <a:xfrm>
             <a:off x="390600" y="418680"/>
-            <a:ext cx="6700320" cy="560520"/>
+            <a:ext cx="6699960" cy="560160"/>
           </a:xfrm>
           <a:prstGeom prst="rect">
             <a:avLst/>
@@ -4045,7 +4075,7 @@
         <p:spPr>
           <a:xfrm>
             <a:off x="392040" y="1198440"/>
-            <a:ext cx="8355240" cy="4892760"/>
+            <a:ext cx="8354880" cy="4892400"/>
           </a:xfrm>
           <a:prstGeom prst="rect">
             <a:avLst/>
@@ -4064,7 +4094,7 @@
         <p:txBody>
           <a:bodyPr lIns="0" rIns="0" tIns="0" bIns="0"/>
           <a:p>
-            <a:pPr marL="216000" indent="-322920">
+            <a:pPr marL="216000" indent="-322560">
               <a:lnSpc>
                 <a:spcPct val="100000"/>
               </a:lnSpc>
@@ -4102,7 +4132,7 @@
             </a:endParaRPr>
           </a:p>
           <a:p>
-            <a:pPr marL="216000" indent="-322920">
+            <a:pPr marL="216000" indent="-322560">
               <a:lnSpc>
                 <a:spcPct val="100000"/>
               </a:lnSpc>
@@ -4140,7 +4170,7 @@
             </a:endParaRPr>
           </a:p>
           <a:p>
-            <a:pPr marL="216000" indent="-322920">
+            <a:pPr marL="216000" indent="-322560">
               <a:lnSpc>
                 <a:spcPct val="100000"/>
               </a:lnSpc>
@@ -4178,7 +4208,7 @@
             </a:endParaRPr>
           </a:p>
           <a:p>
-            <a:pPr marL="216000" indent="-322920">
+            <a:pPr marL="216000" indent="-322560">
               <a:lnSpc>
                 <a:spcPct val="100000"/>
               </a:lnSpc>
@@ -4226,7 +4256,7 @@
         <p:spPr>
           <a:xfrm>
             <a:off x="1079640" y="6444000"/>
-            <a:ext cx="1258560" cy="358560"/>
+            <a:ext cx="1258200" cy="358200"/>
           </a:xfrm>
           <a:prstGeom prst="rect">
             <a:avLst/>
@@ -4324,7 +4354,7 @@
         <p:spPr>
           <a:xfrm>
             <a:off x="2411640" y="6445080"/>
-            <a:ext cx="6623280" cy="358920"/>
+            <a:ext cx="6622920" cy="358560"/>
           </a:xfrm>
           <a:prstGeom prst="rect">
             <a:avLst/>
@@ -4373,7 +4403,7 @@
         <p:spPr>
           <a:xfrm>
             <a:off x="390600" y="418680"/>
-            <a:ext cx="6700320" cy="560520"/>
+            <a:ext cx="6699960" cy="560160"/>
           </a:xfrm>
           <a:prstGeom prst="rect">
             <a:avLst/>
@@ -4422,7 +4452,7 @@
         <p:spPr>
           <a:xfrm>
             <a:off x="392040" y="1198440"/>
-            <a:ext cx="8355240" cy="4892760"/>
+            <a:ext cx="8354880" cy="4892400"/>
           </a:xfrm>
           <a:prstGeom prst="rect">
             <a:avLst/>
@@ -4474,7 +4504,7 @@
         <p:spPr>
           <a:xfrm>
             <a:off x="1079640" y="6444000"/>
-            <a:ext cx="1258560" cy="358560"/>
+            <a:ext cx="1258200" cy="358200"/>
           </a:xfrm>
           <a:prstGeom prst="rect">
             <a:avLst/>
@@ -4523,7 +4553,7 @@
         <p:spPr>
           <a:xfrm>
             <a:off x="392040" y="1198440"/>
-            <a:ext cx="8355240" cy="4892760"/>
+            <a:ext cx="8354880" cy="4892400"/>
           </a:xfrm>
           <a:prstGeom prst="rect">
             <a:avLst/>
@@ -4542,7 +4572,7 @@
         <p:txBody>
           <a:bodyPr lIns="0" rIns="0" tIns="0" bIns="0"/>
           <a:p>
-            <a:pPr marL="216000" indent="-214920">
+            <a:pPr marL="216000" indent="-214560">
               <a:lnSpc>
                 <a:spcPct val="100000"/>
               </a:lnSpc>
@@ -4571,7 +4601,7 @@
             </a:endParaRPr>
           </a:p>
           <a:p>
-            <a:pPr marL="216000" indent="-214920">
+            <a:pPr marL="216000" indent="-214560">
               <a:lnSpc>
                 <a:spcPct val="100000"/>
               </a:lnSpc>
@@ -4600,7 +4630,7 @@
             </a:endParaRPr>
           </a:p>
           <a:p>
-            <a:pPr marL="216000" indent="-214920">
+            <a:pPr marL="216000" indent="-214560">
               <a:lnSpc>
                 <a:spcPct val="100000"/>
               </a:lnSpc>
@@ -4629,7 +4659,7 @@
             </a:endParaRPr>
           </a:p>
           <a:p>
-            <a:pPr marL="216000" indent="-214920">
+            <a:pPr marL="216000" indent="-214560">
               <a:lnSpc>
                 <a:spcPct val="100000"/>
               </a:lnSpc>
@@ -4658,7 +4688,7 @@
             </a:endParaRPr>
           </a:p>
           <a:p>
-            <a:pPr marL="216000" indent="-214920">
+            <a:pPr marL="216000" indent="-214560">
               <a:lnSpc>
                 <a:spcPct val="100000"/>
               </a:lnSpc>
@@ -4701,7 +4731,7 @@
         <p:spPr>
           <a:xfrm>
             <a:off x="2696760" y="576000"/>
-            <a:ext cx="1550880" cy="1550880"/>
+            <a:ext cx="1550520" cy="1550520"/>
           </a:xfrm>
           <a:prstGeom prst="rect">
             <a:avLst/>
@@ -4720,7 +4750,7 @@
         <p:spPr>
           <a:xfrm>
             <a:off x="9504000" y="2647800"/>
-            <a:ext cx="6815880" cy="373680"/>
+            <a:ext cx="6815520" cy="373320"/>
           </a:xfrm>
           <a:prstGeom prst="rect">
             <a:avLst/>
@@ -4746,7 +4776,11 @@
             </a:pPr>
             <a:r>
               <a:rPr b="0" lang="de-DE" sz="1000" spc="-1" strike="noStrike">
-                <a:latin typeface="Arial"/>
+                <a:solidFill>
+                  <a:srgbClr val="000000"/>
+                </a:solidFill>
+                <a:latin typeface="Arial"/>
+                <a:ea typeface="DejaVu Sans"/>
               </a:rPr>
               <a:t>Quelle Python Bild: </a:t>
             </a:r>
@@ -4762,7 +4796,11 @@
             </a:pPr>
             <a:r>
               <a:rPr b="0" lang="de-DE" sz="1000" spc="-1" strike="noStrike">
-                <a:latin typeface="Arial"/>
+                <a:solidFill>
+                  <a:srgbClr val="000000"/>
+                </a:solidFill>
+                <a:latin typeface="Arial"/>
+                <a:ea typeface="DejaVu Sans"/>
               </a:rPr>
               <a:t>https://upload.wikimedia.org/wikipedia/commons/thumb/c/c3/Python-logo-notext.svg/110px-Python-logo-notext.svg.png</a:t>
             </a:r>
@@ -4785,7 +4823,7 @@
         <p:spPr>
           <a:xfrm>
             <a:off x="4680000" y="2232000"/>
-            <a:ext cx="1668600" cy="1223640"/>
+            <a:ext cx="1668240" cy="1223280"/>
           </a:xfrm>
           <a:prstGeom prst="rect">
             <a:avLst/>
@@ -4804,7 +4842,7 @@
         <p:spPr>
           <a:xfrm>
             <a:off x="9504000" y="3168000"/>
-            <a:ext cx="5941080" cy="218160"/>
+            <a:ext cx="5940720" cy="217800"/>
           </a:xfrm>
           <a:prstGeom prst="rect">
             <a:avLst/>
@@ -4830,7 +4868,11 @@
             </a:pPr>
             <a:r>
               <a:rPr b="0" lang="de-DE" sz="900" spc="-1" strike="noStrike">
-                <a:latin typeface="Arial"/>
+                <a:solidFill>
+                  <a:srgbClr val="000000"/>
+                </a:solidFill>
+                <a:latin typeface="Arial"/>
+                <a:ea typeface="DejaVu Sans"/>
               </a:rPr>
               <a:t>Qt: https://upload.wikimedia.org/wikipedia/commons/thumb/0/0b/Qt_logo_2016.svg/578px-Qt_logo_2016.svg.png</a:t>
             </a:r>
@@ -4853,7 +4895,7 @@
         <p:spPr>
           <a:xfrm>
             <a:off x="6955560" y="3787560"/>
-            <a:ext cx="1180080" cy="1180080"/>
+            <a:ext cx="1179720" cy="1179720"/>
           </a:xfrm>
           <a:prstGeom prst="rect">
             <a:avLst/>
@@ -4872,7 +4914,7 @@
         <p:spPr>
           <a:xfrm>
             <a:off x="9648000" y="3816000"/>
-            <a:ext cx="3124800" cy="218160"/>
+            <a:ext cx="3124440" cy="217800"/>
           </a:xfrm>
           <a:prstGeom prst="rect">
             <a:avLst/>
@@ -4898,7 +4940,11 @@
             </a:pPr>
             <a:r>
               <a:rPr b="0" lang="de-DE" sz="900" spc="-1" strike="noStrike">
-                <a:latin typeface="Arial"/>
+                <a:solidFill>
+                  <a:srgbClr val="000000"/>
+                </a:solidFill>
+                <a:latin typeface="Arial"/>
+                <a:ea typeface="DejaVu Sans"/>
               </a:rPr>
               <a:t>Github: https://image.flaticon.com/icons/svg/25/25231.svg</a:t>
             </a:r>
@@ -4921,7 +4967,7 @@
         <p:spPr>
           <a:xfrm>
             <a:off x="1440000" y="3312000"/>
-            <a:ext cx="1511640" cy="1511640"/>
+            <a:ext cx="1511280" cy="1511280"/>
           </a:xfrm>
           <a:prstGeom prst="rect">
             <a:avLst/>
@@ -4940,7 +4986,7 @@
         <p:spPr>
           <a:xfrm>
             <a:off x="9720000" y="4248000"/>
-            <a:ext cx="8567280" cy="602280"/>
+            <a:ext cx="8566920" cy="601920"/>
           </a:xfrm>
           <a:prstGeom prst="rect">
             <a:avLst/>
@@ -4966,7 +5012,11 @@
             </a:pPr>
             <a:r>
               <a:rPr b="0" lang="de-DE" sz="900" spc="-1" strike="noStrike">
-                <a:latin typeface="Arial"/>
+                <a:solidFill>
+                  <a:srgbClr val="000000"/>
+                </a:solidFill>
+                <a:latin typeface="Arial"/>
+                <a:ea typeface="DejaVu Sans"/>
               </a:rPr>
               <a:t>Pcharm: https://upload.wikimedia.org/wikipedia/commons/thumb/a/a1/PyCharm_Logo.svg/128px-PyCharm_Logo.svg.png</a:t>
             </a:r>
@@ -4989,7 +5039,7 @@
         <p:spPr>
           <a:xfrm>
             <a:off x="3924720" y="4536000"/>
-            <a:ext cx="1474920" cy="1474920"/>
+            <a:ext cx="1474560" cy="1474560"/>
           </a:xfrm>
           <a:prstGeom prst="rect">
             <a:avLst/>
@@ -5008,7 +5058,7 @@
         <p:spPr>
           <a:xfrm>
             <a:off x="9720000" y="4752000"/>
-            <a:ext cx="8567280" cy="602280"/>
+            <a:ext cx="8566920" cy="601920"/>
           </a:xfrm>
           <a:prstGeom prst="rect">
             <a:avLst/>
@@ -5034,7 +5084,11 @@
             </a:pPr>
             <a:r>
               <a:rPr b="0" lang="de-DE" sz="900" spc="-1" strike="noStrike">
-                <a:latin typeface="Arial"/>
+                <a:solidFill>
+                  <a:srgbClr val="000000"/>
+                </a:solidFill>
+                <a:latin typeface="Arial"/>
+                <a:ea typeface="DejaVu Sans"/>
               </a:rPr>
               <a:t>Spyder: https://upload.wikimedia.org/wikipedia/commons/thumb/7/7e/Spyder_logo.svg/1024px-Spyder_logo.svg.png</a:t>
             </a:r>
@@ -5102,7 +5156,7 @@
         <p:spPr>
           <a:xfrm>
             <a:off x="2411640" y="6445080"/>
-            <a:ext cx="6623280" cy="358920"/>
+            <a:ext cx="6622920" cy="358560"/>
           </a:xfrm>
           <a:prstGeom prst="rect">
             <a:avLst/>
@@ -5151,7 +5205,7 @@
         <p:spPr>
           <a:xfrm>
             <a:off x="390600" y="418680"/>
-            <a:ext cx="6700320" cy="560520"/>
+            <a:ext cx="6699960" cy="560160"/>
           </a:xfrm>
           <a:prstGeom prst="rect">
             <a:avLst/>
@@ -5200,7 +5254,7 @@
         <p:spPr>
           <a:xfrm>
             <a:off x="392040" y="1198440"/>
-            <a:ext cx="8355240" cy="4892760"/>
+            <a:ext cx="8354880" cy="4892400"/>
           </a:xfrm>
           <a:prstGeom prst="rect">
             <a:avLst/>
@@ -5252,7 +5306,7 @@
         <p:spPr>
           <a:xfrm>
             <a:off x="1079640" y="6444000"/>
-            <a:ext cx="1258560" cy="358560"/>
+            <a:ext cx="1258200" cy="358200"/>
           </a:xfrm>
           <a:prstGeom prst="rect">
             <a:avLst/>
@@ -5301,7 +5355,7 @@
         <p:spPr>
           <a:xfrm>
             <a:off x="392040" y="1206360"/>
-            <a:ext cx="3278880" cy="4992480"/>
+            <a:ext cx="3278520" cy="4992120"/>
           </a:xfrm>
           <a:prstGeom prst="rect">
             <a:avLst/>
@@ -5334,7 +5388,7 @@
             </a:endParaRPr>
           </a:p>
           <a:p>
-            <a:pPr marL="216000" indent="-214920">
+            <a:pPr marL="216000" indent="-214560">
               <a:lnSpc>
                 <a:spcPct val="100000"/>
               </a:lnSpc>
@@ -5380,7 +5434,7 @@
         <p:spPr>
           <a:xfrm>
             <a:off x="5544000" y="1198440"/>
-            <a:ext cx="3382920" cy="4992480"/>
+            <a:ext cx="3382560" cy="4992120"/>
           </a:xfrm>
           <a:prstGeom prst="rect">
             <a:avLst/>
@@ -5423,7 +5477,7 @@
             </a:endParaRPr>
           </a:p>
           <a:p>
-            <a:pPr marL="216000" indent="-214920">
+            <a:pPr marL="216000" indent="-214560">
               <a:lnSpc>
                 <a:spcPct val="100000"/>
               </a:lnSpc>
@@ -5449,7 +5503,7 @@
             </a:endParaRPr>
           </a:p>
           <a:p>
-            <a:pPr marL="216000" indent="-214920">
+            <a:pPr marL="216000" indent="-214560">
               <a:lnSpc>
                 <a:spcPct val="100000"/>
               </a:lnSpc>
@@ -5475,7 +5529,7 @@
             </a:endParaRPr>
           </a:p>
           <a:p>
-            <a:pPr marL="216000" indent="-214920">
+            <a:pPr marL="216000" indent="-214560">
               <a:lnSpc>
                 <a:spcPct val="100000"/>
               </a:lnSpc>
@@ -5501,7 +5555,7 @@
             </a:endParaRPr>
           </a:p>
           <a:p>
-            <a:pPr marL="216000" indent="-214920">
+            <a:pPr marL="216000" indent="-214560">
               <a:lnSpc>
                 <a:spcPct val="100000"/>
               </a:lnSpc>
@@ -5537,7 +5591,7 @@
         <p:spPr>
           <a:xfrm>
             <a:off x="3744000" y="3096000"/>
-            <a:ext cx="1654920" cy="1222920"/>
+            <a:ext cx="1654560" cy="1222560"/>
           </a:xfrm>
           <a:custGeom>
             <a:avLst/>
@@ -5630,7 +5684,7 @@
         <p:spPr>
           <a:xfrm>
             <a:off x="864000" y="4716000"/>
-            <a:ext cx="2086920" cy="934920"/>
+            <a:ext cx="2086560" cy="934560"/>
           </a:xfrm>
           <a:prstGeom prst="rect">
             <a:avLst/>
@@ -5683,7 +5737,7 @@
         <p:spPr>
           <a:xfrm>
             <a:off x="3744000" y="4716000"/>
-            <a:ext cx="4678920" cy="934920"/>
+            <a:ext cx="4678560" cy="934560"/>
           </a:xfrm>
           <a:prstGeom prst="rect">
             <a:avLst/>
@@ -5736,7 +5790,7 @@
         <p:spPr>
           <a:xfrm>
             <a:off x="432000" y="2592000"/>
-            <a:ext cx="3238920" cy="2181960"/>
+            <a:ext cx="3238560" cy="2181600"/>
           </a:xfrm>
           <a:prstGeom prst="rect">
             <a:avLst/>
@@ -5762,7 +5816,11 @@
             </a:pPr>
             <a:r>
               <a:rPr b="0" lang="de-DE" sz="1800" spc="-1" strike="noStrike">
-                <a:latin typeface="Arial"/>
+                <a:solidFill>
+                  <a:srgbClr val="000000"/>
+                </a:solidFill>
+                <a:latin typeface="Arial"/>
+                <a:ea typeface="DejaVu Sans"/>
               </a:rPr>
               <a:t>Logik</a:t>
             </a:r>
@@ -5771,7 +5829,7 @@
             </a:endParaRPr>
           </a:p>
           <a:p>
-            <a:pPr marL="216000" indent="-215640">
+            <a:pPr marL="216000" indent="-215280">
               <a:lnSpc>
                 <a:spcPct val="100000"/>
               </a:lnSpc>
@@ -5797,7 +5855,7 @@
             </a:endParaRPr>
           </a:p>
           <a:p>
-            <a:pPr marL="216000" indent="-215640">
+            <a:pPr marL="216000" indent="-215280">
               <a:lnSpc>
                 <a:spcPct val="100000"/>
               </a:lnSpc>
@@ -5823,7 +5881,7 @@
             </a:endParaRPr>
           </a:p>
           <a:p>
-            <a:pPr marL="216000" indent="-215640">
+            <a:pPr marL="216000" indent="-215280">
               <a:lnSpc>
                 <a:spcPct val="100000"/>
               </a:lnSpc>
@@ -5849,7 +5907,7 @@
             </a:endParaRPr>
           </a:p>
           <a:p>
-            <a:pPr marL="216000" indent="-215640">
+            <a:pPr marL="216000" indent="-215280">
               <a:lnSpc>
                 <a:spcPct val="100000"/>
               </a:lnSpc>
@@ -5886,7 +5944,7 @@
             </a:endParaRPr>
           </a:p>
           <a:p>
-            <a:pPr marL="216000" indent="-215640">
+            <a:pPr marL="216000" indent="-215280">
               <a:lnSpc>
                 <a:spcPct val="100000"/>
               </a:lnSpc>
@@ -5912,7 +5970,7 @@
             </a:endParaRPr>
           </a:p>
           <a:p>
-            <a:pPr marL="216000" indent="-215640">
+            <a:pPr marL="216000" indent="-215280">
               <a:lnSpc>
                 <a:spcPct val="100000"/>
               </a:lnSpc>
@@ -6007,7 +6065,7 @@
         <p:spPr>
           <a:xfrm>
             <a:off x="2411640" y="6445080"/>
-            <a:ext cx="6623280" cy="358920"/>
+            <a:ext cx="6622920" cy="358560"/>
           </a:xfrm>
           <a:prstGeom prst="rect">
             <a:avLst/>
@@ -6056,7 +6114,7 @@
         <p:spPr>
           <a:xfrm>
             <a:off x="390600" y="418680"/>
-            <a:ext cx="6700320" cy="560520"/>
+            <a:ext cx="6699960" cy="560160"/>
           </a:xfrm>
           <a:prstGeom prst="rect">
             <a:avLst/>
@@ -6105,7 +6163,7 @@
         <p:spPr>
           <a:xfrm>
             <a:off x="392040" y="1198440"/>
-            <a:ext cx="8355240" cy="4892760"/>
+            <a:ext cx="8354880" cy="4892400"/>
           </a:xfrm>
           <a:prstGeom prst="rect">
             <a:avLst/>
@@ -6157,7 +6215,7 @@
         <p:spPr>
           <a:xfrm>
             <a:off x="1079640" y="6444000"/>
-            <a:ext cx="1258560" cy="358560"/>
+            <a:ext cx="1258200" cy="358200"/>
           </a:xfrm>
           <a:prstGeom prst="rect">
             <a:avLst/>
@@ -6197,40 +6255,16 @@
           </a:p>
         </p:txBody>
       </p:sp>
-      <p:pic>
-        <p:nvPicPr>
-          <p:cNvPr id="126" name="" descr=""/>
-          <p:cNvPicPr/>
-          <p:nvPr/>
-        </p:nvPicPr>
-        <p:blipFill>
-          <a:blip r:embed="rId1"/>
-          <a:srcRect l="20209" t="2614" r="17579" b="10590"/>
-          <a:stretch/>
-        </p:blipFill>
-        <p:spPr>
-          <a:xfrm>
-            <a:off x="2952000" y="565200"/>
-            <a:ext cx="4967640" cy="3898440"/>
-          </a:xfrm>
-          <a:prstGeom prst="rect">
-            <a:avLst/>
-          </a:prstGeom>
-          <a:ln>
-            <a:noFill/>
-          </a:ln>
-        </p:spPr>
-      </p:pic>
-      <p:sp>
-        <p:nvSpPr>
-          <p:cNvPr id="127" name="CustomShape 5"/>
+      <p:sp>
+        <p:nvSpPr>
+          <p:cNvPr id="126" name="CustomShape 5"/>
           <p:cNvSpPr/>
           <p:nvPr/>
         </p:nvSpPr>
         <p:spPr>
           <a:xfrm>
             <a:off x="3708000" y="4500000"/>
-            <a:ext cx="3683880" cy="289800"/>
+            <a:ext cx="3683520" cy="289440"/>
           </a:xfrm>
           <a:prstGeom prst="rect">
             <a:avLst/>
@@ -6256,7 +6290,11 @@
             </a:pPr>
             <a:r>
               <a:rPr b="0" lang="de-DE" sz="1400" spc="-1" strike="noStrike">
-                <a:latin typeface="Arial"/>
+                <a:solidFill>
+                  <a:srgbClr val="000000"/>
+                </a:solidFill>
+                <a:latin typeface="Arial"/>
+                <a:ea typeface="DejaVu Sans"/>
               </a:rPr>
               <a:t>Spieloberfläche erstellt mit dem Qt-Designer</a:t>
             </a:r>
@@ -6268,14 +6306,14 @@
       </p:sp>
       <p:sp>
         <p:nvSpPr>
-          <p:cNvPr id="128" name="CustomShape 6"/>
+          <p:cNvPr id="127" name="CustomShape 6"/>
           <p:cNvSpPr/>
           <p:nvPr/>
         </p:nvSpPr>
         <p:spPr>
           <a:xfrm>
             <a:off x="216000" y="1574640"/>
-            <a:ext cx="2591640" cy="1305000"/>
+            <a:ext cx="2591280" cy="1304640"/>
           </a:xfrm>
           <a:prstGeom prst="rect">
             <a:avLst/>
@@ -6349,14 +6387,14 @@
       </p:sp>
       <p:sp>
         <p:nvSpPr>
-          <p:cNvPr id="129" name="CustomShape 7"/>
+          <p:cNvPr id="128" name="CustomShape 7"/>
           <p:cNvSpPr/>
           <p:nvPr/>
         </p:nvSpPr>
         <p:spPr>
           <a:xfrm>
             <a:off x="357840" y="5175000"/>
-            <a:ext cx="8353800" cy="656640"/>
+            <a:ext cx="8353440" cy="656280"/>
           </a:xfrm>
           <a:prstGeom prst="rect">
             <a:avLst/>
@@ -6398,6 +6436,30 @@
           </a:p>
         </p:txBody>
       </p:sp>
+      <p:pic>
+        <p:nvPicPr>
+          <p:cNvPr id="129" name="" descr=""/>
+          <p:cNvPicPr/>
+          <p:nvPr/>
+        </p:nvPicPr>
+        <p:blipFill>
+          <a:blip r:embed="rId1"/>
+          <a:srcRect l="20211" t="6355" r="17581" b="11986"/>
+          <a:stretch/>
+        </p:blipFill>
+        <p:spPr>
+          <a:xfrm>
+            <a:off x="3528000" y="1008000"/>
+            <a:ext cx="4583520" cy="3384000"/>
+          </a:xfrm>
+          <a:prstGeom prst="rect">
+            <a:avLst/>
+          </a:prstGeom>
+          <a:ln>
+            <a:noFill/>
+          </a:ln>
+        </p:spPr>
+      </p:pic>
     </p:spTree>
   </p:cSld>
   <p:timing>
@@ -6456,7 +6518,7 @@
         <p:spPr>
           <a:xfrm>
             <a:off x="2411640" y="6445080"/>
-            <a:ext cx="6623280" cy="358920"/>
+            <a:ext cx="6622920" cy="358560"/>
           </a:xfrm>
           <a:prstGeom prst="rect">
             <a:avLst/>
@@ -6505,7 +6567,7 @@
         <p:spPr>
           <a:xfrm>
             <a:off x="390600" y="418680"/>
-            <a:ext cx="6700320" cy="560520"/>
+            <a:ext cx="6699960" cy="560160"/>
           </a:xfrm>
           <a:prstGeom prst="rect">
             <a:avLst/>
@@ -6564,7 +6626,7 @@
         <p:spPr>
           <a:xfrm>
             <a:off x="392040" y="1198440"/>
-            <a:ext cx="8355240" cy="4892760"/>
+            <a:ext cx="8354880" cy="4892400"/>
           </a:xfrm>
           <a:prstGeom prst="rect">
             <a:avLst/>
@@ -6616,7 +6678,7 @@
         <p:spPr>
           <a:xfrm>
             <a:off x="1079640" y="6444000"/>
-            <a:ext cx="1258560" cy="358560"/>
+            <a:ext cx="1258200" cy="358200"/>
           </a:xfrm>
           <a:prstGeom prst="rect">
             <a:avLst/>
@@ -6665,7 +6727,7 @@
         <p:spPr>
           <a:xfrm>
             <a:off x="392040" y="1198440"/>
-            <a:ext cx="8355240" cy="4892760"/>
+            <a:ext cx="8354880" cy="4892400"/>
           </a:xfrm>
           <a:prstGeom prst="rect">
             <a:avLst/>
@@ -6759,7 +6821,7 @@
         <p:spPr>
           <a:xfrm>
             <a:off x="3312000" y="1198440"/>
-            <a:ext cx="1223640" cy="575640"/>
+            <a:ext cx="1223280" cy="575280"/>
           </a:xfrm>
           <a:prstGeom prst="rect">
             <a:avLst/>
@@ -6812,7 +6874,7 @@
         <p:spPr>
           <a:xfrm>
             <a:off x="5616000" y="1198440"/>
-            <a:ext cx="1223640" cy="575640"/>
+            <a:ext cx="1223280" cy="575280"/>
           </a:xfrm>
           <a:prstGeom prst="rect">
             <a:avLst/>
@@ -6864,8 +6926,8 @@
         </p:nvSpPr>
         <p:spPr>
           <a:xfrm>
-            <a:off x="1224000" y="4464000"/>
-            <a:ext cx="1367640" cy="575640"/>
+            <a:off x="792000" y="4464000"/>
+            <a:ext cx="1440000" cy="575280"/>
           </a:xfrm>
           <a:prstGeom prst="rect">
             <a:avLst/>
@@ -6918,7 +6980,7 @@
         <p:spPr>
           <a:xfrm>
             <a:off x="7632000" y="1152000"/>
-            <a:ext cx="1223640" cy="575640"/>
+            <a:ext cx="1223280" cy="575280"/>
           </a:xfrm>
           <a:prstGeom prst="rect">
             <a:avLst/>
@@ -6971,7 +7033,7 @@
         <p:spPr>
           <a:xfrm>
             <a:off x="1224000" y="1198440"/>
-            <a:ext cx="1223640" cy="575640"/>
+            <a:ext cx="1223280" cy="575280"/>
           </a:xfrm>
           <a:prstGeom prst="rect">
             <a:avLst/>
@@ -7023,8 +7085,8 @@
         </p:nvSpPr>
         <p:spPr>
           <a:xfrm>
-            <a:off x="2736000" y="4464000"/>
-            <a:ext cx="1223640" cy="575640"/>
+            <a:off x="2412000" y="4464000"/>
+            <a:ext cx="1332000" cy="575280"/>
           </a:xfrm>
           <a:prstGeom prst="rect">
             <a:avLst/>
@@ -7076,8 +7138,8 @@
         </p:nvSpPr>
         <p:spPr>
           <a:xfrm>
-            <a:off x="4104000" y="4464000"/>
-            <a:ext cx="1223640" cy="575640"/>
+            <a:off x="3924000" y="4464000"/>
+            <a:ext cx="1260000" cy="575280"/>
           </a:xfrm>
           <a:prstGeom prst="rect">
             <a:avLst/>
@@ -7129,8 +7191,8 @@
         </p:nvSpPr>
         <p:spPr>
           <a:xfrm>
-            <a:off x="5472000" y="4464000"/>
-            <a:ext cx="1223640" cy="575640"/>
+            <a:off x="5364000" y="4464000"/>
+            <a:ext cx="1260000" cy="575280"/>
           </a:xfrm>
           <a:prstGeom prst="rect">
             <a:avLst/>
@@ -7182,8 +7244,8 @@
         </p:nvSpPr>
         <p:spPr>
           <a:xfrm>
-            <a:off x="6840000" y="4464000"/>
-            <a:ext cx="1367640" cy="575640"/>
+            <a:off x="6804000" y="4464000"/>
+            <a:ext cx="1476000" cy="575280"/>
           </a:xfrm>
           <a:prstGeom prst="rect">
             <a:avLst/>
@@ -7236,7 +7298,7 @@
         <p:spPr>
           <a:xfrm>
             <a:off x="720000" y="4032000"/>
-            <a:ext cx="4389480" cy="345960"/>
+            <a:ext cx="4389120" cy="345600"/>
           </a:xfrm>
           <a:prstGeom prst="rect">
             <a:avLst/>
@@ -7262,7 +7324,11 @@
             </a:pPr>
             <a:r>
               <a:rPr b="0" lang="de-DE" sz="1800" spc="-1" strike="noStrike">
-                <a:latin typeface="Arial"/>
+                <a:solidFill>
+                  <a:srgbClr val="000000"/>
+                </a:solidFill>
+                <a:latin typeface="Arial"/>
+                <a:ea typeface="DejaVu Sans"/>
               </a:rPr>
               <a:t>Für das Spiel Mühle definierte Exceptions</a:t>
             </a:r>
@@ -7281,7 +7347,7 @@
         <p:spPr>
           <a:xfrm>
             <a:off x="3276000" y="1944000"/>
-            <a:ext cx="1655640" cy="1113840"/>
+            <a:ext cx="1655280" cy="1113480"/>
           </a:xfrm>
           <a:prstGeom prst="rect">
             <a:avLst/>
@@ -7307,7 +7373,11 @@
             </a:pPr>
             <a:r>
               <a:rPr b="0" lang="de-DE" sz="1800" spc="-1" strike="noStrike">
-                <a:latin typeface="Arial"/>
+                <a:solidFill>
+                  <a:srgbClr val="000000"/>
+                </a:solidFill>
+                <a:latin typeface="Arial"/>
+                <a:ea typeface="DejaVu Sans"/>
               </a:rPr>
               <a:t>Spielfeld als ungerichteter Graph festgelegt</a:t>
             </a:r>
@@ -7326,7 +7396,7 @@
         <p:spPr>
           <a:xfrm>
             <a:off x="5508000" y="1944000"/>
-            <a:ext cx="1943640" cy="1881720"/>
+            <a:ext cx="1943280" cy="1881360"/>
           </a:xfrm>
           <a:prstGeom prst="rect">
             <a:avLst/>
@@ -7352,7 +7422,11 @@
             </a:pPr>
             <a:r>
               <a:rPr b="0" lang="de-DE" sz="1800" spc="-1" strike="noStrike">
-                <a:latin typeface="Arial"/>
+                <a:solidFill>
+                  <a:srgbClr val="000000"/>
+                </a:solidFill>
+                <a:latin typeface="Arial"/>
+                <a:ea typeface="DejaVu Sans"/>
               </a:rPr>
               <a:t>Repräsentiert einen Spieler, </a:t>
             </a:r>
@@ -7368,7 +7442,11 @@
             </a:pPr>
             <a:r>
               <a:rPr b="0" lang="de-DE" sz="1800" spc="-1" strike="noStrike">
-                <a:latin typeface="Arial"/>
+                <a:solidFill>
+                  <a:srgbClr val="000000"/>
+                </a:solidFill>
+                <a:latin typeface="Arial"/>
+                <a:ea typeface="DejaVu Sans"/>
               </a:rPr>
               <a:t>Anzahl der Spielsteine wird bestimmt, </a:t>
             </a:r>
@@ -7384,7 +7462,11 @@
             </a:pPr>
             <a:r>
               <a:rPr b="0" lang="de-DE" sz="1800" spc="-1" strike="noStrike">
-                <a:latin typeface="Arial"/>
+                <a:solidFill>
+                  <a:srgbClr val="000000"/>
+                </a:solidFill>
+                <a:latin typeface="Arial"/>
+                <a:ea typeface="DejaVu Sans"/>
               </a:rPr>
               <a:t>Spielaktion Steine setzen</a:t>
             </a:r>
@@ -7403,7 +7485,7 @@
         <p:spPr>
           <a:xfrm>
             <a:off x="7632000" y="2016000"/>
-            <a:ext cx="1626480" cy="1113840"/>
+            <a:ext cx="1626120" cy="1113480"/>
           </a:xfrm>
           <a:prstGeom prst="rect">
             <a:avLst/>
@@ -7429,7 +7511,11 @@
             </a:pPr>
             <a:r>
               <a:rPr b="0" lang="de-DE" sz="1800" spc="-1" strike="noStrike">
-                <a:latin typeface="Arial"/>
+                <a:solidFill>
+                  <a:srgbClr val="000000"/>
+                </a:solidFill>
+                <a:latin typeface="Arial"/>
+                <a:ea typeface="DejaVu Sans"/>
               </a:rPr>
               <a:t>Zeitlicher </a:t>
             </a:r>
@@ -7445,7 +7531,11 @@
             </a:pPr>
             <a:r>
               <a:rPr b="0" lang="de-DE" sz="1800" spc="-1" strike="noStrike">
-                <a:latin typeface="Arial"/>
+                <a:solidFill>
+                  <a:srgbClr val="000000"/>
+                </a:solidFill>
+                <a:latin typeface="Arial"/>
+                <a:ea typeface="DejaVu Sans"/>
               </a:rPr>
               <a:t>Verlauf </a:t>
             </a:r>
@@ -7461,7 +7551,11 @@
             </a:pPr>
             <a:r>
               <a:rPr b="0" lang="de-DE" sz="1800" spc="-1" strike="noStrike">
-                <a:latin typeface="Arial"/>
+                <a:solidFill>
+                  <a:srgbClr val="000000"/>
+                </a:solidFill>
+                <a:latin typeface="Arial"/>
+                <a:ea typeface="DejaVu Sans"/>
               </a:rPr>
               <a:t>der gesetzten </a:t>
             </a:r>
@@ -7477,7 +7571,11 @@
             </a:pPr>
             <a:r>
               <a:rPr b="0" lang="de-DE" sz="1800" spc="-1" strike="noStrike">
-                <a:latin typeface="Arial"/>
+                <a:solidFill>
+                  <a:srgbClr val="000000"/>
+                </a:solidFill>
+                <a:latin typeface="Arial"/>
+                <a:ea typeface="DejaVu Sans"/>
               </a:rPr>
               <a:t>Spielsteine</a:t>
             </a:r>
@@ -7496,7 +7594,7 @@
         <p:spPr>
           <a:xfrm>
             <a:off x="286200" y="1944000"/>
-            <a:ext cx="2521440" cy="1369800"/>
+            <a:ext cx="2521080" cy="1369440"/>
           </a:xfrm>
           <a:prstGeom prst="rect">
             <a:avLst/>
@@ -7522,7 +7620,11 @@
             </a:pPr>
             <a:r>
               <a:rPr b="0" lang="de-DE" sz="1800" spc="-1" strike="noStrike">
-                <a:latin typeface="Arial"/>
+                <a:solidFill>
+                  <a:srgbClr val="000000"/>
+                </a:solidFill>
+                <a:latin typeface="Arial"/>
+                <a:ea typeface="DejaVu Sans"/>
               </a:rPr>
               <a:t>Spielerwechsel,</a:t>
             </a:r>
@@ -7538,7 +7640,11 @@
             </a:pPr>
             <a:r>
               <a:rPr b="0" lang="de-DE" sz="1800" spc="-1" strike="noStrike">
-                <a:latin typeface="Arial"/>
+                <a:solidFill>
+                  <a:srgbClr val="000000"/>
+                </a:solidFill>
+                <a:latin typeface="Arial"/>
+                <a:ea typeface="DejaVu Sans"/>
               </a:rPr>
               <a:t>Phasenwechsel,</a:t>
             </a:r>
@@ -7554,7 +7660,11 @@
             </a:pPr>
             <a:r>
               <a:rPr b="0" lang="de-DE" sz="1800" spc="-1" strike="noStrike">
-                <a:latin typeface="Arial"/>
+                <a:solidFill>
+                  <a:srgbClr val="000000"/>
+                </a:solidFill>
+                <a:latin typeface="Arial"/>
+                <a:ea typeface="DejaVu Sans"/>
               </a:rPr>
               <a:t>Spielzug überprüfen</a:t>
             </a:r>
@@ -7570,7 +7680,11 @@
             </a:pPr>
             <a:r>
               <a:rPr b="0" lang="de-DE" sz="1800" spc="-1" strike="noStrike">
-                <a:latin typeface="Arial"/>
+                <a:solidFill>
+                  <a:srgbClr val="000000"/>
+                </a:solidFill>
+                <a:latin typeface="Arial"/>
+                <a:ea typeface="DejaVu Sans"/>
               </a:rPr>
               <a:t>Spielsteine entfernen, </a:t>
             </a:r>
@@ -7586,7 +7700,11 @@
             </a:pPr>
             <a:r>
               <a:rPr b="0" lang="de-DE" sz="1800" spc="-1" strike="noStrike">
-                <a:latin typeface="Arial"/>
+                <a:solidFill>
+                  <a:srgbClr val="000000"/>
+                </a:solidFill>
+                <a:latin typeface="Arial"/>
+                <a:ea typeface="DejaVu Sans"/>
               </a:rPr>
               <a:t>Mühle überprüfen</a:t>
             </a:r>
@@ -7654,7 +7772,7 @@
         <p:spPr>
           <a:xfrm>
             <a:off x="2411640" y="6445080"/>
-            <a:ext cx="6623280" cy="358920"/>
+            <a:ext cx="6622920" cy="358560"/>
           </a:xfrm>
           <a:prstGeom prst="rect">
             <a:avLst/>
@@ -7703,7 +7821,7 @@
         <p:spPr>
           <a:xfrm>
             <a:off x="390600" y="418680"/>
-            <a:ext cx="6700320" cy="560520"/>
+            <a:ext cx="6699960" cy="560160"/>
           </a:xfrm>
           <a:prstGeom prst="rect">
             <a:avLst/>
@@ -7762,7 +7880,7 @@
         <p:spPr>
           <a:xfrm>
             <a:off x="392040" y="1198440"/>
-            <a:ext cx="8355240" cy="4892760"/>
+            <a:ext cx="8354880" cy="4892400"/>
           </a:xfrm>
           <a:prstGeom prst="rect">
             <a:avLst/>
@@ -7814,7 +7932,7 @@
         <p:spPr>
           <a:xfrm>
             <a:off x="1079640" y="6444000"/>
-            <a:ext cx="1258560" cy="358560"/>
+            <a:ext cx="1258200" cy="358200"/>
           </a:xfrm>
           <a:prstGeom prst="rect">
             <a:avLst/>
@@ -7863,7 +7981,7 @@
         <p:spPr>
           <a:xfrm>
             <a:off x="392040" y="1198440"/>
-            <a:ext cx="8355240" cy="4892760"/>
+            <a:ext cx="8354880" cy="4892400"/>
           </a:xfrm>
           <a:prstGeom prst="rect">
             <a:avLst/>
@@ -7957,7 +8075,7 @@
         <p:spPr>
           <a:xfrm>
             <a:off x="4680000" y="3168000"/>
-            <a:ext cx="1223640" cy="575640"/>
+            <a:ext cx="1223280" cy="575280"/>
           </a:xfrm>
           <a:prstGeom prst="rect">
             <a:avLst/>
@@ -8010,7 +8128,7 @@
         <p:spPr>
           <a:xfrm>
             <a:off x="720000" y="4536000"/>
-            <a:ext cx="1223640" cy="575640"/>
+            <a:ext cx="1223280" cy="575280"/>
           </a:xfrm>
           <a:prstGeom prst="rect">
             <a:avLst/>
@@ -8063,7 +8181,7 @@
         <p:spPr>
           <a:xfrm>
             <a:off x="2520000" y="4536000"/>
-            <a:ext cx="1584000" cy="575640"/>
+            <a:ext cx="1583640" cy="575280"/>
           </a:xfrm>
           <a:prstGeom prst="rect">
             <a:avLst/>
@@ -8116,7 +8234,7 @@
         <p:spPr>
           <a:xfrm>
             <a:off x="7128000" y="4579560"/>
-            <a:ext cx="1223640" cy="575640"/>
+            <a:ext cx="1223280" cy="575280"/>
           </a:xfrm>
           <a:prstGeom prst="rect">
             <a:avLst/>
@@ -8169,7 +8287,7 @@
         <p:spPr>
           <a:xfrm>
             <a:off x="7128000" y="3204000"/>
-            <a:ext cx="1223640" cy="575640"/>
+            <a:ext cx="1223280" cy="575280"/>
           </a:xfrm>
           <a:prstGeom prst="rect">
             <a:avLst/>
@@ -8222,7 +8340,7 @@
         <p:spPr>
           <a:xfrm>
             <a:off x="1620000" y="3168000"/>
-            <a:ext cx="1223640" cy="575640"/>
+            <a:ext cx="1223280" cy="575280"/>
           </a:xfrm>
           <a:prstGeom prst="rect">
             <a:avLst/>
@@ -8275,7 +8393,7 @@
         <p:spPr>
           <a:xfrm>
             <a:off x="4680000" y="1800000"/>
-            <a:ext cx="1223640" cy="575640"/>
+            <a:ext cx="1223280" cy="575280"/>
           </a:xfrm>
           <a:prstGeom prst="rect">
             <a:avLst/>
@@ -8404,7 +8522,7 @@
         <p:spPr>
           <a:xfrm>
             <a:off x="504000" y="2448000"/>
-            <a:ext cx="3743640" cy="3671640"/>
+            <a:ext cx="3743280" cy="3671280"/>
           </a:xfrm>
           <a:prstGeom prst="rect">
             <a:avLst/>
@@ -8432,7 +8550,7 @@
         <p:spPr>
           <a:xfrm>
             <a:off x="720000" y="2664000"/>
-            <a:ext cx="3211560" cy="345960"/>
+            <a:ext cx="3211200" cy="345600"/>
           </a:xfrm>
           <a:prstGeom prst="rect">
             <a:avLst/>
@@ -8458,7 +8576,11 @@
             </a:pPr>
             <a:r>
               <a:rPr b="0" lang="de-DE" sz="1800" spc="-1" strike="noStrike">
-                <a:latin typeface="Arial"/>
+                <a:solidFill>
+                  <a:srgbClr val="000000"/>
+                </a:solidFill>
+                <a:latin typeface="Arial"/>
+                <a:ea typeface="DejaVu Sans"/>
               </a:rPr>
               <a:t>Benutzerdefinierte Klassen Qt</a:t>
             </a:r>
@@ -8477,7 +8599,7 @@
         <p:spPr>
           <a:xfrm>
             <a:off x="720000" y="5256000"/>
-            <a:ext cx="3311640" cy="835200"/>
+            <a:ext cx="3311280" cy="834840"/>
           </a:xfrm>
           <a:prstGeom prst="rect">
             <a:avLst/>
@@ -8586,7 +8708,7 @@
         <p:spPr>
           <a:xfrm>
             <a:off x="6408000" y="2412000"/>
-            <a:ext cx="2519640" cy="3743640"/>
+            <a:ext cx="2519280" cy="3743280"/>
           </a:xfrm>
           <a:prstGeom prst="rect">
             <a:avLst/>
@@ -8614,7 +8736,7 @@
         <p:spPr>
           <a:xfrm>
             <a:off x="6552000" y="5256000"/>
-            <a:ext cx="2303640" cy="863640"/>
+            <a:ext cx="2303280" cy="863280"/>
           </a:xfrm>
           <a:prstGeom prst="rect">
             <a:avLst/>
@@ -8687,7 +8809,7 @@
         <p:spPr>
           <a:xfrm>
             <a:off x="392040" y="1198440"/>
-            <a:ext cx="8607600" cy="5065200"/>
+            <a:ext cx="8607240" cy="5064840"/>
           </a:xfrm>
           <a:prstGeom prst="rect">
             <a:avLst/>
@@ -8716,7 +8838,7 @@
         <p:spPr>
           <a:xfrm>
             <a:off x="4608000" y="3888000"/>
-            <a:ext cx="1439640" cy="1943640"/>
+            <a:ext cx="1439280" cy="1943280"/>
           </a:xfrm>
           <a:prstGeom prst="rect">
             <a:avLst/>
@@ -8829,7 +8951,7 @@
         <p:spPr>
           <a:xfrm>
             <a:off x="4248000" y="1198440"/>
-            <a:ext cx="2159640" cy="529200"/>
+            <a:ext cx="2159280" cy="528840"/>
           </a:xfrm>
           <a:prstGeom prst="rect">
             <a:avLst/>
@@ -8951,7 +9073,7 @@
         <p:spPr>
           <a:xfrm>
             <a:off x="2411640" y="6445080"/>
-            <a:ext cx="6623280" cy="358920"/>
+            <a:ext cx="6622920" cy="358560"/>
           </a:xfrm>
           <a:prstGeom prst="rect">
             <a:avLst/>
@@ -9000,7 +9122,7 @@
         <p:spPr>
           <a:xfrm>
             <a:off x="390600" y="418680"/>
-            <a:ext cx="6700320" cy="560520"/>
+            <a:ext cx="6699960" cy="560160"/>
           </a:xfrm>
           <a:prstGeom prst="rect">
             <a:avLst/>
@@ -9059,7 +9181,7 @@
         <p:spPr>
           <a:xfrm>
             <a:off x="392040" y="1198440"/>
-            <a:ext cx="8355240" cy="4892760"/>
+            <a:ext cx="8354880" cy="4892400"/>
           </a:xfrm>
           <a:prstGeom prst="rect">
             <a:avLst/>
@@ -9111,7 +9233,7 @@
         <p:spPr>
           <a:xfrm>
             <a:off x="1079640" y="6444000"/>
-            <a:ext cx="1258560" cy="358560"/>
+            <a:ext cx="1258200" cy="358200"/>
           </a:xfrm>
           <a:prstGeom prst="rect">
             <a:avLst/>
@@ -9160,7 +9282,7 @@
         <p:spPr>
           <a:xfrm>
             <a:off x="392040" y="1198440"/>
-            <a:ext cx="8355240" cy="4892760"/>
+            <a:ext cx="8354880" cy="4892400"/>
           </a:xfrm>
           <a:prstGeom prst="rect">
             <a:avLst/>
@@ -9253,8 +9375,8 @@
         </p:nvSpPr>
         <p:spPr>
           <a:xfrm>
-            <a:off x="720000" y="4140000"/>
-            <a:ext cx="4895640" cy="575640"/>
+            <a:off x="720000" y="3960000"/>
+            <a:ext cx="4895280" cy="575280"/>
           </a:xfrm>
           <a:prstGeom prst="rect">
             <a:avLst/>
@@ -9306,8 +9428,8 @@
         </p:nvSpPr>
         <p:spPr>
           <a:xfrm>
-            <a:off x="720000" y="1296000"/>
-            <a:ext cx="4895640" cy="2447640"/>
+            <a:off x="720000" y="1440000"/>
+            <a:ext cx="4895280" cy="2160000"/>
           </a:xfrm>
           <a:prstGeom prst="rect">
             <a:avLst/>
@@ -9800,12 +9922,6 @@
               <a:lnSpc>
                 <a:spcPct val="100000"/>
               </a:lnSpc>
-              <a:spcBef>
-                <a:spcPts val="567"/>
-              </a:spcBef>
-              <a:spcAft>
-                <a:spcPts val="567"/>
-              </a:spcAft>
             </a:pPr>
             <a:r>
               <a:rPr b="1" lang="de-DE" sz="900" spc="-1" strike="noStrike">
@@ -9856,66 +9972,6 @@
                 <a:ea typeface="DejaVu Sans Mono"/>
               </a:rPr>
               <a:t>,reason):</a:t>
-            </a:r>
-            <a:endParaRPr b="0" lang="de-DE" sz="900" spc="-1" strike="noStrike">
-              <a:latin typeface="Arial"/>
-            </a:endParaRPr>
-          </a:p>
-          <a:p>
-            <a:pPr>
-              <a:lnSpc>
-                <a:spcPct val="100000"/>
-              </a:lnSpc>
-            </a:pPr>
-            <a:r>
-              <a:rPr b="1" lang="de-DE" sz="900" spc="-1" strike="noStrike">
-                <a:solidFill>
-                  <a:srgbClr val="000080"/>
-                </a:solidFill>
-                <a:latin typeface="DejaVu Sans Mono"/>
-                <a:ea typeface="DejaVu Sans Mono"/>
-              </a:rPr>
-              <a:t>	</a:t>
-            </a:r>
-            <a:r>
-              <a:rPr b="1" lang="de-DE" sz="900" spc="-1" strike="noStrike">
-                <a:solidFill>
-                  <a:srgbClr val="000080"/>
-                </a:solidFill>
-                <a:latin typeface="DejaVu Sans Mono"/>
-                <a:ea typeface="DejaVu Sans Mono"/>
-              </a:rPr>
-              <a:t>def </a:t>
-            </a:r>
-            <a:r>
-              <a:rPr b="0" lang="de-DE" sz="900" spc="-1" strike="noStrike">
-                <a:solidFill>
-                  <a:srgbClr val="000000"/>
-                </a:solidFill>
-                <a:latin typeface="DejaVu Sans Mono"/>
-                <a:ea typeface="DejaVu Sans Mono"/>
-              </a:rPr>
-              <a:t>message(</a:t>
-            </a:r>
-            <a:r>
-              <a:rPr b="0" lang="de-DE" sz="900" spc="-1" strike="noStrike">
-                <a:solidFill>
-                  <a:srgbClr val="94558d"/>
-                </a:solidFill>
-                <a:latin typeface="DejaVu Sans Mono"/>
-                <a:ea typeface="DejaVu Sans Mono"/>
-              </a:rPr>
-              <a:t>self</a:t>
-            </a:r>
-            <a:r>
-              <a:rPr b="0" lang="de-DE" sz="900" spc="-1" strike="noStrike">
-                <a:solidFill>
-                  <a:srgbClr val="000000"/>
-                </a:solidFill>
-                <a:latin typeface="DejaVu Sans Mono"/>
-                <a:ea typeface="DejaVu Sans Mono"/>
-              </a:rPr>
-              <a:t>, message_):</a:t>
             </a:r>
             <a:endParaRPr b="0" lang="de-DE" sz="900" spc="-1" strike="noStrike">
               <a:latin typeface="Arial"/>
@@ -9931,8 +9987,8 @@
         </p:nvSpPr>
         <p:spPr>
           <a:xfrm>
-            <a:off x="720000" y="4896000"/>
-            <a:ext cx="4895640" cy="575640"/>
+            <a:off x="720000" y="4860000"/>
+            <a:ext cx="4895280" cy="575280"/>
           </a:xfrm>
           <a:prstGeom prst="rect">
             <a:avLst/>
@@ -10034,7 +10090,7 @@
         <p:spPr>
           <a:xfrm>
             <a:off x="2412000" y="6445080"/>
-            <a:ext cx="6623280" cy="358920"/>
+            <a:ext cx="6622920" cy="358560"/>
           </a:xfrm>
           <a:prstGeom prst="rect">
             <a:avLst/>
@@ -10083,7 +10139,7 @@
         <p:spPr>
           <a:xfrm>
             <a:off x="390600" y="418680"/>
-            <a:ext cx="6700320" cy="560520"/>
+            <a:ext cx="6699960" cy="560160"/>
           </a:xfrm>
           <a:prstGeom prst="rect">
             <a:avLst/>
@@ -10132,7 +10188,7 @@
         <p:spPr>
           <a:xfrm>
             <a:off x="392040" y="1198440"/>
-            <a:ext cx="8355240" cy="4892760"/>
+            <a:ext cx="8354880" cy="4892400"/>
           </a:xfrm>
           <a:prstGeom prst="rect">
             <a:avLst/>
@@ -10184,7 +10240,7 @@
         <p:spPr>
           <a:xfrm>
             <a:off x="1079640" y="6444000"/>
-            <a:ext cx="1258560" cy="358560"/>
+            <a:ext cx="1258200" cy="358200"/>
           </a:xfrm>
           <a:prstGeom prst="rect">
             <a:avLst/>
@@ -10233,7 +10289,7 @@
         <p:spPr>
           <a:xfrm>
             <a:off x="392040" y="1198440"/>
-            <a:ext cx="8355240" cy="4892760"/>
+            <a:ext cx="8354880" cy="4892400"/>
           </a:xfrm>
           <a:prstGeom prst="rect">
             <a:avLst/>

</xml_diff>